<commit_message>
Added a new picture for the translation of an ABS asynchronous method call in ProActive.
</commit_message>
<xml_diff>
--- a/resources/drawings-ABS-PA.pptx
+++ b/resources/drawings-ABS-PA.pptx
@@ -8,6 +8,7 @@
     <p:sldId id="256" r:id="rId2"/>
     <p:sldId id="257" r:id="rId3"/>
     <p:sldId id="258" r:id="rId4"/>
+    <p:sldId id="259" r:id="rId5"/>
   </p:sldIdLst>
   <p:sldSz cx="9144000" cy="6858000" type="screen4x3"/>
   <p:notesSz cx="6858000" cy="9144000"/>
@@ -11174,237 +11175,6 @@
           </a:p>
         </p:txBody>
       </p:sp>
-      <p:sp>
-        <p:nvSpPr>
-          <p:cNvPr id="55" name="Rectangle 54"/>
-          <p:cNvSpPr/>
-          <p:nvPr/>
-        </p:nvSpPr>
-        <p:spPr>
-          <a:xfrm>
-            <a:off x="7191463" y="2732153"/>
-            <a:ext cx="477573" cy="230488"/>
-          </a:xfrm>
-          <a:prstGeom prst="rect">
-            <a:avLst/>
-          </a:prstGeom>
-        </p:spPr>
-        <p:style>
-          <a:lnRef idx="2">
-            <a:schemeClr val="dk1"/>
-          </a:lnRef>
-          <a:fillRef idx="1">
-            <a:schemeClr val="lt1"/>
-          </a:fillRef>
-          <a:effectRef idx="0">
-            <a:schemeClr val="dk1"/>
-          </a:effectRef>
-          <a:fontRef idx="minor">
-            <a:schemeClr val="dk1"/>
-          </a:fontRef>
-        </p:style>
-        <p:txBody>
-          <a:bodyPr rtlCol="0" anchor="ctr"/>
-          <a:lstStyle/>
-          <a:p>
-            <a:pPr algn="ctr"/>
-            <a:r>
-              <a:rPr lang="fr-FR" sz="1100" b="1" dirty="0" smtClean="0"/>
-              <a:t>ID</a:t>
-            </a:r>
-            <a:endParaRPr lang="fr-FR" sz="1100" b="1" dirty="0"/>
-          </a:p>
-        </p:txBody>
-      </p:sp>
-      <p:sp>
-        <p:nvSpPr>
-          <p:cNvPr id="56" name="Rectangle 55"/>
-          <p:cNvSpPr/>
-          <p:nvPr/>
-        </p:nvSpPr>
-        <p:spPr>
-          <a:xfrm>
-            <a:off x="7191463" y="2979234"/>
-            <a:ext cx="477574" cy="220663"/>
-          </a:xfrm>
-          <a:prstGeom prst="rect">
-            <a:avLst/>
-          </a:prstGeom>
-        </p:spPr>
-        <p:style>
-          <a:lnRef idx="2">
-            <a:schemeClr val="dk1"/>
-          </a:lnRef>
-          <a:fillRef idx="1">
-            <a:schemeClr val="lt1"/>
-          </a:fillRef>
-          <a:effectRef idx="0">
-            <a:schemeClr val="dk1"/>
-          </a:effectRef>
-          <a:fontRef idx="minor">
-            <a:schemeClr val="dk1"/>
-          </a:fontRef>
-        </p:style>
-        <p:txBody>
-          <a:bodyPr rtlCol="0" anchor="ctr"/>
-          <a:lstStyle/>
-          <a:p>
-            <a:pPr algn="ctr"/>
-            <a:r>
-              <a:rPr lang="fr-FR" sz="1100" b="1" dirty="0" err="1" smtClean="0"/>
-              <a:t>ref</a:t>
-            </a:r>
-            <a:endParaRPr lang="fr-FR" sz="1100" b="1" dirty="0"/>
-          </a:p>
-        </p:txBody>
-      </p:sp>
-      <p:sp>
-        <p:nvSpPr>
-          <p:cNvPr id="57" name="Rectangle 56"/>
-          <p:cNvSpPr/>
-          <p:nvPr/>
-        </p:nvSpPr>
-        <p:spPr>
-          <a:xfrm>
-            <a:off x="7669037" y="2732153"/>
-            <a:ext cx="282222" cy="230488"/>
-          </a:xfrm>
-          <a:prstGeom prst="rect">
-            <a:avLst/>
-          </a:prstGeom>
-        </p:spPr>
-        <p:style>
-          <a:lnRef idx="2">
-            <a:schemeClr val="dk1"/>
-          </a:lnRef>
-          <a:fillRef idx="1">
-            <a:schemeClr val="lt1"/>
-          </a:fillRef>
-          <a:effectRef idx="0">
-            <a:schemeClr val="dk1"/>
-          </a:effectRef>
-          <a:fontRef idx="minor">
-            <a:schemeClr val="dk1"/>
-          </a:fontRef>
-        </p:style>
-        <p:txBody>
-          <a:bodyPr rtlCol="0" anchor="ctr"/>
-          <a:lstStyle/>
-          <a:p>
-            <a:pPr algn="ctr"/>
-            <a:r>
-              <a:rPr lang="fr-FR" sz="1100" b="1" dirty="0" smtClean="0"/>
-              <a:t>1</a:t>
-            </a:r>
-            <a:endParaRPr lang="fr-FR" sz="1100" b="1" dirty="0"/>
-          </a:p>
-        </p:txBody>
-      </p:sp>
-      <p:sp>
-        <p:nvSpPr>
-          <p:cNvPr id="58" name="Rectangle 57"/>
-          <p:cNvSpPr/>
-          <p:nvPr/>
-        </p:nvSpPr>
-        <p:spPr>
-          <a:xfrm>
-            <a:off x="7669037" y="2969410"/>
-            <a:ext cx="282222" cy="230488"/>
-          </a:xfrm>
-          <a:prstGeom prst="rect">
-            <a:avLst/>
-          </a:prstGeom>
-        </p:spPr>
-        <p:style>
-          <a:lnRef idx="2">
-            <a:schemeClr val="dk1"/>
-          </a:lnRef>
-          <a:fillRef idx="1">
-            <a:schemeClr val="lt1"/>
-          </a:fillRef>
-          <a:effectRef idx="0">
-            <a:schemeClr val="dk1"/>
-          </a:effectRef>
-          <a:fontRef idx="minor">
-            <a:schemeClr val="dk1"/>
-          </a:fontRef>
-        </p:style>
-        <p:txBody>
-          <a:bodyPr rtlCol="0" anchor="ctr"/>
-          <a:lstStyle/>
-          <a:p>
-            <a:pPr algn="ctr"/>
-            <a:endParaRPr lang="fr-FR"/>
-          </a:p>
-        </p:txBody>
-      </p:sp>
-      <p:sp>
-        <p:nvSpPr>
-          <p:cNvPr id="65" name="Oval 67"/>
-          <p:cNvSpPr>
-            <a:spLocks noChangeArrowheads="1"/>
-          </p:cNvSpPr>
-          <p:nvPr/>
-        </p:nvSpPr>
-        <p:spPr bwMode="auto">
-          <a:xfrm rot="10800000">
-            <a:off x="7350085" y="3638537"/>
-            <a:ext cx="304800" cy="228600"/>
-          </a:xfrm>
-          <a:prstGeom prst="ellipse">
-            <a:avLst/>
-          </a:prstGeom>
-          <a:solidFill>
-            <a:srgbClr val="FFFFFF"/>
-          </a:solidFill>
-          <a:ln w="19050">
-            <a:solidFill>
-              <a:schemeClr val="tx1"/>
-            </a:solidFill>
-            <a:round/>
-            <a:headEnd type="none"/>
-            <a:tailEnd type="triangle" w="lg" len="lg"/>
-          </a:ln>
-        </p:spPr>
-        <p:txBody>
-          <a:bodyPr wrap="none" anchor="ctr"/>
-          <a:lstStyle/>
-          <a:p>
-            <a:endParaRPr lang="fr-FR"/>
-          </a:p>
-        </p:txBody>
-      </p:sp>
-      <p:cxnSp>
-        <p:nvCxnSpPr>
-          <p:cNvPr id="66" name="AutoShape 68"/>
-          <p:cNvCxnSpPr>
-            <a:cxnSpLocks noChangeShapeType="1"/>
-            <a:endCxn id="65" idx="3"/>
-          </p:cNvCxnSpPr>
-          <p:nvPr/>
-        </p:nvCxnSpPr>
-        <p:spPr bwMode="auto">
-          <a:xfrm flipH="1">
-            <a:off x="7610248" y="3096932"/>
-            <a:ext cx="199900" cy="575083"/>
-          </a:xfrm>
-          <a:prstGeom prst="straightConnector1">
-            <a:avLst/>
-          </a:prstGeom>
-          <a:solidFill>
-            <a:srgbClr val="FFFFFF"/>
-          </a:solidFill>
-          <a:ln w="9525">
-            <a:solidFill>
-              <a:schemeClr val="tx1"/>
-            </a:solidFill>
-            <a:round/>
-            <a:headEnd type="none"/>
-            <a:tailEnd type="triangle" w="lg" len="lg"/>
-          </a:ln>
-          <a:extLst/>
-        </p:spPr>
-      </p:cxnSp>
       <p:cxnSp>
         <p:nvCxnSpPr>
           <p:cNvPr id="74" name="Connecteur en arc 73"/>
@@ -11447,10 +11217,2528 @@
           </a:fontRef>
         </p:style>
       </p:cxnSp>
+      <p:sp>
+        <p:nvSpPr>
+          <p:cNvPr id="81" name="Rectangle 80"/>
+          <p:cNvSpPr/>
+          <p:nvPr/>
+        </p:nvSpPr>
+        <p:spPr>
+          <a:xfrm>
+            <a:off x="7000293" y="2691188"/>
+            <a:ext cx="477573" cy="230488"/>
+          </a:xfrm>
+          <a:prstGeom prst="rect">
+            <a:avLst/>
+          </a:prstGeom>
+        </p:spPr>
+        <p:style>
+          <a:lnRef idx="2">
+            <a:schemeClr val="dk1"/>
+          </a:lnRef>
+          <a:fillRef idx="1">
+            <a:schemeClr val="lt1"/>
+          </a:fillRef>
+          <a:effectRef idx="0">
+            <a:schemeClr val="dk1"/>
+          </a:effectRef>
+          <a:fontRef idx="minor">
+            <a:schemeClr val="dk1"/>
+          </a:fontRef>
+        </p:style>
+        <p:txBody>
+          <a:bodyPr rtlCol="0" anchor="ctr"/>
+          <a:lstStyle/>
+          <a:p>
+            <a:pPr algn="ctr"/>
+            <a:r>
+              <a:rPr lang="fr-FR" sz="1100" b="1" dirty="0" smtClean="0"/>
+              <a:t>ID</a:t>
+            </a:r>
+            <a:endParaRPr lang="fr-FR" sz="1100" b="1" dirty="0"/>
+          </a:p>
+        </p:txBody>
+      </p:sp>
+      <p:sp>
+        <p:nvSpPr>
+          <p:cNvPr id="82" name="Rectangle 81"/>
+          <p:cNvSpPr/>
+          <p:nvPr/>
+        </p:nvSpPr>
+        <p:spPr>
+          <a:xfrm>
+            <a:off x="7000293" y="2938269"/>
+            <a:ext cx="477574" cy="220663"/>
+          </a:xfrm>
+          <a:prstGeom prst="rect">
+            <a:avLst/>
+          </a:prstGeom>
+        </p:spPr>
+        <p:style>
+          <a:lnRef idx="2">
+            <a:schemeClr val="dk1"/>
+          </a:lnRef>
+          <a:fillRef idx="1">
+            <a:schemeClr val="lt1"/>
+          </a:fillRef>
+          <a:effectRef idx="0">
+            <a:schemeClr val="dk1"/>
+          </a:effectRef>
+          <a:fontRef idx="minor">
+            <a:schemeClr val="dk1"/>
+          </a:fontRef>
+        </p:style>
+        <p:txBody>
+          <a:bodyPr rtlCol="0" anchor="ctr"/>
+          <a:lstStyle/>
+          <a:p>
+            <a:pPr algn="ctr"/>
+            <a:r>
+              <a:rPr lang="fr-FR" sz="1100" b="1" dirty="0" err="1" smtClean="0"/>
+              <a:t>ref</a:t>
+            </a:r>
+            <a:endParaRPr lang="fr-FR" sz="1100" b="1" dirty="0"/>
+          </a:p>
+        </p:txBody>
+      </p:sp>
+      <p:sp>
+        <p:nvSpPr>
+          <p:cNvPr id="83" name="Rectangle 82"/>
+          <p:cNvSpPr/>
+          <p:nvPr/>
+        </p:nvSpPr>
+        <p:spPr>
+          <a:xfrm>
+            <a:off x="7477867" y="2691188"/>
+            <a:ext cx="282222" cy="230488"/>
+          </a:xfrm>
+          <a:prstGeom prst="rect">
+            <a:avLst/>
+          </a:prstGeom>
+        </p:spPr>
+        <p:style>
+          <a:lnRef idx="2">
+            <a:schemeClr val="dk1"/>
+          </a:lnRef>
+          <a:fillRef idx="1">
+            <a:schemeClr val="lt1"/>
+          </a:fillRef>
+          <a:effectRef idx="0">
+            <a:schemeClr val="dk1"/>
+          </a:effectRef>
+          <a:fontRef idx="minor">
+            <a:schemeClr val="dk1"/>
+          </a:fontRef>
+        </p:style>
+        <p:txBody>
+          <a:bodyPr rtlCol="0" anchor="ctr"/>
+          <a:lstStyle/>
+          <a:p>
+            <a:pPr algn="ctr"/>
+            <a:r>
+              <a:rPr lang="fr-FR" sz="1100" b="1" dirty="0" smtClean="0"/>
+              <a:t>1</a:t>
+            </a:r>
+            <a:endParaRPr lang="fr-FR" sz="1100" b="1" dirty="0"/>
+          </a:p>
+        </p:txBody>
+      </p:sp>
+      <p:sp>
+        <p:nvSpPr>
+          <p:cNvPr id="84" name="Rectangle 83"/>
+          <p:cNvSpPr/>
+          <p:nvPr/>
+        </p:nvSpPr>
+        <p:spPr>
+          <a:xfrm>
+            <a:off x="7477867" y="2928445"/>
+            <a:ext cx="282222" cy="230488"/>
+          </a:xfrm>
+          <a:prstGeom prst="rect">
+            <a:avLst/>
+          </a:prstGeom>
+        </p:spPr>
+        <p:style>
+          <a:lnRef idx="2">
+            <a:schemeClr val="dk1"/>
+          </a:lnRef>
+          <a:fillRef idx="1">
+            <a:schemeClr val="lt1"/>
+          </a:fillRef>
+          <a:effectRef idx="0">
+            <a:schemeClr val="dk1"/>
+          </a:effectRef>
+          <a:fontRef idx="minor">
+            <a:schemeClr val="dk1"/>
+          </a:fontRef>
+        </p:style>
+        <p:txBody>
+          <a:bodyPr rtlCol="0" anchor="ctr"/>
+          <a:lstStyle/>
+          <a:p>
+            <a:pPr algn="ctr"/>
+            <a:endParaRPr lang="fr-FR"/>
+          </a:p>
+        </p:txBody>
+      </p:sp>
+      <p:sp>
+        <p:nvSpPr>
+          <p:cNvPr id="85" name="Oval 67"/>
+          <p:cNvSpPr>
+            <a:spLocks noChangeArrowheads="1"/>
+          </p:cNvSpPr>
+          <p:nvPr/>
+        </p:nvSpPr>
+        <p:spPr bwMode="auto">
+          <a:xfrm rot="10800000">
+            <a:off x="7928234" y="3160441"/>
+            <a:ext cx="304800" cy="228600"/>
+          </a:xfrm>
+          <a:prstGeom prst="ellipse">
+            <a:avLst/>
+          </a:prstGeom>
+          <a:solidFill>
+            <a:srgbClr val="FFFFFF"/>
+          </a:solidFill>
+          <a:ln w="19050">
+            <a:solidFill>
+              <a:schemeClr val="tx1"/>
+            </a:solidFill>
+            <a:round/>
+            <a:headEnd type="none"/>
+            <a:tailEnd type="triangle" w="lg" len="lg"/>
+          </a:ln>
+        </p:spPr>
+        <p:txBody>
+          <a:bodyPr wrap="none" anchor="ctr"/>
+          <a:lstStyle/>
+          <a:p>
+            <a:endParaRPr lang="fr-FR"/>
+          </a:p>
+        </p:txBody>
+      </p:sp>
+      <p:cxnSp>
+        <p:nvCxnSpPr>
+          <p:cNvPr id="86" name="AutoShape 68"/>
+          <p:cNvCxnSpPr>
+            <a:cxnSpLocks noChangeShapeType="1"/>
+            <a:endCxn id="85" idx="5"/>
+          </p:cNvCxnSpPr>
+          <p:nvPr/>
+        </p:nvCxnSpPr>
+        <p:spPr bwMode="auto">
+          <a:xfrm>
+            <a:off x="7618978" y="3036039"/>
+            <a:ext cx="353893" cy="157880"/>
+          </a:xfrm>
+          <a:prstGeom prst="straightConnector1">
+            <a:avLst/>
+          </a:prstGeom>
+          <a:solidFill>
+            <a:srgbClr val="FFFFFF"/>
+          </a:solidFill>
+          <a:ln w="9525">
+            <a:solidFill>
+              <a:schemeClr val="tx1"/>
+            </a:solidFill>
+            <a:round/>
+            <a:headEnd type="none"/>
+            <a:tailEnd type="triangle" w="lg" len="lg"/>
+          </a:ln>
+          <a:extLst/>
+        </p:spPr>
+      </p:cxnSp>
     </p:spTree>
     <p:extLst>
       <p:ext uri="{BB962C8B-B14F-4D97-AF65-F5344CB8AC3E}">
         <p14:creationId xmlns:p14="http://schemas.microsoft.com/office/powerpoint/2010/main" val="1742155670"/>
+      </p:ext>
+    </p:extLst>
+  </p:cSld>
+  <p:clrMapOvr>
+    <a:masterClrMapping/>
+  </p:clrMapOvr>
+  <p:timing>
+    <p:tnLst>
+      <p:par>
+        <p:cTn xmlns:p14="http://schemas.microsoft.com/office/powerpoint/2010/main" id="1" dur="indefinite" restart="never" nodeType="tmRoot">
+          <p:childTnLst>
+            <p:seq concurrent="1" nextAc="seek">
+              <p:cTn id="2" dur="indefinite" nodeType="mainSeq">
+                <p:childTnLst>
+                  <p:par>
+                    <p:cTn id="3" fill="hold">
+                      <p:stCondLst>
+                        <p:cond delay="indefinite"/>
+                        <p:cond evt="onBegin" delay="0">
+                          <p:tn val="2"/>
+                        </p:cond>
+                      </p:stCondLst>
+                      <p:childTnLst>
+                        <p:par>
+                          <p:cTn id="4" fill="hold">
+                            <p:stCondLst>
+                              <p:cond delay="0"/>
+                            </p:stCondLst>
+                            <p:childTnLst>
+                              <p:par>
+                                <p:cTn id="5" presetID="1" presetClass="entr" presetSubtype="0" fill="hold" grpId="0" nodeType="withEffect">
+                                  <p:stCondLst>
+                                    <p:cond delay="0"/>
+                                  </p:stCondLst>
+                                  <p:childTnLst>
+                                    <p:set>
+                                      <p:cBhvr>
+                                        <p:cTn id="6" dur="1" fill="hold">
+                                          <p:stCondLst>
+                                            <p:cond delay="0"/>
+                                          </p:stCondLst>
+                                        </p:cTn>
+                                        <p:tgtEl>
+                                          <p:spTgt spid="22"/>
+                                        </p:tgtEl>
+                                        <p:attrNameLst>
+                                          <p:attrName>style.visibility</p:attrName>
+                                        </p:attrNameLst>
+                                      </p:cBhvr>
+                                      <p:to>
+                                        <p:strVal val="visible"/>
+                                      </p:to>
+                                    </p:set>
+                                  </p:childTnLst>
+                                </p:cTn>
+                              </p:par>
+                              <p:par>
+                                <p:cTn id="7" presetID="1" presetClass="entr" presetSubtype="0" fill="hold" grpId="0" nodeType="withEffect">
+                                  <p:stCondLst>
+                                    <p:cond delay="0"/>
+                                  </p:stCondLst>
+                                  <p:childTnLst>
+                                    <p:set>
+                                      <p:cBhvr>
+                                        <p:cTn id="8" dur="1" fill="hold">
+                                          <p:stCondLst>
+                                            <p:cond delay="0"/>
+                                          </p:stCondLst>
+                                        </p:cTn>
+                                        <p:tgtEl>
+                                          <p:spTgt spid="23"/>
+                                        </p:tgtEl>
+                                        <p:attrNameLst>
+                                          <p:attrName>style.visibility</p:attrName>
+                                        </p:attrNameLst>
+                                      </p:cBhvr>
+                                      <p:to>
+                                        <p:strVal val="visible"/>
+                                      </p:to>
+                                    </p:set>
+                                  </p:childTnLst>
+                                </p:cTn>
+                              </p:par>
+                              <p:par>
+                                <p:cTn id="9" presetID="1" presetClass="entr" presetSubtype="0" fill="hold" grpId="0" nodeType="withEffect">
+                                  <p:stCondLst>
+                                    <p:cond delay="0"/>
+                                  </p:stCondLst>
+                                  <p:childTnLst>
+                                    <p:set>
+                                      <p:cBhvr>
+                                        <p:cTn id="10" dur="1" fill="hold">
+                                          <p:stCondLst>
+                                            <p:cond delay="0"/>
+                                          </p:stCondLst>
+                                        </p:cTn>
+                                        <p:tgtEl>
+                                          <p:spTgt spid="24"/>
+                                        </p:tgtEl>
+                                        <p:attrNameLst>
+                                          <p:attrName>style.visibility</p:attrName>
+                                        </p:attrNameLst>
+                                      </p:cBhvr>
+                                      <p:to>
+                                        <p:strVal val="visible"/>
+                                      </p:to>
+                                    </p:set>
+                                  </p:childTnLst>
+                                </p:cTn>
+                              </p:par>
+                              <p:par>
+                                <p:cTn id="11" presetID="1" presetClass="entr" presetSubtype="0" fill="hold" grpId="0" nodeType="withEffect">
+                                  <p:stCondLst>
+                                    <p:cond delay="0"/>
+                                  </p:stCondLst>
+                                  <p:childTnLst>
+                                    <p:set>
+                                      <p:cBhvr>
+                                        <p:cTn id="12" dur="1" fill="hold">
+                                          <p:stCondLst>
+                                            <p:cond delay="0"/>
+                                          </p:stCondLst>
+                                        </p:cTn>
+                                        <p:tgtEl>
+                                          <p:spTgt spid="25"/>
+                                        </p:tgtEl>
+                                        <p:attrNameLst>
+                                          <p:attrName>style.visibility</p:attrName>
+                                        </p:attrNameLst>
+                                      </p:cBhvr>
+                                      <p:to>
+                                        <p:strVal val="visible"/>
+                                      </p:to>
+                                    </p:set>
+                                  </p:childTnLst>
+                                </p:cTn>
+                              </p:par>
+                              <p:par>
+                                <p:cTn id="13" presetID="1" presetClass="entr" presetSubtype="0" fill="hold" grpId="0" nodeType="withEffect">
+                                  <p:stCondLst>
+                                    <p:cond delay="0"/>
+                                  </p:stCondLst>
+                                  <p:childTnLst>
+                                    <p:set>
+                                      <p:cBhvr>
+                                        <p:cTn id="14" dur="1" fill="hold">
+                                          <p:stCondLst>
+                                            <p:cond delay="0"/>
+                                          </p:stCondLst>
+                                        </p:cTn>
+                                        <p:tgtEl>
+                                          <p:spTgt spid="26"/>
+                                        </p:tgtEl>
+                                        <p:attrNameLst>
+                                          <p:attrName>style.visibility</p:attrName>
+                                        </p:attrNameLst>
+                                      </p:cBhvr>
+                                      <p:to>
+                                        <p:strVal val="visible"/>
+                                      </p:to>
+                                    </p:set>
+                                  </p:childTnLst>
+                                </p:cTn>
+                              </p:par>
+                              <p:par>
+                                <p:cTn id="15" presetID="1" presetClass="entr" presetSubtype="0" fill="hold" grpId="0" nodeType="withEffect">
+                                  <p:stCondLst>
+                                    <p:cond delay="0"/>
+                                  </p:stCondLst>
+                                  <p:childTnLst>
+                                    <p:set>
+                                      <p:cBhvr>
+                                        <p:cTn id="16" dur="1" fill="hold">
+                                          <p:stCondLst>
+                                            <p:cond delay="0"/>
+                                          </p:stCondLst>
+                                        </p:cTn>
+                                        <p:tgtEl>
+                                          <p:spTgt spid="27"/>
+                                        </p:tgtEl>
+                                        <p:attrNameLst>
+                                          <p:attrName>style.visibility</p:attrName>
+                                        </p:attrNameLst>
+                                      </p:cBhvr>
+                                      <p:to>
+                                        <p:strVal val="visible"/>
+                                      </p:to>
+                                    </p:set>
+                                  </p:childTnLst>
+                                </p:cTn>
+                              </p:par>
+                              <p:par>
+                                <p:cTn id="17" presetID="1" presetClass="entr" presetSubtype="0" fill="hold" grpId="0" nodeType="withEffect">
+                                  <p:stCondLst>
+                                    <p:cond delay="0"/>
+                                  </p:stCondLst>
+                                  <p:childTnLst>
+                                    <p:set>
+                                      <p:cBhvr>
+                                        <p:cTn id="18" dur="1" fill="hold">
+                                          <p:stCondLst>
+                                            <p:cond delay="0"/>
+                                          </p:stCondLst>
+                                        </p:cTn>
+                                        <p:tgtEl>
+                                          <p:spTgt spid="28"/>
+                                        </p:tgtEl>
+                                        <p:attrNameLst>
+                                          <p:attrName>style.visibility</p:attrName>
+                                        </p:attrNameLst>
+                                      </p:cBhvr>
+                                      <p:to>
+                                        <p:strVal val="visible"/>
+                                      </p:to>
+                                    </p:set>
+                                  </p:childTnLst>
+                                </p:cTn>
+                              </p:par>
+                              <p:par>
+                                <p:cTn id="19" presetID="1" presetClass="entr" presetSubtype="0" fill="hold" grpId="0" nodeType="withEffect">
+                                  <p:stCondLst>
+                                    <p:cond delay="0"/>
+                                  </p:stCondLst>
+                                  <p:childTnLst>
+                                    <p:set>
+                                      <p:cBhvr>
+                                        <p:cTn id="20" dur="1" fill="hold">
+                                          <p:stCondLst>
+                                            <p:cond delay="0"/>
+                                          </p:stCondLst>
+                                        </p:cTn>
+                                        <p:tgtEl>
+                                          <p:spTgt spid="29"/>
+                                        </p:tgtEl>
+                                        <p:attrNameLst>
+                                          <p:attrName>style.visibility</p:attrName>
+                                        </p:attrNameLst>
+                                      </p:cBhvr>
+                                      <p:to>
+                                        <p:strVal val="visible"/>
+                                      </p:to>
+                                    </p:set>
+                                  </p:childTnLst>
+                                </p:cTn>
+                              </p:par>
+                              <p:par>
+                                <p:cTn id="21" presetID="1" presetClass="entr" presetSubtype="0" fill="hold" grpId="0" nodeType="withEffect">
+                                  <p:stCondLst>
+                                    <p:cond delay="0"/>
+                                  </p:stCondLst>
+                                  <p:childTnLst>
+                                    <p:set>
+                                      <p:cBhvr>
+                                        <p:cTn id="22" dur="1" fill="hold">
+                                          <p:stCondLst>
+                                            <p:cond delay="0"/>
+                                          </p:stCondLst>
+                                        </p:cTn>
+                                        <p:tgtEl>
+                                          <p:spTgt spid="30"/>
+                                        </p:tgtEl>
+                                        <p:attrNameLst>
+                                          <p:attrName>style.visibility</p:attrName>
+                                        </p:attrNameLst>
+                                      </p:cBhvr>
+                                      <p:to>
+                                        <p:strVal val="visible"/>
+                                      </p:to>
+                                    </p:set>
+                                  </p:childTnLst>
+                                </p:cTn>
+                              </p:par>
+                              <p:par>
+                                <p:cTn id="23" presetID="1" presetClass="entr" presetSubtype="0" fill="hold" grpId="0" nodeType="withEffect">
+                                  <p:stCondLst>
+                                    <p:cond delay="0"/>
+                                  </p:stCondLst>
+                                  <p:childTnLst>
+                                    <p:set>
+                                      <p:cBhvr>
+                                        <p:cTn id="24" dur="1" fill="hold">
+                                          <p:stCondLst>
+                                            <p:cond delay="0"/>
+                                          </p:stCondLst>
+                                        </p:cTn>
+                                        <p:tgtEl>
+                                          <p:spTgt spid="31"/>
+                                        </p:tgtEl>
+                                        <p:attrNameLst>
+                                          <p:attrName>style.visibility</p:attrName>
+                                        </p:attrNameLst>
+                                      </p:cBhvr>
+                                      <p:to>
+                                        <p:strVal val="visible"/>
+                                      </p:to>
+                                    </p:set>
+                                  </p:childTnLst>
+                                </p:cTn>
+                              </p:par>
+                              <p:par>
+                                <p:cTn id="25" presetID="1" presetClass="entr" presetSubtype="0" fill="hold" grpId="0" nodeType="withEffect">
+                                  <p:stCondLst>
+                                    <p:cond delay="0"/>
+                                  </p:stCondLst>
+                                  <p:childTnLst>
+                                    <p:set>
+                                      <p:cBhvr>
+                                        <p:cTn id="26" dur="1" fill="hold">
+                                          <p:stCondLst>
+                                            <p:cond delay="0"/>
+                                          </p:stCondLst>
+                                        </p:cTn>
+                                        <p:tgtEl>
+                                          <p:spTgt spid="81"/>
+                                        </p:tgtEl>
+                                        <p:attrNameLst>
+                                          <p:attrName>style.visibility</p:attrName>
+                                        </p:attrNameLst>
+                                      </p:cBhvr>
+                                      <p:to>
+                                        <p:strVal val="visible"/>
+                                      </p:to>
+                                    </p:set>
+                                  </p:childTnLst>
+                                </p:cTn>
+                              </p:par>
+                              <p:par>
+                                <p:cTn id="27" presetID="1" presetClass="entr" presetSubtype="0" fill="hold" grpId="0" nodeType="withEffect">
+                                  <p:stCondLst>
+                                    <p:cond delay="0"/>
+                                  </p:stCondLst>
+                                  <p:childTnLst>
+                                    <p:set>
+                                      <p:cBhvr>
+                                        <p:cTn id="28" dur="1" fill="hold">
+                                          <p:stCondLst>
+                                            <p:cond delay="0"/>
+                                          </p:stCondLst>
+                                        </p:cTn>
+                                        <p:tgtEl>
+                                          <p:spTgt spid="82"/>
+                                        </p:tgtEl>
+                                        <p:attrNameLst>
+                                          <p:attrName>style.visibility</p:attrName>
+                                        </p:attrNameLst>
+                                      </p:cBhvr>
+                                      <p:to>
+                                        <p:strVal val="visible"/>
+                                      </p:to>
+                                    </p:set>
+                                  </p:childTnLst>
+                                </p:cTn>
+                              </p:par>
+                              <p:par>
+                                <p:cTn id="29" presetID="1" presetClass="entr" presetSubtype="0" fill="hold" grpId="0" nodeType="withEffect">
+                                  <p:stCondLst>
+                                    <p:cond delay="0"/>
+                                  </p:stCondLst>
+                                  <p:childTnLst>
+                                    <p:set>
+                                      <p:cBhvr>
+                                        <p:cTn id="30" dur="1" fill="hold">
+                                          <p:stCondLst>
+                                            <p:cond delay="0"/>
+                                          </p:stCondLst>
+                                        </p:cTn>
+                                        <p:tgtEl>
+                                          <p:spTgt spid="83"/>
+                                        </p:tgtEl>
+                                        <p:attrNameLst>
+                                          <p:attrName>style.visibility</p:attrName>
+                                        </p:attrNameLst>
+                                      </p:cBhvr>
+                                      <p:to>
+                                        <p:strVal val="visible"/>
+                                      </p:to>
+                                    </p:set>
+                                  </p:childTnLst>
+                                </p:cTn>
+                              </p:par>
+                              <p:par>
+                                <p:cTn id="31" presetID="1" presetClass="entr" presetSubtype="0" fill="hold" grpId="0" nodeType="withEffect">
+                                  <p:stCondLst>
+                                    <p:cond delay="0"/>
+                                  </p:stCondLst>
+                                  <p:childTnLst>
+                                    <p:set>
+                                      <p:cBhvr>
+                                        <p:cTn id="32" dur="1" fill="hold">
+                                          <p:stCondLst>
+                                            <p:cond delay="0"/>
+                                          </p:stCondLst>
+                                        </p:cTn>
+                                        <p:tgtEl>
+                                          <p:spTgt spid="84"/>
+                                        </p:tgtEl>
+                                        <p:attrNameLst>
+                                          <p:attrName>style.visibility</p:attrName>
+                                        </p:attrNameLst>
+                                      </p:cBhvr>
+                                      <p:to>
+                                        <p:strVal val="visible"/>
+                                      </p:to>
+                                    </p:set>
+                                  </p:childTnLst>
+                                </p:cTn>
+                              </p:par>
+                            </p:childTnLst>
+                          </p:cTn>
+                        </p:par>
+                      </p:childTnLst>
+                    </p:cTn>
+                  </p:par>
+                </p:childTnLst>
+              </p:cTn>
+              <p:prevCondLst>
+                <p:cond evt="onPrev" delay="0">
+                  <p:tgtEl>
+                    <p:sldTgt/>
+                  </p:tgtEl>
+                </p:cond>
+              </p:prevCondLst>
+              <p:nextCondLst>
+                <p:cond evt="onNext" delay="0">
+                  <p:tgtEl>
+                    <p:sldTgt/>
+                  </p:tgtEl>
+                </p:cond>
+              </p:nextCondLst>
+            </p:seq>
+          </p:childTnLst>
+        </p:cTn>
+      </p:par>
+    </p:tnLst>
+    <p:bldLst>
+      <p:bldP spid="22" grpId="0" animBg="1"/>
+      <p:bldP spid="23" grpId="0" animBg="1"/>
+      <p:bldP spid="24" grpId="0" animBg="1"/>
+      <p:bldP spid="25" grpId="0" animBg="1"/>
+      <p:bldP spid="26" grpId="0" animBg="1"/>
+      <p:bldP spid="27" grpId="0" animBg="1"/>
+      <p:bldP spid="28" grpId="0" animBg="1"/>
+      <p:bldP spid="29" grpId="0" animBg="1"/>
+      <p:bldP spid="30" grpId="0" animBg="1"/>
+      <p:bldP spid="31" grpId="0" animBg="1"/>
+      <p:bldP spid="81" grpId="0" animBg="1"/>
+      <p:bldP spid="82" grpId="0" animBg="1"/>
+      <p:bldP spid="83" grpId="0" animBg="1"/>
+      <p:bldP spid="84" grpId="0" animBg="1"/>
+    </p:bldLst>
+  </p:timing>
+</p:sld>
+</file>
+
+<file path=ppt/slides/slide4.xml><?xml version="1.0" encoding="utf-8"?>
+<p:sld xmlns:a="http://schemas.openxmlformats.org/drawingml/2006/main" xmlns:r="http://schemas.openxmlformats.org/officeDocument/2006/relationships" xmlns:p="http://schemas.openxmlformats.org/presentationml/2006/main">
+  <p:cSld>
+    <p:spTree>
+      <p:nvGrpSpPr>
+        <p:cNvPr id="1" name=""/>
+        <p:cNvGrpSpPr/>
+        <p:nvPr/>
+      </p:nvGrpSpPr>
+      <p:grpSpPr>
+        <a:xfrm>
+          <a:off x="0" y="0"/>
+          <a:ext cx="0" cy="0"/>
+          <a:chOff x="0" y="0"/>
+          <a:chExt cx="0" cy="0"/>
+        </a:xfrm>
+      </p:grpSpPr>
+      <p:sp>
+        <p:nvSpPr>
+          <p:cNvPr id="4" name="AutoShape 2"/>
+          <p:cNvSpPr>
+            <a:spLocks noChangeArrowheads="1"/>
+          </p:cNvSpPr>
+          <p:nvPr/>
+        </p:nvSpPr>
+        <p:spPr bwMode="auto">
+          <a:xfrm>
+            <a:off x="154476" y="2120980"/>
+            <a:ext cx="3200400" cy="2819400"/>
+          </a:xfrm>
+          <a:prstGeom prst="roundRect">
+            <a:avLst>
+              <a:gd name="adj" fmla="val 16667"/>
+            </a:avLst>
+          </a:prstGeom>
+          <a:ln w="38100" cmpd="sng">
+            <a:headEnd/>
+            <a:tailEnd/>
+          </a:ln>
+        </p:spPr>
+        <p:style>
+          <a:lnRef idx="2">
+            <a:schemeClr val="accent4"/>
+          </a:lnRef>
+          <a:fillRef idx="1">
+            <a:schemeClr val="lt1"/>
+          </a:fillRef>
+          <a:effectRef idx="0">
+            <a:schemeClr val="accent4"/>
+          </a:effectRef>
+          <a:fontRef idx="minor">
+            <a:schemeClr val="dk1"/>
+          </a:fontRef>
+        </p:style>
+        <p:txBody>
+          <a:bodyPr wrap="none" anchor="ctr"/>
+          <a:lstStyle/>
+          <a:p>
+            <a:pPr algn="ctr"/>
+            <a:endParaRPr lang="fr-FR" b="1" dirty="0" smtClean="0">
+              <a:latin typeface="Symbol" charset="0"/>
+            </a:endParaRPr>
+          </a:p>
+          <a:p>
+            <a:pPr algn="ctr"/>
+            <a:endParaRPr lang="fr-FR" b="1" dirty="0"/>
+          </a:p>
+        </p:txBody>
+      </p:sp>
+      <p:sp>
+        <p:nvSpPr>
+          <p:cNvPr id="5" name="ZoneTexte 4"/>
+          <p:cNvSpPr txBox="1"/>
+          <p:nvPr/>
+        </p:nvSpPr>
+        <p:spPr>
+          <a:xfrm>
+            <a:off x="154476" y="1544498"/>
+            <a:ext cx="479618" cy="646331"/>
+          </a:xfrm>
+          <a:prstGeom prst="rect">
+            <a:avLst/>
+          </a:prstGeom>
+          <a:noFill/>
+        </p:spPr>
+        <p:txBody>
+          <a:bodyPr wrap="none" rtlCol="0">
+            <a:spAutoFit/>
+          </a:bodyPr>
+          <a:lstStyle/>
+          <a:p>
+            <a:r>
+              <a:rPr lang="fr-FR" sz="3600" b="1" dirty="0" smtClean="0">
+                <a:solidFill>
+                  <a:schemeClr val="accent4"/>
+                </a:solidFill>
+                <a:latin typeface="Symbol" charset="0"/>
+              </a:rPr>
+              <a:t>a</a:t>
+            </a:r>
+            <a:endParaRPr lang="fr-FR" sz="3600" b="1" dirty="0" smtClean="0">
+              <a:solidFill>
+                <a:schemeClr val="accent4"/>
+              </a:solidFill>
+            </a:endParaRPr>
+          </a:p>
+        </p:txBody>
+      </p:sp>
+      <p:sp>
+        <p:nvSpPr>
+          <p:cNvPr id="6" name="AutoShape 2"/>
+          <p:cNvSpPr>
+            <a:spLocks noChangeArrowheads="1"/>
+          </p:cNvSpPr>
+          <p:nvPr/>
+        </p:nvSpPr>
+        <p:spPr bwMode="auto">
+          <a:xfrm>
+            <a:off x="5082940" y="2120980"/>
+            <a:ext cx="3200400" cy="2819400"/>
+          </a:xfrm>
+          <a:prstGeom prst="roundRect">
+            <a:avLst>
+              <a:gd name="adj" fmla="val 16667"/>
+            </a:avLst>
+          </a:prstGeom>
+          <a:ln w="38100" cmpd="sng">
+            <a:headEnd/>
+            <a:tailEnd/>
+          </a:ln>
+        </p:spPr>
+        <p:style>
+          <a:lnRef idx="2">
+            <a:schemeClr val="accent4"/>
+          </a:lnRef>
+          <a:fillRef idx="1">
+            <a:schemeClr val="lt1"/>
+          </a:fillRef>
+          <a:effectRef idx="0">
+            <a:schemeClr val="accent4"/>
+          </a:effectRef>
+          <a:fontRef idx="minor">
+            <a:schemeClr val="dk1"/>
+          </a:fontRef>
+        </p:style>
+        <p:txBody>
+          <a:bodyPr wrap="none" anchor="ctr"/>
+          <a:lstStyle/>
+          <a:p>
+            <a:pPr algn="ctr"/>
+            <a:endParaRPr lang="fr-FR" b="1" dirty="0" smtClean="0">
+              <a:latin typeface="Symbol" charset="0"/>
+            </a:endParaRPr>
+          </a:p>
+          <a:p>
+            <a:pPr algn="ctr"/>
+            <a:endParaRPr lang="fr-FR" b="1" dirty="0"/>
+          </a:p>
+        </p:txBody>
+      </p:sp>
+      <p:sp>
+        <p:nvSpPr>
+          <p:cNvPr id="7" name="ZoneTexte 6"/>
+          <p:cNvSpPr txBox="1"/>
+          <p:nvPr/>
+        </p:nvSpPr>
+        <p:spPr>
+          <a:xfrm>
+            <a:off x="5018820" y="1544498"/>
+            <a:ext cx="438041" cy="646331"/>
+          </a:xfrm>
+          <a:prstGeom prst="rect">
+            <a:avLst/>
+          </a:prstGeom>
+          <a:noFill/>
+        </p:spPr>
+        <p:txBody>
+          <a:bodyPr wrap="none" rtlCol="0">
+            <a:spAutoFit/>
+          </a:bodyPr>
+          <a:lstStyle/>
+          <a:p>
+            <a:r>
+              <a:rPr lang="fr-FR" sz="3600" b="1" dirty="0" smtClean="0">
+                <a:solidFill>
+                  <a:srgbClr val="8064A2"/>
+                </a:solidFill>
+                <a:latin typeface="Symbol" charset="0"/>
+              </a:rPr>
+              <a:t>b</a:t>
+            </a:r>
+            <a:endParaRPr lang="fr-FR" sz="3600" b="1" dirty="0" smtClean="0">
+              <a:solidFill>
+                <a:srgbClr val="8064A2"/>
+              </a:solidFill>
+            </a:endParaRPr>
+          </a:p>
+        </p:txBody>
+      </p:sp>
+      <p:sp>
+        <p:nvSpPr>
+          <p:cNvPr id="9" name="Oval 60"/>
+          <p:cNvSpPr>
+            <a:spLocks noChangeArrowheads="1"/>
+          </p:cNvSpPr>
+          <p:nvPr/>
+        </p:nvSpPr>
+        <p:spPr bwMode="auto">
+          <a:xfrm rot="10800000">
+            <a:off x="820029" y="3839312"/>
+            <a:ext cx="304800" cy="152400"/>
+          </a:xfrm>
+          <a:prstGeom prst="ellipse">
+            <a:avLst/>
+          </a:prstGeom>
+          <a:solidFill>
+            <a:srgbClr val="FFFFFF"/>
+          </a:solidFill>
+          <a:ln w="19050">
+            <a:solidFill>
+              <a:schemeClr val="tx1"/>
+            </a:solidFill>
+            <a:round/>
+            <a:headEnd type="none"/>
+            <a:tailEnd type="triangle" w="lg" len="lg"/>
+          </a:ln>
+        </p:spPr>
+        <p:txBody>
+          <a:bodyPr wrap="none" anchor="ctr"/>
+          <a:lstStyle/>
+          <a:p>
+            <a:endParaRPr lang="fr-FR"/>
+          </a:p>
+        </p:txBody>
+      </p:sp>
+      <p:sp>
+        <p:nvSpPr>
+          <p:cNvPr id="10" name="Oval 61"/>
+          <p:cNvSpPr>
+            <a:spLocks noChangeArrowheads="1"/>
+          </p:cNvSpPr>
+          <p:nvPr/>
+        </p:nvSpPr>
+        <p:spPr bwMode="auto">
+          <a:xfrm rot="10800000">
+            <a:off x="1201029" y="3534512"/>
+            <a:ext cx="304800" cy="152400"/>
+          </a:xfrm>
+          <a:prstGeom prst="ellipse">
+            <a:avLst/>
+          </a:prstGeom>
+          <a:solidFill>
+            <a:srgbClr val="FFFFFF"/>
+          </a:solidFill>
+          <a:ln w="19050">
+            <a:solidFill>
+              <a:schemeClr val="tx1"/>
+            </a:solidFill>
+            <a:round/>
+            <a:headEnd type="none"/>
+            <a:tailEnd type="triangle" w="lg" len="lg"/>
+          </a:ln>
+        </p:spPr>
+        <p:txBody>
+          <a:bodyPr wrap="none" anchor="ctr"/>
+          <a:lstStyle/>
+          <a:p>
+            <a:endParaRPr lang="fr-FR"/>
+          </a:p>
+        </p:txBody>
+      </p:sp>
+      <p:sp>
+        <p:nvSpPr>
+          <p:cNvPr id="11" name="Oval 62"/>
+          <p:cNvSpPr>
+            <a:spLocks noChangeArrowheads="1"/>
+          </p:cNvSpPr>
+          <p:nvPr/>
+        </p:nvSpPr>
+        <p:spPr bwMode="auto">
+          <a:xfrm rot="10800000">
+            <a:off x="1429629" y="4067912"/>
+            <a:ext cx="304800" cy="228600"/>
+          </a:xfrm>
+          <a:prstGeom prst="ellipse">
+            <a:avLst/>
+          </a:prstGeom>
+          <a:solidFill>
+            <a:srgbClr val="FFFFFF"/>
+          </a:solidFill>
+          <a:ln w="19050">
+            <a:solidFill>
+              <a:schemeClr val="tx1"/>
+            </a:solidFill>
+            <a:round/>
+            <a:headEnd type="none"/>
+            <a:tailEnd type="triangle" w="lg" len="lg"/>
+          </a:ln>
+        </p:spPr>
+        <p:txBody>
+          <a:bodyPr wrap="none" anchor="ctr"/>
+          <a:lstStyle/>
+          <a:p>
+            <a:endParaRPr lang="fr-FR"/>
+          </a:p>
+        </p:txBody>
+      </p:sp>
+      <p:cxnSp>
+        <p:nvCxnSpPr>
+          <p:cNvPr id="12" name="AutoShape 63"/>
+          <p:cNvCxnSpPr>
+            <a:cxnSpLocks noChangeShapeType="1"/>
+            <a:stCxn id="10" idx="0"/>
+            <a:endCxn id="11" idx="4"/>
+          </p:cNvCxnSpPr>
+          <p:nvPr/>
+        </p:nvCxnSpPr>
+        <p:spPr bwMode="auto">
+          <a:xfrm>
+            <a:off x="1353429" y="3686912"/>
+            <a:ext cx="228600" cy="381000"/>
+          </a:xfrm>
+          <a:prstGeom prst="straightConnector1">
+            <a:avLst/>
+          </a:prstGeom>
+          <a:solidFill>
+            <a:srgbClr val="FFFFFF"/>
+          </a:solidFill>
+          <a:ln w="9525">
+            <a:solidFill>
+              <a:schemeClr val="tx1"/>
+            </a:solidFill>
+            <a:round/>
+            <a:headEnd type="none"/>
+            <a:tailEnd type="triangle" w="lg" len="lg"/>
+          </a:ln>
+          <a:extLst/>
+        </p:spPr>
+      </p:cxnSp>
+      <p:cxnSp>
+        <p:nvCxnSpPr>
+          <p:cNvPr id="13" name="AutoShape 64"/>
+          <p:cNvCxnSpPr>
+            <a:cxnSpLocks noChangeShapeType="1"/>
+            <a:stCxn id="11" idx="7"/>
+            <a:endCxn id="16" idx="3"/>
+          </p:cNvCxnSpPr>
+          <p:nvPr/>
+        </p:nvCxnSpPr>
+        <p:spPr bwMode="auto">
+          <a:xfrm flipH="1">
+            <a:off x="1232592" y="4263034"/>
+            <a:ext cx="241674" cy="219356"/>
+          </a:xfrm>
+          <a:prstGeom prst="straightConnector1">
+            <a:avLst/>
+          </a:prstGeom>
+          <a:solidFill>
+            <a:srgbClr val="FFFFFF"/>
+          </a:solidFill>
+          <a:ln w="9525">
+            <a:solidFill>
+              <a:schemeClr val="tx1"/>
+            </a:solidFill>
+            <a:round/>
+            <a:headEnd type="none"/>
+            <a:tailEnd type="triangle" w="lg" len="lg"/>
+          </a:ln>
+          <a:extLst/>
+        </p:spPr>
+      </p:cxnSp>
+      <p:cxnSp>
+        <p:nvCxnSpPr>
+          <p:cNvPr id="14" name="AutoShape 65"/>
+          <p:cNvCxnSpPr>
+            <a:cxnSpLocks noChangeShapeType="1"/>
+            <a:stCxn id="9" idx="0"/>
+            <a:endCxn id="16" idx="5"/>
+          </p:cNvCxnSpPr>
+          <p:nvPr/>
+        </p:nvCxnSpPr>
+        <p:spPr bwMode="auto">
+          <a:xfrm>
+            <a:off x="972429" y="3991712"/>
+            <a:ext cx="44637" cy="490678"/>
+          </a:xfrm>
+          <a:prstGeom prst="straightConnector1">
+            <a:avLst/>
+          </a:prstGeom>
+          <a:solidFill>
+            <a:srgbClr val="FFFFFF"/>
+          </a:solidFill>
+          <a:ln w="9525">
+            <a:solidFill>
+              <a:schemeClr val="tx1"/>
+            </a:solidFill>
+            <a:round/>
+            <a:headEnd type="none"/>
+            <a:tailEnd type="triangle" w="lg" len="lg"/>
+          </a:ln>
+          <a:extLst/>
+        </p:spPr>
+      </p:cxnSp>
+      <p:cxnSp>
+        <p:nvCxnSpPr>
+          <p:cNvPr id="15" name="AutoShape 66"/>
+          <p:cNvCxnSpPr>
+            <a:cxnSpLocks noChangeShapeType="1"/>
+            <a:stCxn id="10" idx="7"/>
+            <a:endCxn id="9" idx="3"/>
+          </p:cNvCxnSpPr>
+          <p:nvPr/>
+        </p:nvCxnSpPr>
+        <p:spPr bwMode="auto">
+          <a:xfrm flipH="1">
+            <a:off x="1080192" y="3664594"/>
+            <a:ext cx="165474" cy="197036"/>
+          </a:xfrm>
+          <a:prstGeom prst="straightConnector1">
+            <a:avLst/>
+          </a:prstGeom>
+          <a:solidFill>
+            <a:srgbClr val="FFFFFF"/>
+          </a:solidFill>
+          <a:ln w="9525">
+            <a:solidFill>
+              <a:schemeClr val="tx1"/>
+            </a:solidFill>
+            <a:round/>
+            <a:headEnd type="none"/>
+            <a:tailEnd type="triangle" w="lg" len="lg"/>
+          </a:ln>
+          <a:extLst/>
+        </p:spPr>
+      </p:cxnSp>
+      <p:sp>
+        <p:nvSpPr>
+          <p:cNvPr id="16" name="Oval 67"/>
+          <p:cNvSpPr>
+            <a:spLocks noChangeArrowheads="1"/>
+          </p:cNvSpPr>
+          <p:nvPr/>
+        </p:nvSpPr>
+        <p:spPr bwMode="auto">
+          <a:xfrm rot="10800000">
+            <a:off x="972429" y="4448912"/>
+            <a:ext cx="304800" cy="228600"/>
+          </a:xfrm>
+          <a:prstGeom prst="ellipse">
+            <a:avLst/>
+          </a:prstGeom>
+          <a:solidFill>
+            <a:srgbClr val="FFFFFF"/>
+          </a:solidFill>
+          <a:ln w="19050">
+            <a:solidFill>
+              <a:schemeClr val="tx1"/>
+            </a:solidFill>
+            <a:round/>
+            <a:headEnd type="none"/>
+            <a:tailEnd type="triangle" w="lg" len="lg"/>
+          </a:ln>
+        </p:spPr>
+        <p:txBody>
+          <a:bodyPr wrap="none" anchor="ctr"/>
+          <a:lstStyle/>
+          <a:p>
+            <a:endParaRPr lang="fr-FR"/>
+          </a:p>
+        </p:txBody>
+      </p:sp>
+      <p:sp>
+        <p:nvSpPr>
+          <p:cNvPr id="19" name="Oval 20"/>
+          <p:cNvSpPr>
+            <a:spLocks noChangeArrowheads="1"/>
+          </p:cNvSpPr>
+          <p:nvPr/>
+        </p:nvSpPr>
+        <p:spPr bwMode="auto">
+          <a:xfrm>
+            <a:off x="6642099" y="2164468"/>
+            <a:ext cx="978616" cy="701433"/>
+          </a:xfrm>
+          <a:prstGeom prst="ellipse">
+            <a:avLst/>
+          </a:prstGeom>
+          <a:solidFill>
+            <a:srgbClr val="FFFFFF"/>
+          </a:solidFill>
+          <a:ln w="38100">
+            <a:solidFill>
+              <a:srgbClr val="EF0118"/>
+            </a:solidFill>
+            <a:round/>
+            <a:headEnd/>
+            <a:tailEnd/>
+          </a:ln>
+        </p:spPr>
+        <p:txBody>
+          <a:bodyPr wrap="none" anchor="ctr"/>
+          <a:lstStyle/>
+          <a:p>
+            <a:r>
+              <a:rPr lang="fr-FR" dirty="0" err="1" smtClean="0"/>
+              <a:t>cog</a:t>
+            </a:r>
+            <a:r>
+              <a:rPr lang="fr-FR" dirty="0" smtClean="0"/>
+              <a:t> </a:t>
+            </a:r>
+            <a:r>
+              <a:rPr lang="fr-FR" b="1" dirty="0" smtClean="0">
+                <a:latin typeface="Symbol" charset="0"/>
+              </a:rPr>
+              <a:t>b</a:t>
+            </a:r>
+            <a:endParaRPr lang="fr-FR" b="1" dirty="0" smtClean="0"/>
+          </a:p>
+        </p:txBody>
+      </p:sp>
+      <p:sp>
+        <p:nvSpPr>
+          <p:cNvPr id="21" name="Oval 20"/>
+          <p:cNvSpPr>
+            <a:spLocks noChangeArrowheads="1"/>
+          </p:cNvSpPr>
+          <p:nvPr/>
+        </p:nvSpPr>
+        <p:spPr bwMode="auto">
+          <a:xfrm>
+            <a:off x="1048629" y="2169918"/>
+            <a:ext cx="978616" cy="701433"/>
+          </a:xfrm>
+          <a:prstGeom prst="ellipse">
+            <a:avLst/>
+          </a:prstGeom>
+          <a:solidFill>
+            <a:srgbClr val="FFFFFF"/>
+          </a:solidFill>
+          <a:ln w="38100">
+            <a:solidFill>
+              <a:srgbClr val="EF0118"/>
+            </a:solidFill>
+            <a:round/>
+            <a:headEnd/>
+            <a:tailEnd/>
+          </a:ln>
+        </p:spPr>
+        <p:txBody>
+          <a:bodyPr wrap="none" anchor="ctr"/>
+          <a:lstStyle/>
+          <a:p>
+            <a:r>
+              <a:rPr lang="fr-FR" dirty="0" err="1"/>
+              <a:t>c</a:t>
+            </a:r>
+            <a:r>
+              <a:rPr lang="fr-FR" dirty="0" err="1" smtClean="0"/>
+              <a:t>og</a:t>
+            </a:r>
+            <a:r>
+              <a:rPr lang="fr-FR" dirty="0" smtClean="0">
+                <a:solidFill>
+                  <a:srgbClr val="000000"/>
+                </a:solidFill>
+              </a:rPr>
+              <a:t> </a:t>
+            </a:r>
+            <a:r>
+              <a:rPr lang="fr-FR" b="1" dirty="0" smtClean="0">
+                <a:solidFill>
+                  <a:srgbClr val="000000"/>
+                </a:solidFill>
+                <a:latin typeface="Symbol" charset="0"/>
+              </a:rPr>
+              <a:t>a</a:t>
+            </a:r>
+            <a:endParaRPr lang="fr-FR" b="1" dirty="0" smtClean="0">
+              <a:solidFill>
+                <a:srgbClr val="000000"/>
+              </a:solidFill>
+            </a:endParaRPr>
+          </a:p>
+        </p:txBody>
+      </p:sp>
+      <p:sp>
+        <p:nvSpPr>
+          <p:cNvPr id="22" name="Rectangle 21"/>
+          <p:cNvSpPr/>
+          <p:nvPr/>
+        </p:nvSpPr>
+        <p:spPr>
+          <a:xfrm>
+            <a:off x="1666800" y="2653141"/>
+            <a:ext cx="477573" cy="230488"/>
+          </a:xfrm>
+          <a:prstGeom prst="rect">
+            <a:avLst/>
+          </a:prstGeom>
+        </p:spPr>
+        <p:style>
+          <a:lnRef idx="2">
+            <a:schemeClr val="dk1"/>
+          </a:lnRef>
+          <a:fillRef idx="1">
+            <a:schemeClr val="lt1"/>
+          </a:fillRef>
+          <a:effectRef idx="0">
+            <a:schemeClr val="dk1"/>
+          </a:effectRef>
+          <a:fontRef idx="minor">
+            <a:schemeClr val="dk1"/>
+          </a:fontRef>
+        </p:style>
+        <p:txBody>
+          <a:bodyPr rtlCol="0" anchor="ctr"/>
+          <a:lstStyle/>
+          <a:p>
+            <a:pPr algn="ctr"/>
+            <a:r>
+              <a:rPr lang="fr-FR" sz="1100" b="1" dirty="0" smtClean="0"/>
+              <a:t>ID</a:t>
+            </a:r>
+            <a:endParaRPr lang="fr-FR" sz="1100" b="1" dirty="0"/>
+          </a:p>
+        </p:txBody>
+      </p:sp>
+      <p:sp>
+        <p:nvSpPr>
+          <p:cNvPr id="23" name="Rectangle 22"/>
+          <p:cNvSpPr/>
+          <p:nvPr/>
+        </p:nvSpPr>
+        <p:spPr>
+          <a:xfrm>
+            <a:off x="1666800" y="2900222"/>
+            <a:ext cx="477574" cy="220663"/>
+          </a:xfrm>
+          <a:prstGeom prst="rect">
+            <a:avLst/>
+          </a:prstGeom>
+        </p:spPr>
+        <p:style>
+          <a:lnRef idx="2">
+            <a:schemeClr val="dk1"/>
+          </a:lnRef>
+          <a:fillRef idx="1">
+            <a:schemeClr val="lt1"/>
+          </a:fillRef>
+          <a:effectRef idx="0">
+            <a:schemeClr val="dk1"/>
+          </a:effectRef>
+          <a:fontRef idx="minor">
+            <a:schemeClr val="dk1"/>
+          </a:fontRef>
+        </p:style>
+        <p:txBody>
+          <a:bodyPr rtlCol="0" anchor="ctr"/>
+          <a:lstStyle/>
+          <a:p>
+            <a:pPr algn="ctr"/>
+            <a:r>
+              <a:rPr lang="fr-FR" sz="1100" b="1" dirty="0" err="1" smtClean="0"/>
+              <a:t>ref</a:t>
+            </a:r>
+            <a:endParaRPr lang="fr-FR" sz="1100" b="1" dirty="0"/>
+          </a:p>
+        </p:txBody>
+      </p:sp>
+      <p:sp>
+        <p:nvSpPr>
+          <p:cNvPr id="24" name="Rectangle 23"/>
+          <p:cNvSpPr/>
+          <p:nvPr/>
+        </p:nvSpPr>
+        <p:spPr>
+          <a:xfrm>
+            <a:off x="2144374" y="2653141"/>
+            <a:ext cx="282222" cy="230488"/>
+          </a:xfrm>
+          <a:prstGeom prst="rect">
+            <a:avLst/>
+          </a:prstGeom>
+        </p:spPr>
+        <p:style>
+          <a:lnRef idx="2">
+            <a:schemeClr val="dk1"/>
+          </a:lnRef>
+          <a:fillRef idx="1">
+            <a:schemeClr val="lt1"/>
+          </a:fillRef>
+          <a:effectRef idx="0">
+            <a:schemeClr val="dk1"/>
+          </a:effectRef>
+          <a:fontRef idx="minor">
+            <a:schemeClr val="dk1"/>
+          </a:fontRef>
+        </p:style>
+        <p:txBody>
+          <a:bodyPr rtlCol="0" anchor="ctr"/>
+          <a:lstStyle/>
+          <a:p>
+            <a:pPr algn="ctr"/>
+            <a:r>
+              <a:rPr lang="fr-FR" sz="1100" b="1" dirty="0" smtClean="0"/>
+              <a:t>1</a:t>
+            </a:r>
+            <a:endParaRPr lang="fr-FR" sz="1100" b="1" dirty="0"/>
+          </a:p>
+        </p:txBody>
+      </p:sp>
+      <p:sp>
+        <p:nvSpPr>
+          <p:cNvPr id="25" name="Rectangle 24"/>
+          <p:cNvSpPr/>
+          <p:nvPr/>
+        </p:nvSpPr>
+        <p:spPr>
+          <a:xfrm>
+            <a:off x="2144374" y="2890398"/>
+            <a:ext cx="282222" cy="230488"/>
+          </a:xfrm>
+          <a:prstGeom prst="rect">
+            <a:avLst/>
+          </a:prstGeom>
+        </p:spPr>
+        <p:style>
+          <a:lnRef idx="2">
+            <a:schemeClr val="dk1"/>
+          </a:lnRef>
+          <a:fillRef idx="1">
+            <a:schemeClr val="lt1"/>
+          </a:fillRef>
+          <a:effectRef idx="0">
+            <a:schemeClr val="dk1"/>
+          </a:effectRef>
+          <a:fontRef idx="minor">
+            <a:schemeClr val="dk1"/>
+          </a:fontRef>
+        </p:style>
+        <p:txBody>
+          <a:bodyPr rtlCol="0" anchor="ctr"/>
+          <a:lstStyle/>
+          <a:p>
+            <a:pPr algn="ctr"/>
+            <a:endParaRPr lang="fr-FR"/>
+          </a:p>
+        </p:txBody>
+      </p:sp>
+      <p:sp>
+        <p:nvSpPr>
+          <p:cNvPr id="26" name="Rectangle 25"/>
+          <p:cNvSpPr/>
+          <p:nvPr/>
+        </p:nvSpPr>
+        <p:spPr>
+          <a:xfrm>
+            <a:off x="2426599" y="2650570"/>
+            <a:ext cx="282222" cy="230488"/>
+          </a:xfrm>
+          <a:prstGeom prst="rect">
+            <a:avLst/>
+          </a:prstGeom>
+        </p:spPr>
+        <p:style>
+          <a:lnRef idx="2">
+            <a:schemeClr val="dk1"/>
+          </a:lnRef>
+          <a:fillRef idx="1">
+            <a:schemeClr val="lt1"/>
+          </a:fillRef>
+          <a:effectRef idx="0">
+            <a:schemeClr val="dk1"/>
+          </a:effectRef>
+          <a:fontRef idx="minor">
+            <a:schemeClr val="dk1"/>
+          </a:fontRef>
+        </p:style>
+        <p:txBody>
+          <a:bodyPr rtlCol="0" anchor="ctr"/>
+          <a:lstStyle/>
+          <a:p>
+            <a:pPr algn="ctr"/>
+            <a:r>
+              <a:rPr lang="fr-FR" sz="1100" b="1" dirty="0"/>
+              <a:t>2</a:t>
+            </a:r>
+            <a:endParaRPr lang="fr-FR" sz="1100" b="1" dirty="0"/>
+          </a:p>
+        </p:txBody>
+      </p:sp>
+      <p:sp>
+        <p:nvSpPr>
+          <p:cNvPr id="27" name="Rectangle 26"/>
+          <p:cNvSpPr/>
+          <p:nvPr/>
+        </p:nvSpPr>
+        <p:spPr>
+          <a:xfrm>
+            <a:off x="2426599" y="2887827"/>
+            <a:ext cx="282222" cy="230488"/>
+          </a:xfrm>
+          <a:prstGeom prst="rect">
+            <a:avLst/>
+          </a:prstGeom>
+        </p:spPr>
+        <p:style>
+          <a:lnRef idx="2">
+            <a:schemeClr val="dk1"/>
+          </a:lnRef>
+          <a:fillRef idx="1">
+            <a:schemeClr val="lt1"/>
+          </a:fillRef>
+          <a:effectRef idx="0">
+            <a:schemeClr val="dk1"/>
+          </a:effectRef>
+          <a:fontRef idx="minor">
+            <a:schemeClr val="dk1"/>
+          </a:fontRef>
+        </p:style>
+        <p:txBody>
+          <a:bodyPr rtlCol="0" anchor="ctr"/>
+          <a:lstStyle/>
+          <a:p>
+            <a:pPr algn="ctr"/>
+            <a:endParaRPr lang="fr-FR"/>
+          </a:p>
+        </p:txBody>
+      </p:sp>
+      <p:sp>
+        <p:nvSpPr>
+          <p:cNvPr id="28" name="Rectangle 27"/>
+          <p:cNvSpPr/>
+          <p:nvPr/>
+        </p:nvSpPr>
+        <p:spPr>
+          <a:xfrm>
+            <a:off x="2690927" y="2653141"/>
+            <a:ext cx="282222" cy="230488"/>
+          </a:xfrm>
+          <a:prstGeom prst="rect">
+            <a:avLst/>
+          </a:prstGeom>
+        </p:spPr>
+        <p:style>
+          <a:lnRef idx="2">
+            <a:schemeClr val="dk1"/>
+          </a:lnRef>
+          <a:fillRef idx="1">
+            <a:schemeClr val="lt1"/>
+          </a:fillRef>
+          <a:effectRef idx="0">
+            <a:schemeClr val="dk1"/>
+          </a:effectRef>
+          <a:fontRef idx="minor">
+            <a:schemeClr val="dk1"/>
+          </a:fontRef>
+        </p:style>
+        <p:txBody>
+          <a:bodyPr rtlCol="0" anchor="ctr"/>
+          <a:lstStyle/>
+          <a:p>
+            <a:pPr algn="ctr"/>
+            <a:r>
+              <a:rPr lang="fr-FR" sz="1100" b="1" dirty="0"/>
+              <a:t>3</a:t>
+            </a:r>
+            <a:endParaRPr lang="fr-FR" sz="1100" b="1" dirty="0"/>
+          </a:p>
+        </p:txBody>
+      </p:sp>
+      <p:sp>
+        <p:nvSpPr>
+          <p:cNvPr id="29" name="Rectangle 28"/>
+          <p:cNvSpPr/>
+          <p:nvPr/>
+        </p:nvSpPr>
+        <p:spPr>
+          <a:xfrm>
+            <a:off x="2690927" y="2890398"/>
+            <a:ext cx="282222" cy="230488"/>
+          </a:xfrm>
+          <a:prstGeom prst="rect">
+            <a:avLst/>
+          </a:prstGeom>
+        </p:spPr>
+        <p:style>
+          <a:lnRef idx="2">
+            <a:schemeClr val="dk1"/>
+          </a:lnRef>
+          <a:fillRef idx="1">
+            <a:schemeClr val="lt1"/>
+          </a:fillRef>
+          <a:effectRef idx="0">
+            <a:schemeClr val="dk1"/>
+          </a:effectRef>
+          <a:fontRef idx="minor">
+            <a:schemeClr val="dk1"/>
+          </a:fontRef>
+        </p:style>
+        <p:txBody>
+          <a:bodyPr rtlCol="0" anchor="ctr"/>
+          <a:lstStyle/>
+          <a:p>
+            <a:pPr algn="ctr"/>
+            <a:endParaRPr lang="fr-FR"/>
+          </a:p>
+        </p:txBody>
+      </p:sp>
+      <p:sp>
+        <p:nvSpPr>
+          <p:cNvPr id="30" name="Rectangle 29"/>
+          <p:cNvSpPr/>
+          <p:nvPr/>
+        </p:nvSpPr>
+        <p:spPr>
+          <a:xfrm>
+            <a:off x="2973152" y="2650570"/>
+            <a:ext cx="282222" cy="230488"/>
+          </a:xfrm>
+          <a:prstGeom prst="rect">
+            <a:avLst/>
+          </a:prstGeom>
+        </p:spPr>
+        <p:style>
+          <a:lnRef idx="2">
+            <a:schemeClr val="dk1"/>
+          </a:lnRef>
+          <a:fillRef idx="1">
+            <a:schemeClr val="lt1"/>
+          </a:fillRef>
+          <a:effectRef idx="0">
+            <a:schemeClr val="dk1"/>
+          </a:effectRef>
+          <a:fontRef idx="minor">
+            <a:schemeClr val="dk1"/>
+          </a:fontRef>
+        </p:style>
+        <p:txBody>
+          <a:bodyPr rtlCol="0" anchor="ctr"/>
+          <a:lstStyle/>
+          <a:p>
+            <a:pPr algn="ctr"/>
+            <a:r>
+              <a:rPr lang="fr-FR" sz="1100" b="1" dirty="0" smtClean="0"/>
+              <a:t>4</a:t>
+            </a:r>
+            <a:endParaRPr lang="fr-FR" sz="1100" b="1" dirty="0"/>
+          </a:p>
+        </p:txBody>
+      </p:sp>
+      <p:sp>
+        <p:nvSpPr>
+          <p:cNvPr id="31" name="Rectangle 30"/>
+          <p:cNvSpPr/>
+          <p:nvPr/>
+        </p:nvSpPr>
+        <p:spPr>
+          <a:xfrm>
+            <a:off x="2973152" y="2887827"/>
+            <a:ext cx="282222" cy="230488"/>
+          </a:xfrm>
+          <a:prstGeom prst="rect">
+            <a:avLst/>
+          </a:prstGeom>
+        </p:spPr>
+        <p:style>
+          <a:lnRef idx="2">
+            <a:schemeClr val="dk1"/>
+          </a:lnRef>
+          <a:fillRef idx="1">
+            <a:schemeClr val="lt1"/>
+          </a:fillRef>
+          <a:effectRef idx="0">
+            <a:schemeClr val="dk1"/>
+          </a:effectRef>
+          <a:fontRef idx="minor">
+            <a:schemeClr val="dk1"/>
+          </a:fontRef>
+        </p:style>
+        <p:txBody>
+          <a:bodyPr rtlCol="0" anchor="ctr"/>
+          <a:lstStyle/>
+          <a:p>
+            <a:pPr algn="ctr"/>
+            <a:endParaRPr lang="fr-FR"/>
+          </a:p>
+        </p:txBody>
+      </p:sp>
+      <p:cxnSp>
+        <p:nvCxnSpPr>
+          <p:cNvPr id="35" name="AutoShape 68"/>
+          <p:cNvCxnSpPr>
+            <a:cxnSpLocks noChangeShapeType="1"/>
+            <a:endCxn id="11" idx="2"/>
+          </p:cNvCxnSpPr>
+          <p:nvPr/>
+        </p:nvCxnSpPr>
+        <p:spPr bwMode="auto">
+          <a:xfrm flipH="1">
+            <a:off x="1734429" y="3000759"/>
+            <a:ext cx="1097609" cy="1181453"/>
+          </a:xfrm>
+          <a:prstGeom prst="straightConnector1">
+            <a:avLst/>
+          </a:prstGeom>
+          <a:solidFill>
+            <a:srgbClr val="FFFFFF"/>
+          </a:solidFill>
+          <a:ln w="9525">
+            <a:solidFill>
+              <a:schemeClr val="tx1"/>
+            </a:solidFill>
+            <a:round/>
+            <a:headEnd type="none"/>
+            <a:tailEnd type="triangle" w="lg" len="lg"/>
+          </a:ln>
+          <a:extLst/>
+        </p:spPr>
+      </p:cxnSp>
+      <p:cxnSp>
+        <p:nvCxnSpPr>
+          <p:cNvPr id="43" name="Connecteur en arc 42"/>
+          <p:cNvCxnSpPr>
+            <a:endCxn id="9" idx="5"/>
+          </p:cNvCxnSpPr>
+          <p:nvPr/>
+        </p:nvCxnSpPr>
+        <p:spPr>
+          <a:xfrm rot="5400000">
+            <a:off x="1144641" y="2720785"/>
+            <a:ext cx="860871" cy="1420819"/>
+          </a:xfrm>
+          <a:prstGeom prst="curvedConnector3">
+            <a:avLst>
+              <a:gd name="adj1" fmla="val 22092"/>
+            </a:avLst>
+          </a:prstGeom>
+          <a:ln w="9525" cmpd="sng">
+            <a:solidFill>
+              <a:schemeClr val="tx1"/>
+            </a:solidFill>
+            <a:headEnd type="none"/>
+            <a:tailEnd type="triangle" w="lg" len="lg"/>
+          </a:ln>
+        </p:spPr>
+        <p:style>
+          <a:lnRef idx="2">
+            <a:schemeClr val="accent1"/>
+          </a:lnRef>
+          <a:fillRef idx="0">
+            <a:schemeClr val="accent1"/>
+          </a:fillRef>
+          <a:effectRef idx="1">
+            <a:schemeClr val="accent1"/>
+          </a:effectRef>
+          <a:fontRef idx="minor">
+            <a:schemeClr val="tx1"/>
+          </a:fontRef>
+        </p:style>
+      </p:cxnSp>
+      <p:cxnSp>
+        <p:nvCxnSpPr>
+          <p:cNvPr id="50" name="Connecteur en arc 49"/>
+          <p:cNvCxnSpPr>
+            <a:endCxn id="16" idx="2"/>
+          </p:cNvCxnSpPr>
+          <p:nvPr/>
+        </p:nvCxnSpPr>
+        <p:spPr>
+          <a:xfrm rot="5400000">
+            <a:off x="1413234" y="2862183"/>
+            <a:ext cx="1565024" cy="1837034"/>
+          </a:xfrm>
+          <a:prstGeom prst="curvedConnector2">
+            <a:avLst/>
+          </a:prstGeom>
+          <a:ln w="9525" cmpd="sng">
+            <a:solidFill>
+              <a:schemeClr val="tx1"/>
+            </a:solidFill>
+            <a:headEnd type="none"/>
+            <a:tailEnd type="triangle" w="lg" len="lg"/>
+          </a:ln>
+        </p:spPr>
+        <p:style>
+          <a:lnRef idx="2">
+            <a:schemeClr val="accent1"/>
+          </a:lnRef>
+          <a:fillRef idx="0">
+            <a:schemeClr val="accent1"/>
+          </a:fillRef>
+          <a:effectRef idx="1">
+            <a:schemeClr val="accent1"/>
+          </a:effectRef>
+          <a:fontRef idx="minor">
+            <a:schemeClr val="tx1"/>
+          </a:fontRef>
+        </p:style>
+      </p:cxnSp>
+      <p:cxnSp>
+        <p:nvCxnSpPr>
+          <p:cNvPr id="17" name="AutoShape 68"/>
+          <p:cNvCxnSpPr>
+            <a:cxnSpLocks noChangeShapeType="1"/>
+            <a:endCxn id="10" idx="3"/>
+          </p:cNvCxnSpPr>
+          <p:nvPr/>
+        </p:nvCxnSpPr>
+        <p:spPr bwMode="auto">
+          <a:xfrm flipH="1">
+            <a:off x="1461192" y="2998188"/>
+            <a:ext cx="1106518" cy="558642"/>
+          </a:xfrm>
+          <a:prstGeom prst="straightConnector1">
+            <a:avLst/>
+          </a:prstGeom>
+          <a:solidFill>
+            <a:srgbClr val="FFFFFF"/>
+          </a:solidFill>
+          <a:ln w="9525">
+            <a:solidFill>
+              <a:schemeClr val="tx1"/>
+            </a:solidFill>
+            <a:round/>
+            <a:headEnd type="none"/>
+            <a:tailEnd type="triangle" w="lg" len="lg"/>
+          </a:ln>
+          <a:extLst/>
+        </p:spPr>
+      </p:cxnSp>
+      <p:sp>
+        <p:nvSpPr>
+          <p:cNvPr id="54" name="AutoShape 73"/>
+          <p:cNvSpPr>
+            <a:spLocks noChangeArrowheads="1"/>
+          </p:cNvSpPr>
+          <p:nvPr/>
+        </p:nvSpPr>
+        <p:spPr bwMode="auto">
+          <a:xfrm>
+            <a:off x="1174245" y="4666178"/>
+            <a:ext cx="1888843" cy="228600"/>
+          </a:xfrm>
+          <a:prstGeom prst="roundRect">
+            <a:avLst>
+              <a:gd name="adj" fmla="val 50000"/>
+            </a:avLst>
+          </a:prstGeom>
+          <a:solidFill>
+            <a:srgbClr val="FFFFFF"/>
+          </a:solidFill>
+          <a:ln w="19050">
+            <a:solidFill>
+              <a:srgbClr val="080808"/>
+            </a:solidFill>
+            <a:round/>
+            <a:headEnd/>
+            <a:tailEnd/>
+          </a:ln>
+        </p:spPr>
+        <p:txBody>
+          <a:bodyPr wrap="none" anchor="ctr"/>
+          <a:lstStyle/>
+          <a:p>
+            <a:pPr algn="ctr"/>
+            <a:r>
+              <a:rPr lang="fr-FR" sz="1400" b="1">
+                <a:solidFill>
+                  <a:srgbClr val="000000"/>
+                </a:solidFill>
+              </a:rPr>
+              <a:t>s</a:t>
+            </a:r>
+            <a:r>
+              <a:rPr lang="fr-FR" sz="1400" b="1" smtClean="0">
+                <a:solidFill>
+                  <a:srgbClr val="000000"/>
+                </a:solidFill>
+              </a:rPr>
+              <a:t>!</a:t>
+            </a:r>
+            <a:r>
+              <a:rPr lang="fr-FR" sz="1400" b="1" dirty="0" err="1" smtClean="0">
+                <a:solidFill>
+                  <a:srgbClr val="000000"/>
+                </a:solidFill>
+              </a:rPr>
+              <a:t>start</a:t>
+            </a:r>
+            <a:r>
+              <a:rPr lang="fr-FR" sz="1400" b="1" dirty="0" smtClean="0">
+                <a:solidFill>
+                  <a:srgbClr val="000000"/>
+                </a:solidFill>
+              </a:rPr>
+              <a:t>()</a:t>
+            </a:r>
+            <a:endParaRPr lang="fr-FR" sz="1400" b="1" dirty="0">
+              <a:solidFill>
+                <a:srgbClr val="000000"/>
+              </a:solidFill>
+            </a:endParaRPr>
+          </a:p>
+        </p:txBody>
+      </p:sp>
+      <p:sp>
+        <p:nvSpPr>
+          <p:cNvPr id="55" name="Rectangle 54"/>
+          <p:cNvSpPr/>
+          <p:nvPr/>
+        </p:nvSpPr>
+        <p:spPr>
+          <a:xfrm>
+            <a:off x="7000293" y="2691188"/>
+            <a:ext cx="477573" cy="230488"/>
+          </a:xfrm>
+          <a:prstGeom prst="rect">
+            <a:avLst/>
+          </a:prstGeom>
+        </p:spPr>
+        <p:style>
+          <a:lnRef idx="2">
+            <a:schemeClr val="dk1"/>
+          </a:lnRef>
+          <a:fillRef idx="1">
+            <a:schemeClr val="lt1"/>
+          </a:fillRef>
+          <a:effectRef idx="0">
+            <a:schemeClr val="dk1"/>
+          </a:effectRef>
+          <a:fontRef idx="minor">
+            <a:schemeClr val="dk1"/>
+          </a:fontRef>
+        </p:style>
+        <p:txBody>
+          <a:bodyPr rtlCol="0" anchor="ctr"/>
+          <a:lstStyle/>
+          <a:p>
+            <a:pPr algn="ctr"/>
+            <a:r>
+              <a:rPr lang="fr-FR" sz="1100" b="1" dirty="0" smtClean="0"/>
+              <a:t>ID</a:t>
+            </a:r>
+            <a:endParaRPr lang="fr-FR" sz="1100" b="1" dirty="0"/>
+          </a:p>
+        </p:txBody>
+      </p:sp>
+      <p:sp>
+        <p:nvSpPr>
+          <p:cNvPr id="56" name="Rectangle 55"/>
+          <p:cNvSpPr/>
+          <p:nvPr/>
+        </p:nvSpPr>
+        <p:spPr>
+          <a:xfrm>
+            <a:off x="7000293" y="2938269"/>
+            <a:ext cx="477574" cy="220663"/>
+          </a:xfrm>
+          <a:prstGeom prst="rect">
+            <a:avLst/>
+          </a:prstGeom>
+        </p:spPr>
+        <p:style>
+          <a:lnRef idx="2">
+            <a:schemeClr val="dk1"/>
+          </a:lnRef>
+          <a:fillRef idx="1">
+            <a:schemeClr val="lt1"/>
+          </a:fillRef>
+          <a:effectRef idx="0">
+            <a:schemeClr val="dk1"/>
+          </a:effectRef>
+          <a:fontRef idx="minor">
+            <a:schemeClr val="dk1"/>
+          </a:fontRef>
+        </p:style>
+        <p:txBody>
+          <a:bodyPr rtlCol="0" anchor="ctr"/>
+          <a:lstStyle/>
+          <a:p>
+            <a:pPr algn="ctr"/>
+            <a:r>
+              <a:rPr lang="fr-FR" sz="1100" b="1" dirty="0" err="1" smtClean="0"/>
+              <a:t>ref</a:t>
+            </a:r>
+            <a:endParaRPr lang="fr-FR" sz="1100" b="1" dirty="0"/>
+          </a:p>
+        </p:txBody>
+      </p:sp>
+      <p:sp>
+        <p:nvSpPr>
+          <p:cNvPr id="57" name="Rectangle 56"/>
+          <p:cNvSpPr/>
+          <p:nvPr/>
+        </p:nvSpPr>
+        <p:spPr>
+          <a:xfrm>
+            <a:off x="7477867" y="2691188"/>
+            <a:ext cx="282222" cy="230488"/>
+          </a:xfrm>
+          <a:prstGeom prst="rect">
+            <a:avLst/>
+          </a:prstGeom>
+        </p:spPr>
+        <p:style>
+          <a:lnRef idx="2">
+            <a:schemeClr val="dk1"/>
+          </a:lnRef>
+          <a:fillRef idx="1">
+            <a:schemeClr val="lt1"/>
+          </a:fillRef>
+          <a:effectRef idx="0">
+            <a:schemeClr val="dk1"/>
+          </a:effectRef>
+          <a:fontRef idx="minor">
+            <a:schemeClr val="dk1"/>
+          </a:fontRef>
+        </p:style>
+        <p:txBody>
+          <a:bodyPr rtlCol="0" anchor="ctr"/>
+          <a:lstStyle/>
+          <a:p>
+            <a:pPr algn="ctr"/>
+            <a:r>
+              <a:rPr lang="fr-FR" sz="1100" b="1" dirty="0" smtClean="0"/>
+              <a:t>1</a:t>
+            </a:r>
+            <a:endParaRPr lang="fr-FR" sz="1100" b="1" dirty="0"/>
+          </a:p>
+        </p:txBody>
+      </p:sp>
+      <p:sp>
+        <p:nvSpPr>
+          <p:cNvPr id="58" name="Rectangle 57"/>
+          <p:cNvSpPr/>
+          <p:nvPr/>
+        </p:nvSpPr>
+        <p:spPr>
+          <a:xfrm>
+            <a:off x="7477867" y="2928445"/>
+            <a:ext cx="282222" cy="230488"/>
+          </a:xfrm>
+          <a:prstGeom prst="rect">
+            <a:avLst/>
+          </a:prstGeom>
+        </p:spPr>
+        <p:style>
+          <a:lnRef idx="2">
+            <a:schemeClr val="dk1"/>
+          </a:lnRef>
+          <a:fillRef idx="1">
+            <a:schemeClr val="lt1"/>
+          </a:fillRef>
+          <a:effectRef idx="0">
+            <a:schemeClr val="dk1"/>
+          </a:effectRef>
+          <a:fontRef idx="minor">
+            <a:schemeClr val="dk1"/>
+          </a:fontRef>
+        </p:style>
+        <p:txBody>
+          <a:bodyPr rtlCol="0" anchor="ctr"/>
+          <a:lstStyle/>
+          <a:p>
+            <a:pPr algn="ctr"/>
+            <a:endParaRPr lang="fr-FR"/>
+          </a:p>
+        </p:txBody>
+      </p:sp>
+      <p:sp>
+        <p:nvSpPr>
+          <p:cNvPr id="65" name="Oval 67"/>
+          <p:cNvSpPr>
+            <a:spLocks noChangeArrowheads="1"/>
+          </p:cNvSpPr>
+          <p:nvPr/>
+        </p:nvSpPr>
+        <p:spPr bwMode="auto">
+          <a:xfrm rot="10800000">
+            <a:off x="7928234" y="3160441"/>
+            <a:ext cx="304800" cy="228600"/>
+          </a:xfrm>
+          <a:prstGeom prst="ellipse">
+            <a:avLst/>
+          </a:prstGeom>
+          <a:solidFill>
+            <a:srgbClr val="FFFFFF"/>
+          </a:solidFill>
+          <a:ln w="19050">
+            <a:solidFill>
+              <a:schemeClr val="tx1"/>
+            </a:solidFill>
+            <a:round/>
+            <a:headEnd type="none"/>
+            <a:tailEnd type="triangle" w="lg" len="lg"/>
+          </a:ln>
+        </p:spPr>
+        <p:txBody>
+          <a:bodyPr wrap="none" anchor="ctr"/>
+          <a:lstStyle/>
+          <a:p>
+            <a:endParaRPr lang="fr-FR"/>
+          </a:p>
+        </p:txBody>
+      </p:sp>
+      <p:cxnSp>
+        <p:nvCxnSpPr>
+          <p:cNvPr id="66" name="AutoShape 68"/>
+          <p:cNvCxnSpPr>
+            <a:cxnSpLocks noChangeShapeType="1"/>
+            <a:endCxn id="65" idx="5"/>
+          </p:cNvCxnSpPr>
+          <p:nvPr/>
+        </p:nvCxnSpPr>
+        <p:spPr bwMode="auto">
+          <a:xfrm>
+            <a:off x="7618978" y="3036039"/>
+            <a:ext cx="353893" cy="157880"/>
+          </a:xfrm>
+          <a:prstGeom prst="straightConnector1">
+            <a:avLst/>
+          </a:prstGeom>
+          <a:solidFill>
+            <a:srgbClr val="FFFFFF"/>
+          </a:solidFill>
+          <a:ln w="9525">
+            <a:solidFill>
+              <a:schemeClr val="tx1"/>
+            </a:solidFill>
+            <a:round/>
+            <a:headEnd type="none"/>
+            <a:tailEnd type="triangle" w="lg" len="lg"/>
+          </a:ln>
+          <a:extLst/>
+        </p:spPr>
+      </p:cxnSp>
+      <p:cxnSp>
+        <p:nvCxnSpPr>
+          <p:cNvPr id="74" name="Connecteur en arc 73"/>
+          <p:cNvCxnSpPr>
+            <a:stCxn id="54" idx="3"/>
+            <a:endCxn id="19" idx="2"/>
+          </p:cNvCxnSpPr>
+          <p:nvPr/>
+        </p:nvCxnSpPr>
+        <p:spPr>
+          <a:xfrm flipV="1">
+            <a:off x="3063088" y="2515185"/>
+            <a:ext cx="3579011" cy="2265293"/>
+          </a:xfrm>
+          <a:prstGeom prst="curvedConnector3">
+            <a:avLst>
+              <a:gd name="adj1" fmla="val 50000"/>
+            </a:avLst>
+          </a:prstGeom>
+          <a:ln w="28575" cmpd="sng">
+            <a:solidFill>
+              <a:srgbClr val="FF0000"/>
+            </a:solidFill>
+            <a:prstDash val="dash"/>
+            <a:tailEnd type="arrow"/>
+          </a:ln>
+        </p:spPr>
+        <p:style>
+          <a:lnRef idx="2">
+            <a:schemeClr val="accent1"/>
+          </a:lnRef>
+          <a:fillRef idx="0">
+            <a:schemeClr val="accent1"/>
+          </a:fillRef>
+          <a:effectRef idx="1">
+            <a:schemeClr val="accent1"/>
+          </a:effectRef>
+          <a:fontRef idx="minor">
+            <a:schemeClr val="tx1"/>
+          </a:fontRef>
+        </p:style>
+      </p:cxnSp>
+      <p:sp>
+        <p:nvSpPr>
+          <p:cNvPr id="39" name="AutoShape 73"/>
+          <p:cNvSpPr>
+            <a:spLocks noChangeArrowheads="1"/>
+          </p:cNvSpPr>
+          <p:nvPr/>
+        </p:nvSpPr>
+        <p:spPr bwMode="auto">
+          <a:xfrm>
+            <a:off x="3477772" y="2328956"/>
+            <a:ext cx="2530604" cy="228600"/>
+          </a:xfrm>
+          <a:prstGeom prst="roundRect">
+            <a:avLst>
+              <a:gd name="adj" fmla="val 50000"/>
+            </a:avLst>
+          </a:prstGeom>
+          <a:solidFill>
+            <a:srgbClr val="FFFFFF"/>
+          </a:solidFill>
+          <a:ln w="19050">
+            <a:solidFill>
+              <a:srgbClr val="080808"/>
+            </a:solidFill>
+            <a:round/>
+            <a:headEnd/>
+            <a:tailEnd/>
+          </a:ln>
+        </p:spPr>
+        <p:txBody>
+          <a:bodyPr wrap="none" anchor="ctr"/>
+          <a:lstStyle/>
+          <a:p>
+            <a:pPr algn="ctr"/>
+            <a:r>
+              <a:rPr lang="fr-FR" sz="1400" b="1" dirty="0" err="1" smtClean="0"/>
+              <a:t>cog</a:t>
+            </a:r>
+            <a:r>
+              <a:rPr lang="fr-FR" sz="1400" b="1" dirty="0" smtClean="0"/>
+              <a:t> </a:t>
+            </a:r>
+            <a:r>
+              <a:rPr lang="fr-FR" sz="1400" b="1" dirty="0" err="1" smtClean="0">
+                <a:latin typeface="Symbol" charset="0"/>
+              </a:rPr>
+              <a:t>b</a:t>
+            </a:r>
+            <a:r>
+              <a:rPr lang="fr-FR" sz="1400" b="1" dirty="0" err="1" smtClean="0">
+                <a:solidFill>
+                  <a:srgbClr val="000000"/>
+                </a:solidFill>
+              </a:rPr>
+              <a:t>.execute</a:t>
+            </a:r>
+            <a:r>
+              <a:rPr lang="fr-FR" sz="1400" b="1" dirty="0" smtClean="0">
+                <a:solidFill>
+                  <a:srgbClr val="000000"/>
+                </a:solidFill>
+              </a:rPr>
+              <a:t>("</a:t>
+            </a:r>
+            <a:r>
+              <a:rPr lang="fr-FR" sz="1400" b="1" dirty="0" err="1" smtClean="0">
+                <a:solidFill>
+                  <a:srgbClr val="000000"/>
+                </a:solidFill>
+              </a:rPr>
+              <a:t>start</a:t>
+            </a:r>
+            <a:r>
+              <a:rPr lang="fr-FR" sz="1400" b="1" dirty="0" smtClean="0">
+                <a:solidFill>
+                  <a:srgbClr val="000000"/>
+                </a:solidFill>
+              </a:rPr>
+              <a:t>", </a:t>
+            </a:r>
+            <a:r>
+              <a:rPr lang="fr-FR" sz="1400" b="1" dirty="0" err="1" smtClean="0">
+                <a:solidFill>
+                  <a:srgbClr val="000000"/>
+                </a:solidFill>
+              </a:rPr>
+              <a:t>s.getId</a:t>
+            </a:r>
+            <a:r>
+              <a:rPr lang="fr-FR" sz="1400" b="1" dirty="0" smtClean="0">
+                <a:solidFill>
+                  <a:srgbClr val="000000"/>
+                </a:solidFill>
+              </a:rPr>
+              <a:t>())</a:t>
+            </a:r>
+            <a:endParaRPr lang="fr-FR" sz="1400" b="1" dirty="0">
+              <a:solidFill>
+                <a:srgbClr val="000000"/>
+              </a:solidFill>
+            </a:endParaRPr>
+          </a:p>
+        </p:txBody>
+      </p:sp>
+      <p:sp>
+        <p:nvSpPr>
+          <p:cNvPr id="40" name="AutoShape 73"/>
+          <p:cNvSpPr>
+            <a:spLocks noChangeArrowheads="1"/>
+          </p:cNvSpPr>
+          <p:nvPr/>
+        </p:nvSpPr>
+        <p:spPr bwMode="auto">
+          <a:xfrm>
+            <a:off x="5187713" y="3447458"/>
+            <a:ext cx="2990701" cy="1333019"/>
+          </a:xfrm>
+          <a:prstGeom prst="roundRect">
+            <a:avLst>
+              <a:gd name="adj" fmla="val 14233"/>
+            </a:avLst>
+          </a:prstGeom>
+          <a:solidFill>
+            <a:srgbClr val="FFFFFF"/>
+          </a:solidFill>
+          <a:ln w="19050">
+            <a:solidFill>
+              <a:srgbClr val="080808"/>
+            </a:solidFill>
+            <a:round/>
+            <a:headEnd/>
+            <a:tailEnd/>
+          </a:ln>
+        </p:spPr>
+        <p:txBody>
+          <a:bodyPr wrap="none" anchor="ctr"/>
+          <a:lstStyle/>
+          <a:p>
+            <a:r>
+              <a:rPr lang="fr-FR" sz="1400" b="1" dirty="0" err="1"/>
+              <a:t>e</a:t>
+            </a:r>
+            <a:r>
+              <a:rPr lang="fr-FR" sz="1400" b="1" dirty="0" err="1" smtClean="0"/>
+              <a:t>xecute</a:t>
+            </a:r>
+            <a:r>
+              <a:rPr lang="fr-FR" sz="1400" b="1" dirty="0" smtClean="0">
+                <a:solidFill>
+                  <a:srgbClr val="000000"/>
+                </a:solidFill>
+              </a:rPr>
+              <a:t>(</a:t>
+            </a:r>
+            <a:r>
+              <a:rPr lang="fr-FR" sz="1400" b="1" dirty="0" err="1" smtClean="0">
+                <a:solidFill>
+                  <a:srgbClr val="000000"/>
+                </a:solidFill>
+              </a:rPr>
+              <a:t>name</a:t>
+            </a:r>
+            <a:r>
+              <a:rPr lang="fr-FR" sz="1400" b="1" dirty="0" smtClean="0">
+                <a:solidFill>
+                  <a:srgbClr val="000000"/>
+                </a:solidFill>
+              </a:rPr>
+              <a:t>,  identifier, </a:t>
+            </a:r>
+            <a:r>
+              <a:rPr lang="fr-FR" sz="1400" b="1" dirty="0" err="1" smtClean="0">
+                <a:solidFill>
+                  <a:srgbClr val="000000"/>
+                </a:solidFill>
+              </a:rPr>
+              <a:t>params</a:t>
+            </a:r>
+            <a:r>
+              <a:rPr lang="fr-FR" sz="1400" b="1" dirty="0" smtClean="0">
+                <a:solidFill>
+                  <a:srgbClr val="000000"/>
+                </a:solidFill>
+              </a:rPr>
+              <a:t>[]) {</a:t>
+            </a:r>
+          </a:p>
+          <a:p>
+            <a:r>
+              <a:rPr lang="fr-FR" sz="1400" b="1" dirty="0" smtClean="0">
+                <a:solidFill>
+                  <a:srgbClr val="000000"/>
+                </a:solidFill>
+              </a:rPr>
+              <a:t>   m</a:t>
+            </a:r>
+            <a:r>
+              <a:rPr lang="fr-FR" sz="1400" b="1" dirty="0" smtClean="0">
+                <a:solidFill>
+                  <a:srgbClr val="000000"/>
+                </a:solidFill>
+              </a:rPr>
+              <a:t> = </a:t>
+            </a:r>
+            <a:r>
+              <a:rPr lang="fr-FR" sz="1400" b="1" dirty="0" err="1" smtClean="0">
+                <a:solidFill>
+                  <a:srgbClr val="000000"/>
+                </a:solidFill>
+              </a:rPr>
+              <a:t>retrieveMethod</a:t>
+            </a:r>
+            <a:r>
+              <a:rPr lang="fr-FR" sz="1400" b="1" dirty="0" smtClean="0">
+                <a:solidFill>
+                  <a:srgbClr val="000000"/>
+                </a:solidFill>
+              </a:rPr>
+              <a:t>(</a:t>
+            </a:r>
+            <a:r>
+              <a:rPr lang="fr-FR" sz="1400" b="1" dirty="0" err="1" smtClean="0">
+                <a:solidFill>
+                  <a:srgbClr val="000000"/>
+                </a:solidFill>
+              </a:rPr>
+              <a:t>name</a:t>
+            </a:r>
+            <a:r>
+              <a:rPr lang="fr-FR" sz="1400" b="1" dirty="0" smtClean="0">
+                <a:solidFill>
+                  <a:srgbClr val="000000"/>
+                </a:solidFill>
+              </a:rPr>
+              <a:t>, </a:t>
+            </a:r>
+            <a:r>
+              <a:rPr lang="fr-FR" sz="1400" b="1" dirty="0" err="1" smtClean="0">
+                <a:solidFill>
+                  <a:srgbClr val="000000"/>
+                </a:solidFill>
+              </a:rPr>
+              <a:t>params</a:t>
+            </a:r>
+            <a:r>
+              <a:rPr lang="fr-FR" sz="1400" b="1" dirty="0" smtClean="0">
+                <a:solidFill>
+                  <a:srgbClr val="000000"/>
+                </a:solidFill>
+              </a:rPr>
+              <a:t>)</a:t>
+            </a:r>
+          </a:p>
+          <a:p>
+            <a:r>
+              <a:rPr lang="fr-FR" sz="1400" b="1" dirty="0" smtClean="0">
+                <a:solidFill>
+                  <a:srgbClr val="000000"/>
+                </a:solidFill>
+              </a:rPr>
+              <a:t>   o = </a:t>
+            </a:r>
+            <a:r>
+              <a:rPr lang="fr-FR" sz="1400" b="1" dirty="0" err="1" smtClean="0">
+                <a:solidFill>
+                  <a:srgbClr val="000000"/>
+                </a:solidFill>
+              </a:rPr>
+              <a:t>retrieveObject</a:t>
+            </a:r>
+            <a:r>
+              <a:rPr lang="fr-FR" sz="1400" b="1" dirty="0" smtClean="0">
+                <a:solidFill>
+                  <a:srgbClr val="000000"/>
+                </a:solidFill>
+              </a:rPr>
+              <a:t>(id)</a:t>
+            </a:r>
+          </a:p>
+          <a:p>
+            <a:r>
+              <a:rPr lang="fr-FR" sz="1400" b="1" dirty="0" smtClean="0">
+                <a:solidFill>
+                  <a:srgbClr val="000000"/>
+                </a:solidFill>
+              </a:rPr>
+              <a:t>   r = </a:t>
+            </a:r>
+            <a:r>
+              <a:rPr lang="fr-FR" sz="1400" b="1" dirty="0" err="1" smtClean="0">
+                <a:solidFill>
+                  <a:srgbClr val="000000"/>
+                </a:solidFill>
+              </a:rPr>
+              <a:t>o.m</a:t>
+            </a:r>
+            <a:r>
+              <a:rPr lang="fr-FR" sz="1400" b="1" dirty="0" smtClean="0">
+                <a:solidFill>
+                  <a:srgbClr val="000000"/>
+                </a:solidFill>
+              </a:rPr>
+              <a:t>(</a:t>
+            </a:r>
+            <a:r>
+              <a:rPr lang="fr-FR" sz="1400" b="1" dirty="0" err="1" smtClean="0">
+                <a:solidFill>
+                  <a:srgbClr val="000000"/>
+                </a:solidFill>
+              </a:rPr>
+              <a:t>params</a:t>
+            </a:r>
+            <a:r>
+              <a:rPr lang="fr-FR" sz="1400" b="1" dirty="0" smtClean="0">
+                <a:solidFill>
+                  <a:srgbClr val="000000"/>
+                </a:solidFill>
+              </a:rPr>
+              <a:t>)</a:t>
+            </a:r>
+          </a:p>
+          <a:p>
+            <a:r>
+              <a:rPr lang="fr-FR" sz="1400" b="1" dirty="0" smtClean="0">
+                <a:solidFill>
+                  <a:srgbClr val="000000"/>
+                </a:solidFill>
+              </a:rPr>
+              <a:t>   return r</a:t>
+            </a:r>
+          </a:p>
+          <a:p>
+            <a:r>
+              <a:rPr lang="fr-FR" sz="1400" b="1" dirty="0" smtClean="0">
+                <a:solidFill>
+                  <a:srgbClr val="000000"/>
+                </a:solidFill>
+              </a:rPr>
+              <a:t>}</a:t>
+            </a:r>
+            <a:endParaRPr lang="fr-FR" sz="1400" b="1" dirty="0">
+              <a:solidFill>
+                <a:srgbClr val="000000"/>
+              </a:solidFill>
+            </a:endParaRPr>
+          </a:p>
+        </p:txBody>
+      </p:sp>
+    </p:spTree>
+    <p:extLst>
+      <p:ext uri="{BB962C8B-B14F-4D97-AF65-F5344CB8AC3E}">
+        <p14:creationId xmlns:p14="http://schemas.microsoft.com/office/powerpoint/2010/main" val="797638795"/>
       </p:ext>
     </p:extLst>
   </p:cSld>

</xml_diff>

<commit_message>
Added two benchmarks and their explanation about the ProActive backend for ABS.
</commit_message>
<xml_diff>
--- a/resources/drawings-ABS-PA.pptx
+++ b/resources/drawings-ABS-PA.pptx
@@ -291,7 +291,7 @@
           <a:p>
             <a:fld id="{051EC6C9-E916-2547-B427-7FDBC687BD29}" type="datetimeFigureOut">
               <a:rPr lang="fr-FR" smtClean="0"/>
-              <a:t>05/02/16</a:t>
+              <a:t>07/03/16</a:t>
             </a:fld>
             <a:endParaRPr lang="fr-FR"/>
           </a:p>
@@ -461,7 +461,7 @@
           <a:p>
             <a:fld id="{051EC6C9-E916-2547-B427-7FDBC687BD29}" type="datetimeFigureOut">
               <a:rPr lang="fr-FR" smtClean="0"/>
-              <a:t>05/02/16</a:t>
+              <a:t>07/03/16</a:t>
             </a:fld>
             <a:endParaRPr lang="fr-FR"/>
           </a:p>
@@ -641,7 +641,7 @@
           <a:p>
             <a:fld id="{051EC6C9-E916-2547-B427-7FDBC687BD29}" type="datetimeFigureOut">
               <a:rPr lang="fr-FR" smtClean="0"/>
-              <a:t>05/02/16</a:t>
+              <a:t>07/03/16</a:t>
             </a:fld>
             <a:endParaRPr lang="fr-FR"/>
           </a:p>
@@ -811,7 +811,7 @@
           <a:p>
             <a:fld id="{051EC6C9-E916-2547-B427-7FDBC687BD29}" type="datetimeFigureOut">
               <a:rPr lang="fr-FR" smtClean="0"/>
-              <a:t>05/02/16</a:t>
+              <a:t>07/03/16</a:t>
             </a:fld>
             <a:endParaRPr lang="fr-FR"/>
           </a:p>
@@ -1057,7 +1057,7 @@
           <a:p>
             <a:fld id="{051EC6C9-E916-2547-B427-7FDBC687BD29}" type="datetimeFigureOut">
               <a:rPr lang="fr-FR" smtClean="0"/>
-              <a:t>05/02/16</a:t>
+              <a:t>07/03/16</a:t>
             </a:fld>
             <a:endParaRPr lang="fr-FR"/>
           </a:p>
@@ -1345,7 +1345,7 @@
           <a:p>
             <a:fld id="{051EC6C9-E916-2547-B427-7FDBC687BD29}" type="datetimeFigureOut">
               <a:rPr lang="fr-FR" smtClean="0"/>
-              <a:t>05/02/16</a:t>
+              <a:t>07/03/16</a:t>
             </a:fld>
             <a:endParaRPr lang="fr-FR"/>
           </a:p>
@@ -1767,7 +1767,7 @@
           <a:p>
             <a:fld id="{051EC6C9-E916-2547-B427-7FDBC687BD29}" type="datetimeFigureOut">
               <a:rPr lang="fr-FR" smtClean="0"/>
-              <a:t>05/02/16</a:t>
+              <a:t>07/03/16</a:t>
             </a:fld>
             <a:endParaRPr lang="fr-FR"/>
           </a:p>
@@ -1885,7 +1885,7 @@
           <a:p>
             <a:fld id="{051EC6C9-E916-2547-B427-7FDBC687BD29}" type="datetimeFigureOut">
               <a:rPr lang="fr-FR" smtClean="0"/>
-              <a:t>05/02/16</a:t>
+              <a:t>07/03/16</a:t>
             </a:fld>
             <a:endParaRPr lang="fr-FR"/>
           </a:p>
@@ -1980,7 +1980,7 @@
           <a:p>
             <a:fld id="{051EC6C9-E916-2547-B427-7FDBC687BD29}" type="datetimeFigureOut">
               <a:rPr lang="fr-FR" smtClean="0"/>
-              <a:t>05/02/16</a:t>
+              <a:t>07/03/16</a:t>
             </a:fld>
             <a:endParaRPr lang="fr-FR"/>
           </a:p>
@@ -2257,7 +2257,7 @@
           <a:p>
             <a:fld id="{051EC6C9-E916-2547-B427-7FDBC687BD29}" type="datetimeFigureOut">
               <a:rPr lang="fr-FR" smtClean="0"/>
-              <a:t>05/02/16</a:t>
+              <a:t>07/03/16</a:t>
             </a:fld>
             <a:endParaRPr lang="fr-FR"/>
           </a:p>
@@ -2510,7 +2510,7 @@
           <a:p>
             <a:fld id="{051EC6C9-E916-2547-B427-7FDBC687BD29}" type="datetimeFigureOut">
               <a:rPr lang="fr-FR" smtClean="0"/>
-              <a:t>05/02/16</a:t>
+              <a:t>07/03/16</a:t>
             </a:fld>
             <a:endParaRPr lang="fr-FR"/>
           </a:p>
@@ -2723,7 +2723,7 @@
           <a:p>
             <a:fld id="{051EC6C9-E916-2547-B427-7FDBC687BD29}" type="datetimeFigureOut">
               <a:rPr lang="fr-FR" smtClean="0"/>
-              <a:t>05/02/16</a:t>
+              <a:t>07/03/16</a:t>
             </a:fld>
             <a:endParaRPr lang="fr-FR"/>
           </a:p>
@@ -10012,11 +10012,11 @@
         <p:spPr bwMode="auto">
           <a:xfrm>
             <a:off x="154476" y="2120980"/>
-            <a:ext cx="3200400" cy="2819400"/>
+            <a:ext cx="3200400" cy="2070968"/>
           </a:xfrm>
           <a:prstGeom prst="roundRect">
             <a:avLst>
-              <a:gd name="adj" fmla="val 16667"/>
+              <a:gd name="adj" fmla="val 9414"/>
             </a:avLst>
           </a:prstGeom>
           <a:ln w="38100" cmpd="sng">
@@ -10103,11 +10103,11 @@
         <p:spPr bwMode="auto">
           <a:xfrm>
             <a:off x="5082940" y="2120980"/>
-            <a:ext cx="3200400" cy="2819400"/>
+            <a:ext cx="3200400" cy="2070968"/>
           </a:xfrm>
           <a:prstGeom prst="roundRect">
             <a:avLst>
-              <a:gd name="adj" fmla="val 16667"/>
+              <a:gd name="adj" fmla="val 12711"/>
             </a:avLst>
           </a:prstGeom>
           <a:ln w="38100" cmpd="sng">
@@ -10193,7 +10193,7 @@
         </p:nvSpPr>
         <p:spPr bwMode="auto">
           <a:xfrm rot="10800000">
-            <a:off x="820029" y="3839312"/>
+            <a:off x="342104" y="3088287"/>
             <a:ext cx="304800" cy="152400"/>
           </a:xfrm>
           <a:prstGeom prst="ellipse">
@@ -10229,7 +10229,7 @@
         </p:nvSpPr>
         <p:spPr bwMode="auto">
           <a:xfrm rot="10800000">
-            <a:off x="1201029" y="3534512"/>
+            <a:off x="723104" y="2824452"/>
             <a:ext cx="304800" cy="152400"/>
           </a:xfrm>
           <a:prstGeom prst="ellipse">
@@ -10265,7 +10265,7 @@
         </p:nvSpPr>
         <p:spPr bwMode="auto">
           <a:xfrm rot="10800000">
-            <a:off x="1429629" y="4067912"/>
+            <a:off x="951704" y="3316887"/>
             <a:ext cx="304800" cy="228600"/>
           </a:xfrm>
           <a:prstGeom prst="ellipse">
@@ -10303,8 +10303,8 @@
         </p:nvCxnSpPr>
         <p:spPr bwMode="auto">
           <a:xfrm>
-            <a:off x="1353429" y="3686912"/>
-            <a:ext cx="228600" cy="381000"/>
+            <a:off x="875504" y="2976852"/>
+            <a:ext cx="228600" cy="340035"/>
           </a:xfrm>
           <a:prstGeom prst="straightConnector1">
             <a:avLst/>
@@ -10335,7 +10335,7 @@
         </p:nvCxnSpPr>
         <p:spPr bwMode="auto">
           <a:xfrm flipH="1">
-            <a:off x="1232592" y="4263034"/>
+            <a:off x="754667" y="3512009"/>
             <a:ext cx="241674" cy="219356"/>
           </a:xfrm>
           <a:prstGeom prst="straightConnector1">
@@ -10367,7 +10367,7 @@
         </p:nvCxnSpPr>
         <p:spPr bwMode="auto">
           <a:xfrm>
-            <a:off x="972429" y="3991712"/>
+            <a:off x="494504" y="3240687"/>
             <a:ext cx="44637" cy="490678"/>
           </a:xfrm>
           <a:prstGeom prst="straightConnector1">
@@ -10399,8 +10399,8 @@
         </p:nvCxnSpPr>
         <p:spPr bwMode="auto">
           <a:xfrm flipH="1">
-            <a:off x="1080192" y="3664594"/>
-            <a:ext cx="165474" cy="197036"/>
+            <a:off x="602267" y="2954534"/>
+            <a:ext cx="165474" cy="156071"/>
           </a:xfrm>
           <a:prstGeom prst="straightConnector1">
             <a:avLst/>
@@ -10429,7 +10429,7 @@
         </p:nvSpPr>
         <p:spPr bwMode="auto">
           <a:xfrm rot="10800000">
-            <a:off x="972429" y="4448912"/>
+            <a:off x="494504" y="3697887"/>
             <a:ext cx="304800" cy="228600"/>
           </a:xfrm>
           <a:prstGeom prst="ellipse">
@@ -10465,7 +10465,7 @@
         </p:nvSpPr>
         <p:spPr bwMode="auto">
           <a:xfrm>
-            <a:off x="6642099" y="2164468"/>
+            <a:off x="6560169" y="2219088"/>
             <a:ext cx="978616" cy="701433"/>
           </a:xfrm>
           <a:prstGeom prst="ellipse">
@@ -10772,7 +10772,6 @@
               <a:rPr lang="fr-FR" sz="1100" b="1" dirty="0"/>
               <a:t>2</a:t>
             </a:r>
-            <a:endParaRPr lang="fr-FR" sz="1100" b="1" dirty="0"/>
           </a:p>
         </p:txBody>
       </p:sp>
@@ -10852,7 +10851,6 @@
               <a:rPr lang="fr-FR" sz="1100" b="1" dirty="0"/>
               <a:t>3</a:t>
             </a:r>
-            <a:endParaRPr lang="fr-FR" sz="1100" b="1" dirty="0"/>
           </a:p>
         </p:txBody>
       </p:sp>
@@ -10976,51 +10974,23 @@
       </p:sp>
       <p:cxnSp>
         <p:nvCxnSpPr>
-          <p:cNvPr id="35" name="AutoShape 68"/>
-          <p:cNvCxnSpPr>
-            <a:cxnSpLocks noChangeShapeType="1"/>
-            <a:endCxn id="11" idx="2"/>
-          </p:cNvCxnSpPr>
-          <p:nvPr/>
-        </p:nvCxnSpPr>
-        <p:spPr bwMode="auto">
-          <a:xfrm flipH="1">
-            <a:off x="1734429" y="3000759"/>
-            <a:ext cx="1097609" cy="1181453"/>
-          </a:xfrm>
-          <a:prstGeom prst="straightConnector1">
-            <a:avLst/>
-          </a:prstGeom>
-          <a:solidFill>
-            <a:srgbClr val="FFFFFF"/>
-          </a:solidFill>
-          <a:ln w="9525">
-            <a:solidFill>
-              <a:schemeClr val="tx1"/>
-            </a:solidFill>
-            <a:round/>
-            <a:headEnd type="none"/>
-            <a:tailEnd type="triangle" w="lg" len="lg"/>
-          </a:ln>
-          <a:extLst/>
-        </p:spPr>
-      </p:cxnSp>
-      <p:cxnSp>
-        <p:nvCxnSpPr>
           <p:cNvPr id="43" name="Connecteur en arc 42"/>
           <p:cNvCxnSpPr>
+            <a:stCxn id="25" idx="2"/>
             <a:endCxn id="9" idx="5"/>
           </p:cNvCxnSpPr>
           <p:nvPr/>
         </p:nvCxnSpPr>
         <p:spPr>
-          <a:xfrm rot="5400000">
-            <a:off x="1144641" y="2720785"/>
-            <a:ext cx="860871" cy="1420819"/>
-          </a:xfrm>
-          <a:prstGeom prst="curvedConnector3">
+          <a:xfrm rot="5400000" flipH="1">
+            <a:off x="1330972" y="2166374"/>
+            <a:ext cx="10281" cy="1898744"/>
+          </a:xfrm>
+          <a:prstGeom prst="curvedConnector5">
             <a:avLst>
-              <a:gd name="adj1" fmla="val 22092"/>
+              <a:gd name="adj1" fmla="val -762572"/>
+              <a:gd name="adj2" fmla="val 48304"/>
+              <a:gd name="adj3" fmla="val 3518821"/>
             </a:avLst>
           </a:prstGeom>
           <a:ln w="9525" cmpd="sng">
@@ -11050,14 +11020,379 @@
         <p:nvCxnSpPr>
           <p:cNvPr id="50" name="Connecteur en arc 49"/>
           <p:cNvCxnSpPr>
+            <a:stCxn id="31" idx="2"/>
             <a:endCxn id="16" idx="2"/>
           </p:cNvCxnSpPr>
           <p:nvPr/>
         </p:nvCxnSpPr>
         <p:spPr>
           <a:xfrm rot="5400000">
-            <a:off x="1413234" y="2862183"/>
-            <a:ext cx="1565024" cy="1837034"/>
+            <a:off x="1609848" y="2307772"/>
+            <a:ext cx="693872" cy="2314959"/>
+          </a:xfrm>
+          <a:prstGeom prst="curvedConnector2">
+            <a:avLst/>
+          </a:prstGeom>
+          <a:ln w="9525" cmpd="sng">
+            <a:solidFill>
+              <a:schemeClr val="tx1"/>
+            </a:solidFill>
+            <a:headEnd type="none"/>
+            <a:tailEnd type="triangle" w="lg" len="lg"/>
+          </a:ln>
+        </p:spPr>
+        <p:style>
+          <a:lnRef idx="2">
+            <a:schemeClr val="accent1"/>
+          </a:lnRef>
+          <a:fillRef idx="0">
+            <a:schemeClr val="accent1"/>
+          </a:fillRef>
+          <a:effectRef idx="1">
+            <a:schemeClr val="accent1"/>
+          </a:effectRef>
+          <a:fontRef idx="minor">
+            <a:schemeClr val="tx1"/>
+          </a:fontRef>
+        </p:style>
+      </p:cxnSp>
+      <p:sp>
+        <p:nvSpPr>
+          <p:cNvPr id="54" name="AutoShape 73"/>
+          <p:cNvSpPr>
+            <a:spLocks noChangeArrowheads="1"/>
+          </p:cNvSpPr>
+          <p:nvPr/>
+        </p:nvSpPr>
+        <p:spPr bwMode="auto">
+          <a:xfrm>
+            <a:off x="1338105" y="3835817"/>
+            <a:ext cx="1888843" cy="228600"/>
+          </a:xfrm>
+          <a:prstGeom prst="roundRect">
+            <a:avLst>
+              <a:gd name="adj" fmla="val 50000"/>
+            </a:avLst>
+          </a:prstGeom>
+          <a:solidFill>
+            <a:srgbClr val="FFFFFF"/>
+          </a:solidFill>
+          <a:ln w="19050">
+            <a:solidFill>
+              <a:srgbClr val="080808"/>
+            </a:solidFill>
+            <a:round/>
+            <a:headEnd/>
+            <a:tailEnd/>
+          </a:ln>
+        </p:spPr>
+        <p:txBody>
+          <a:bodyPr wrap="none" anchor="ctr"/>
+          <a:lstStyle/>
+          <a:p>
+            <a:pPr algn="ctr"/>
+            <a:r>
+              <a:rPr lang="fr-FR" sz="1400" b="1" dirty="0" smtClean="0">
+                <a:solidFill>
+                  <a:srgbClr val="000000"/>
+                </a:solidFill>
+              </a:rPr>
+              <a:t>Server s = new Server();</a:t>
+            </a:r>
+            <a:endParaRPr lang="fr-FR" sz="1400" b="1" dirty="0">
+              <a:solidFill>
+                <a:srgbClr val="000000"/>
+              </a:solidFill>
+            </a:endParaRPr>
+          </a:p>
+        </p:txBody>
+      </p:sp>
+      <p:cxnSp>
+        <p:nvCxnSpPr>
+          <p:cNvPr id="74" name="Connecteur en arc 73"/>
+          <p:cNvCxnSpPr>
+            <a:stCxn id="54" idx="3"/>
+            <a:endCxn id="7" idx="1"/>
+          </p:cNvCxnSpPr>
+          <p:nvPr/>
+        </p:nvCxnSpPr>
+        <p:spPr>
+          <a:xfrm flipV="1">
+            <a:off x="3226948" y="1867664"/>
+            <a:ext cx="1791872" cy="2082453"/>
+          </a:xfrm>
+          <a:prstGeom prst="curvedConnector3">
+            <a:avLst>
+              <a:gd name="adj1" fmla="val 50000"/>
+            </a:avLst>
+          </a:prstGeom>
+          <a:ln w="28575" cmpd="sng">
+            <a:solidFill>
+              <a:srgbClr val="FF0000"/>
+            </a:solidFill>
+            <a:prstDash val="dash"/>
+            <a:tailEnd type="arrow"/>
+          </a:ln>
+        </p:spPr>
+        <p:style>
+          <a:lnRef idx="2">
+            <a:schemeClr val="accent1"/>
+          </a:lnRef>
+          <a:fillRef idx="0">
+            <a:schemeClr val="accent1"/>
+          </a:fillRef>
+          <a:effectRef idx="1">
+            <a:schemeClr val="accent1"/>
+          </a:effectRef>
+          <a:fontRef idx="minor">
+            <a:schemeClr val="tx1"/>
+          </a:fontRef>
+        </p:style>
+      </p:cxnSp>
+      <p:sp>
+        <p:nvSpPr>
+          <p:cNvPr id="81" name="Rectangle 80"/>
+          <p:cNvSpPr/>
+          <p:nvPr/>
+        </p:nvSpPr>
+        <p:spPr>
+          <a:xfrm>
+            <a:off x="6918363" y="2745808"/>
+            <a:ext cx="477573" cy="230488"/>
+          </a:xfrm>
+          <a:prstGeom prst="rect">
+            <a:avLst/>
+          </a:prstGeom>
+        </p:spPr>
+        <p:style>
+          <a:lnRef idx="2">
+            <a:schemeClr val="dk1"/>
+          </a:lnRef>
+          <a:fillRef idx="1">
+            <a:schemeClr val="lt1"/>
+          </a:fillRef>
+          <a:effectRef idx="0">
+            <a:schemeClr val="dk1"/>
+          </a:effectRef>
+          <a:fontRef idx="minor">
+            <a:schemeClr val="dk1"/>
+          </a:fontRef>
+        </p:style>
+        <p:txBody>
+          <a:bodyPr rtlCol="0" anchor="ctr"/>
+          <a:lstStyle/>
+          <a:p>
+            <a:pPr algn="ctr"/>
+            <a:r>
+              <a:rPr lang="fr-FR" sz="1100" b="1" dirty="0" smtClean="0"/>
+              <a:t>ID</a:t>
+            </a:r>
+            <a:endParaRPr lang="fr-FR" sz="1100" b="1" dirty="0"/>
+          </a:p>
+        </p:txBody>
+      </p:sp>
+      <p:sp>
+        <p:nvSpPr>
+          <p:cNvPr id="82" name="Rectangle 81"/>
+          <p:cNvSpPr/>
+          <p:nvPr/>
+        </p:nvSpPr>
+        <p:spPr>
+          <a:xfrm>
+            <a:off x="6918363" y="2992889"/>
+            <a:ext cx="477574" cy="220663"/>
+          </a:xfrm>
+          <a:prstGeom prst="rect">
+            <a:avLst/>
+          </a:prstGeom>
+        </p:spPr>
+        <p:style>
+          <a:lnRef idx="2">
+            <a:schemeClr val="dk1"/>
+          </a:lnRef>
+          <a:fillRef idx="1">
+            <a:schemeClr val="lt1"/>
+          </a:fillRef>
+          <a:effectRef idx="0">
+            <a:schemeClr val="dk1"/>
+          </a:effectRef>
+          <a:fontRef idx="minor">
+            <a:schemeClr val="dk1"/>
+          </a:fontRef>
+        </p:style>
+        <p:txBody>
+          <a:bodyPr rtlCol="0" anchor="ctr"/>
+          <a:lstStyle/>
+          <a:p>
+            <a:pPr algn="ctr"/>
+            <a:r>
+              <a:rPr lang="fr-FR" sz="1100" b="1" dirty="0" err="1" smtClean="0"/>
+              <a:t>ref</a:t>
+            </a:r>
+            <a:endParaRPr lang="fr-FR" sz="1100" b="1" dirty="0"/>
+          </a:p>
+        </p:txBody>
+      </p:sp>
+      <p:sp>
+        <p:nvSpPr>
+          <p:cNvPr id="83" name="Rectangle 82"/>
+          <p:cNvSpPr/>
+          <p:nvPr/>
+        </p:nvSpPr>
+        <p:spPr>
+          <a:xfrm>
+            <a:off x="7395937" y="2745808"/>
+            <a:ext cx="282222" cy="230488"/>
+          </a:xfrm>
+          <a:prstGeom prst="rect">
+            <a:avLst/>
+          </a:prstGeom>
+        </p:spPr>
+        <p:style>
+          <a:lnRef idx="2">
+            <a:schemeClr val="dk1"/>
+          </a:lnRef>
+          <a:fillRef idx="1">
+            <a:schemeClr val="lt1"/>
+          </a:fillRef>
+          <a:effectRef idx="0">
+            <a:schemeClr val="dk1"/>
+          </a:effectRef>
+          <a:fontRef idx="minor">
+            <a:schemeClr val="dk1"/>
+          </a:fontRef>
+        </p:style>
+        <p:txBody>
+          <a:bodyPr rtlCol="0" anchor="ctr"/>
+          <a:lstStyle/>
+          <a:p>
+            <a:pPr algn="ctr"/>
+            <a:r>
+              <a:rPr lang="fr-FR" sz="1100" b="1" dirty="0" smtClean="0"/>
+              <a:t>1</a:t>
+            </a:r>
+            <a:endParaRPr lang="fr-FR" sz="1100" b="1" dirty="0"/>
+          </a:p>
+        </p:txBody>
+      </p:sp>
+      <p:sp>
+        <p:nvSpPr>
+          <p:cNvPr id="84" name="Rectangle 83"/>
+          <p:cNvSpPr/>
+          <p:nvPr/>
+        </p:nvSpPr>
+        <p:spPr>
+          <a:xfrm>
+            <a:off x="7395937" y="2983065"/>
+            <a:ext cx="282222" cy="230488"/>
+          </a:xfrm>
+          <a:prstGeom prst="rect">
+            <a:avLst/>
+          </a:prstGeom>
+        </p:spPr>
+        <p:style>
+          <a:lnRef idx="2">
+            <a:schemeClr val="dk1"/>
+          </a:lnRef>
+          <a:fillRef idx="1">
+            <a:schemeClr val="lt1"/>
+          </a:fillRef>
+          <a:effectRef idx="0">
+            <a:schemeClr val="dk1"/>
+          </a:effectRef>
+          <a:fontRef idx="minor">
+            <a:schemeClr val="dk1"/>
+          </a:fontRef>
+        </p:style>
+        <p:txBody>
+          <a:bodyPr rtlCol="0" anchor="ctr"/>
+          <a:lstStyle/>
+          <a:p>
+            <a:pPr algn="ctr"/>
+            <a:endParaRPr lang="fr-FR"/>
+          </a:p>
+        </p:txBody>
+      </p:sp>
+      <p:sp>
+        <p:nvSpPr>
+          <p:cNvPr id="85" name="Oval 67"/>
+          <p:cNvSpPr>
+            <a:spLocks noChangeArrowheads="1"/>
+          </p:cNvSpPr>
+          <p:nvPr/>
+        </p:nvSpPr>
+        <p:spPr bwMode="auto">
+          <a:xfrm rot="10800000">
+            <a:off x="7846304" y="3215061"/>
+            <a:ext cx="304800" cy="228600"/>
+          </a:xfrm>
+          <a:prstGeom prst="ellipse">
+            <a:avLst/>
+          </a:prstGeom>
+          <a:solidFill>
+            <a:srgbClr val="FFFFFF"/>
+          </a:solidFill>
+          <a:ln w="19050">
+            <a:solidFill>
+              <a:schemeClr val="tx1"/>
+            </a:solidFill>
+            <a:round/>
+            <a:headEnd type="none"/>
+            <a:tailEnd type="triangle" w="lg" len="lg"/>
+          </a:ln>
+        </p:spPr>
+        <p:txBody>
+          <a:bodyPr wrap="none" anchor="ctr"/>
+          <a:lstStyle/>
+          <a:p>
+            <a:endParaRPr lang="fr-FR"/>
+          </a:p>
+        </p:txBody>
+      </p:sp>
+      <p:cxnSp>
+        <p:nvCxnSpPr>
+          <p:cNvPr id="86" name="AutoShape 68"/>
+          <p:cNvCxnSpPr>
+            <a:cxnSpLocks noChangeShapeType="1"/>
+            <a:endCxn id="85" idx="5"/>
+          </p:cNvCxnSpPr>
+          <p:nvPr/>
+        </p:nvCxnSpPr>
+        <p:spPr bwMode="auto">
+          <a:xfrm>
+            <a:off x="7537048" y="3090659"/>
+            <a:ext cx="353893" cy="157880"/>
+          </a:xfrm>
+          <a:prstGeom prst="straightConnector1">
+            <a:avLst/>
+          </a:prstGeom>
+          <a:solidFill>
+            <a:srgbClr val="FFFFFF"/>
+          </a:solidFill>
+          <a:ln w="9525">
+            <a:solidFill>
+              <a:schemeClr val="tx1"/>
+            </a:solidFill>
+            <a:round/>
+            <a:headEnd type="none"/>
+            <a:tailEnd type="triangle" w="lg" len="lg"/>
+          </a:ln>
+          <a:extLst/>
+        </p:spPr>
+      </p:cxnSp>
+      <p:cxnSp>
+        <p:nvCxnSpPr>
+          <p:cNvPr id="40" name="Connecteur en arc 39"/>
+          <p:cNvCxnSpPr>
+            <a:stCxn id="29" idx="2"/>
+            <a:endCxn id="11" idx="2"/>
+          </p:cNvCxnSpPr>
+          <p:nvPr/>
+        </p:nvCxnSpPr>
+        <p:spPr>
+          <a:xfrm rot="5400000">
+            <a:off x="1889121" y="2488269"/>
+            <a:ext cx="310301" cy="1575534"/>
           </a:xfrm>
           <a:prstGeom prst="curvedConnector2">
             <a:avLst/>
@@ -11087,119 +11422,30 @@
       </p:cxnSp>
       <p:cxnSp>
         <p:nvCxnSpPr>
-          <p:cNvPr id="17" name="AutoShape 68"/>
+          <p:cNvPr id="44" name="Connecteur en arc 43"/>
           <p:cNvCxnSpPr>
-            <a:cxnSpLocks noChangeShapeType="1"/>
-            <a:endCxn id="10" idx="3"/>
+            <a:stCxn id="27" idx="2"/>
+            <a:endCxn id="10" idx="2"/>
           </p:cNvCxnSpPr>
           <p:nvPr/>
         </p:nvCxnSpPr>
-        <p:spPr bwMode="auto">
-          <a:xfrm flipH="1">
-            <a:off x="1461192" y="2998188"/>
-            <a:ext cx="1106518" cy="558642"/>
-          </a:xfrm>
-          <a:prstGeom prst="straightConnector1">
-            <a:avLst/>
-          </a:prstGeom>
-          <a:solidFill>
-            <a:srgbClr val="FFFFFF"/>
-          </a:solidFill>
-          <a:ln w="9525">
+        <p:spPr>
+          <a:xfrm rot="5400000" flipH="1">
+            <a:off x="1688975" y="2239581"/>
+            <a:ext cx="217663" cy="1539806"/>
+          </a:xfrm>
+          <a:prstGeom prst="curvedConnector4">
+            <a:avLst>
+              <a:gd name="adj1" fmla="val -105025"/>
+              <a:gd name="adj2" fmla="val 82074"/>
+            </a:avLst>
+          </a:prstGeom>
+          <a:ln w="9525" cmpd="sng">
             <a:solidFill>
               <a:schemeClr val="tx1"/>
             </a:solidFill>
-            <a:round/>
             <a:headEnd type="none"/>
             <a:tailEnd type="triangle" w="lg" len="lg"/>
-          </a:ln>
-          <a:extLst/>
-        </p:spPr>
-      </p:cxnSp>
-      <p:sp>
-        <p:nvSpPr>
-          <p:cNvPr id="54" name="AutoShape 73"/>
-          <p:cNvSpPr>
-            <a:spLocks noChangeArrowheads="1"/>
-          </p:cNvSpPr>
-          <p:nvPr/>
-        </p:nvSpPr>
-        <p:spPr bwMode="auto">
-          <a:xfrm>
-            <a:off x="1174245" y="4666178"/>
-            <a:ext cx="1888843" cy="228600"/>
-          </a:xfrm>
-          <a:prstGeom prst="roundRect">
-            <a:avLst>
-              <a:gd name="adj" fmla="val 50000"/>
-            </a:avLst>
-          </a:prstGeom>
-          <a:solidFill>
-            <a:srgbClr val="FFFFFF"/>
-          </a:solidFill>
-          <a:ln w="19050">
-            <a:solidFill>
-              <a:srgbClr val="080808"/>
-            </a:solidFill>
-            <a:round/>
-            <a:headEnd/>
-            <a:tailEnd/>
-          </a:ln>
-        </p:spPr>
-        <p:txBody>
-          <a:bodyPr wrap="none" anchor="ctr"/>
-          <a:lstStyle/>
-          <a:p>
-            <a:pPr algn="ctr"/>
-            <a:r>
-              <a:rPr lang="fr-FR" sz="1400" b="1" dirty="0" smtClean="0">
-                <a:solidFill>
-                  <a:srgbClr val="000000"/>
-                </a:solidFill>
-              </a:rPr>
-              <a:t>Server s</a:t>
-            </a:r>
-            <a:r>
-              <a:rPr lang="fr-FR" sz="1400" b="1" dirty="0" smtClean="0">
-                <a:solidFill>
-                  <a:srgbClr val="000000"/>
-                </a:solidFill>
-              </a:rPr>
-              <a:t> = new Server();</a:t>
-            </a:r>
-            <a:endParaRPr lang="fr-FR" sz="1400" b="1" dirty="0">
-              <a:solidFill>
-                <a:srgbClr val="000000"/>
-              </a:solidFill>
-            </a:endParaRPr>
-          </a:p>
-        </p:txBody>
-      </p:sp>
-      <p:cxnSp>
-        <p:nvCxnSpPr>
-          <p:cNvPr id="74" name="Connecteur en arc 73"/>
-          <p:cNvCxnSpPr>
-            <a:stCxn id="54" idx="3"/>
-            <a:endCxn id="7" idx="1"/>
-          </p:cNvCxnSpPr>
-          <p:nvPr/>
-        </p:nvCxnSpPr>
-        <p:spPr>
-          <a:xfrm flipV="1">
-            <a:off x="3063088" y="1867664"/>
-            <a:ext cx="1955732" cy="2912814"/>
-          </a:xfrm>
-          <a:prstGeom prst="curvedConnector3">
-            <a:avLst>
-              <a:gd name="adj1" fmla="val 50000"/>
-            </a:avLst>
-          </a:prstGeom>
-          <a:ln w="28575" cmpd="sng">
-            <a:solidFill>
-              <a:srgbClr val="FF0000"/>
-            </a:solidFill>
-            <a:prstDash val="dash"/>
-            <a:tailEnd type="arrow"/>
           </a:ln>
         </p:spPr>
         <p:style>
@@ -11217,236 +11463,147 @@
           </a:fontRef>
         </p:style>
       </p:cxnSp>
-      <p:sp>
-        <p:nvSpPr>
-          <p:cNvPr id="81" name="Rectangle 80"/>
-          <p:cNvSpPr/>
-          <p:nvPr/>
-        </p:nvSpPr>
+      <p:cxnSp>
+        <p:nvCxnSpPr>
+          <p:cNvPr id="51" name="Connecteur droit 50"/>
+          <p:cNvCxnSpPr>
+            <a:stCxn id="27" idx="2"/>
+          </p:cNvCxnSpPr>
+          <p:nvPr/>
+        </p:nvCxnSpPr>
         <p:spPr>
-          <a:xfrm>
-            <a:off x="7000293" y="2691188"/>
-            <a:ext cx="477573" cy="230488"/>
-          </a:xfrm>
-          <a:prstGeom prst="rect">
-            <a:avLst/>
-          </a:prstGeom>
-        </p:spPr>
-        <p:style>
-          <a:lnRef idx="2">
-            <a:schemeClr val="dk1"/>
-          </a:lnRef>
-          <a:fillRef idx="1">
-            <a:schemeClr val="lt1"/>
-          </a:fillRef>
-          <a:effectRef idx="0">
-            <a:schemeClr val="dk1"/>
-          </a:effectRef>
-          <a:fontRef idx="minor">
-            <a:schemeClr val="dk1"/>
-          </a:fontRef>
-        </p:style>
-        <p:txBody>
-          <a:bodyPr rtlCol="0" anchor="ctr"/>
-          <a:lstStyle/>
-          <a:p>
-            <a:pPr algn="ctr"/>
-            <a:r>
-              <a:rPr lang="fr-FR" sz="1100" b="1" dirty="0" smtClean="0"/>
-              <a:t>ID</a:t>
-            </a:r>
-            <a:endParaRPr lang="fr-FR" sz="1100" b="1" dirty="0"/>
-          </a:p>
-        </p:txBody>
-      </p:sp>
-      <p:sp>
-        <p:nvSpPr>
-          <p:cNvPr id="82" name="Rectangle 81"/>
-          <p:cNvSpPr/>
-          <p:nvPr/>
-        </p:nvSpPr>
-        <p:spPr>
-          <a:xfrm>
-            <a:off x="7000293" y="2938269"/>
-            <a:ext cx="477574" cy="220663"/>
-          </a:xfrm>
-          <a:prstGeom prst="rect">
-            <a:avLst/>
-          </a:prstGeom>
-        </p:spPr>
-        <p:style>
-          <a:lnRef idx="2">
-            <a:schemeClr val="dk1"/>
-          </a:lnRef>
-          <a:fillRef idx="1">
-            <a:schemeClr val="lt1"/>
-          </a:fillRef>
-          <a:effectRef idx="0">
-            <a:schemeClr val="dk1"/>
-          </a:effectRef>
-          <a:fontRef idx="minor">
-            <a:schemeClr val="dk1"/>
-          </a:fontRef>
-        </p:style>
-        <p:txBody>
-          <a:bodyPr rtlCol="0" anchor="ctr"/>
-          <a:lstStyle/>
-          <a:p>
-            <a:pPr algn="ctr"/>
-            <a:r>
-              <a:rPr lang="fr-FR" sz="1100" b="1" dirty="0" err="1" smtClean="0"/>
-              <a:t>ref</a:t>
-            </a:r>
-            <a:endParaRPr lang="fr-FR" sz="1100" b="1" dirty="0"/>
-          </a:p>
-        </p:txBody>
-      </p:sp>
-      <p:sp>
-        <p:nvSpPr>
-          <p:cNvPr id="83" name="Rectangle 82"/>
-          <p:cNvSpPr/>
-          <p:nvPr/>
-        </p:nvSpPr>
-        <p:spPr>
-          <a:xfrm>
-            <a:off x="7477867" y="2691188"/>
-            <a:ext cx="282222" cy="230488"/>
-          </a:xfrm>
-          <a:prstGeom prst="rect">
-            <a:avLst/>
-          </a:prstGeom>
-        </p:spPr>
-        <p:style>
-          <a:lnRef idx="2">
-            <a:schemeClr val="dk1"/>
-          </a:lnRef>
-          <a:fillRef idx="1">
-            <a:schemeClr val="lt1"/>
-          </a:fillRef>
-          <a:effectRef idx="0">
-            <a:schemeClr val="dk1"/>
-          </a:effectRef>
-          <a:fontRef idx="minor">
-            <a:schemeClr val="dk1"/>
-          </a:fontRef>
-        </p:style>
-        <p:txBody>
-          <a:bodyPr rtlCol="0" anchor="ctr"/>
-          <a:lstStyle/>
-          <a:p>
-            <a:pPr algn="ctr"/>
-            <a:r>
-              <a:rPr lang="fr-FR" sz="1100" b="1" dirty="0" smtClean="0"/>
-              <a:t>1</a:t>
-            </a:r>
-            <a:endParaRPr lang="fr-FR" sz="1100" b="1" dirty="0"/>
-          </a:p>
-        </p:txBody>
-      </p:sp>
-      <p:sp>
-        <p:nvSpPr>
-          <p:cNvPr id="84" name="Rectangle 83"/>
-          <p:cNvSpPr/>
-          <p:nvPr/>
-        </p:nvSpPr>
-        <p:spPr>
-          <a:xfrm>
-            <a:off x="7477867" y="2928445"/>
-            <a:ext cx="282222" cy="230488"/>
-          </a:xfrm>
-          <a:prstGeom prst="rect">
-            <a:avLst/>
-          </a:prstGeom>
-        </p:spPr>
-        <p:style>
-          <a:lnRef idx="2">
-            <a:schemeClr val="dk1"/>
-          </a:lnRef>
-          <a:fillRef idx="1">
-            <a:schemeClr val="lt1"/>
-          </a:fillRef>
-          <a:effectRef idx="0">
-            <a:schemeClr val="dk1"/>
-          </a:effectRef>
-          <a:fontRef idx="minor">
-            <a:schemeClr val="dk1"/>
-          </a:fontRef>
-        </p:style>
-        <p:txBody>
-          <a:bodyPr rtlCol="0" anchor="ctr"/>
-          <a:lstStyle/>
-          <a:p>
-            <a:pPr algn="ctr"/>
-            <a:endParaRPr lang="fr-FR"/>
-          </a:p>
-        </p:txBody>
-      </p:sp>
-      <p:sp>
-        <p:nvSpPr>
-          <p:cNvPr id="85" name="Oval 67"/>
-          <p:cNvSpPr>
-            <a:spLocks noChangeArrowheads="1"/>
-          </p:cNvSpPr>
-          <p:nvPr/>
-        </p:nvSpPr>
-        <p:spPr bwMode="auto">
-          <a:xfrm rot="10800000">
-            <a:off x="7928234" y="3160441"/>
-            <a:ext cx="304800" cy="228600"/>
-          </a:xfrm>
-          <a:prstGeom prst="ellipse">
-            <a:avLst/>
-          </a:prstGeom>
-          <a:solidFill>
-            <a:srgbClr val="FFFFFF"/>
-          </a:solidFill>
-          <a:ln w="19050">
+          <a:xfrm flipV="1">
+            <a:off x="2567710" y="2976852"/>
+            <a:ext cx="0" cy="141463"/>
+          </a:xfrm>
+          <a:prstGeom prst="line">
+            <a:avLst/>
+          </a:prstGeom>
+          <a:ln w="6350" cmpd="sng">
             <a:solidFill>
               <a:schemeClr val="tx1"/>
             </a:solidFill>
-            <a:round/>
-            <a:headEnd type="none"/>
-            <a:tailEnd type="triangle" w="lg" len="lg"/>
           </a:ln>
         </p:spPr>
-        <p:txBody>
-          <a:bodyPr wrap="none" anchor="ctr"/>
-          <a:lstStyle/>
-          <a:p>
-            <a:endParaRPr lang="fr-FR"/>
-          </a:p>
-        </p:txBody>
-      </p:sp>
+        <p:style>
+          <a:lnRef idx="2">
+            <a:schemeClr val="accent1"/>
+          </a:lnRef>
+          <a:fillRef idx="0">
+            <a:schemeClr val="accent1"/>
+          </a:fillRef>
+          <a:effectRef idx="1">
+            <a:schemeClr val="accent1"/>
+          </a:effectRef>
+          <a:fontRef idx="minor">
+            <a:schemeClr val="tx1"/>
+          </a:fontRef>
+        </p:style>
+      </p:cxnSp>
       <p:cxnSp>
         <p:nvCxnSpPr>
-          <p:cNvPr id="86" name="AutoShape 68"/>
-          <p:cNvCxnSpPr>
-            <a:cxnSpLocks noChangeShapeType="1"/>
-            <a:endCxn id="85" idx="5"/>
-          </p:cNvCxnSpPr>
+          <p:cNvPr id="60" name="Connecteur droit 59"/>
+          <p:cNvCxnSpPr/>
           <p:nvPr/>
         </p:nvCxnSpPr>
-        <p:spPr bwMode="auto">
-          <a:xfrm>
-            <a:off x="7618978" y="3036039"/>
-            <a:ext cx="353893" cy="157880"/>
-          </a:xfrm>
-          <a:prstGeom prst="straightConnector1">
-            <a:avLst/>
-          </a:prstGeom>
-          <a:solidFill>
-            <a:srgbClr val="FFFFFF"/>
-          </a:solidFill>
-          <a:ln w="9525">
+        <p:spPr>
+          <a:xfrm flipV="1">
+            <a:off x="2832039" y="2979422"/>
+            <a:ext cx="0" cy="141463"/>
+          </a:xfrm>
+          <a:prstGeom prst="line">
+            <a:avLst/>
+          </a:prstGeom>
+          <a:ln w="6350" cmpd="sng">
             <a:solidFill>
               <a:schemeClr val="tx1"/>
             </a:solidFill>
-            <a:round/>
-            <a:headEnd type="none"/>
-            <a:tailEnd type="triangle" w="lg" len="lg"/>
           </a:ln>
-          <a:extLst/>
-        </p:spPr>
+        </p:spPr>
+        <p:style>
+          <a:lnRef idx="2">
+            <a:schemeClr val="accent1"/>
+          </a:lnRef>
+          <a:fillRef idx="0">
+            <a:schemeClr val="accent1"/>
+          </a:fillRef>
+          <a:effectRef idx="1">
+            <a:schemeClr val="accent1"/>
+          </a:effectRef>
+          <a:fontRef idx="minor">
+            <a:schemeClr val="tx1"/>
+          </a:fontRef>
+        </p:style>
+      </p:cxnSp>
+      <p:cxnSp>
+        <p:nvCxnSpPr>
+          <p:cNvPr id="61" name="Connecteur droit 60"/>
+          <p:cNvCxnSpPr/>
+          <p:nvPr/>
+        </p:nvCxnSpPr>
+        <p:spPr>
+          <a:xfrm flipV="1">
+            <a:off x="3114264" y="2965307"/>
+            <a:ext cx="0" cy="141463"/>
+          </a:xfrm>
+          <a:prstGeom prst="line">
+            <a:avLst/>
+          </a:prstGeom>
+          <a:ln w="6350" cmpd="sng">
+            <a:solidFill>
+              <a:schemeClr val="tx1"/>
+            </a:solidFill>
+          </a:ln>
+        </p:spPr>
+        <p:style>
+          <a:lnRef idx="2">
+            <a:schemeClr val="accent1"/>
+          </a:lnRef>
+          <a:fillRef idx="0">
+            <a:schemeClr val="accent1"/>
+          </a:fillRef>
+          <a:effectRef idx="1">
+            <a:schemeClr val="accent1"/>
+          </a:effectRef>
+          <a:fontRef idx="minor">
+            <a:schemeClr val="tx1"/>
+          </a:fontRef>
+        </p:style>
+      </p:cxnSp>
+      <p:cxnSp>
+        <p:nvCxnSpPr>
+          <p:cNvPr id="62" name="Connecteur droit 61"/>
+          <p:cNvCxnSpPr/>
+          <p:nvPr/>
+        </p:nvCxnSpPr>
+        <p:spPr>
+          <a:xfrm flipV="1">
+            <a:off x="2285485" y="2979422"/>
+            <a:ext cx="0" cy="141463"/>
+          </a:xfrm>
+          <a:prstGeom prst="line">
+            <a:avLst/>
+          </a:prstGeom>
+          <a:ln w="6350" cmpd="sng">
+            <a:solidFill>
+              <a:schemeClr val="tx1"/>
+            </a:solidFill>
+          </a:ln>
+        </p:spPr>
+        <p:style>
+          <a:lnRef idx="2">
+            <a:schemeClr val="accent1"/>
+          </a:lnRef>
+          <a:fillRef idx="0">
+            <a:schemeClr val="accent1"/>
+          </a:fillRef>
+          <a:effectRef idx="1">
+            <a:schemeClr val="accent1"/>
+          </a:effectRef>
+          <a:fontRef idx="minor">
+            <a:schemeClr val="tx1"/>
+          </a:fontRef>
+        </p:style>
       </p:cxnSp>
     </p:spTree>
     <p:extLst>
@@ -12694,7 +12851,6 @@
               <a:rPr lang="fr-FR" sz="1100" b="1" dirty="0"/>
               <a:t>2</a:t>
             </a:r>
-            <a:endParaRPr lang="fr-FR" sz="1100" b="1" dirty="0"/>
           </a:p>
         </p:txBody>
       </p:sp>
@@ -12774,7 +12930,6 @@
               <a:rPr lang="fr-FR" sz="1100" b="1" dirty="0"/>
               <a:t>3</a:t>
             </a:r>
-            <a:endParaRPr lang="fr-FR" sz="1100" b="1" dirty="0"/>
           </a:p>
         </p:txBody>
       </p:sp>
@@ -13573,15 +13728,7 @@
                   <a:srgbClr val="000000"/>
                 </a:solidFill>
               </a:rPr>
-              <a:t>   m</a:t>
-            </a:r>
-            <a:r>
-              <a:rPr lang="fr-FR" sz="1400" b="1" dirty="0" smtClean="0">
-                <a:solidFill>
-                  <a:srgbClr val="000000"/>
-                </a:solidFill>
-              </a:rPr>
-              <a:t> = </a:t>
+              <a:t>   m = </a:t>
             </a:r>
             <a:r>
               <a:rPr lang="fr-FR" sz="1400" b="1" dirty="0" err="1" smtClean="0">

</xml_diff>

<commit_message>
Modified figures in ppt
</commit_message>
<xml_diff>
--- a/resources/drawings-ABS-PA.pptx
+++ b/resources/drawings-ABS-PA.pptx
@@ -291,7 +291,7 @@
           <a:p>
             <a:fld id="{051EC6C9-E916-2547-B427-7FDBC687BD29}" type="datetimeFigureOut">
               <a:rPr lang="fr-FR" smtClean="0"/>
-              <a:t>07/03/16</a:t>
+              <a:t>11/03/16</a:t>
             </a:fld>
             <a:endParaRPr lang="fr-FR"/>
           </a:p>
@@ -461,7 +461,7 @@
           <a:p>
             <a:fld id="{051EC6C9-E916-2547-B427-7FDBC687BD29}" type="datetimeFigureOut">
               <a:rPr lang="fr-FR" smtClean="0"/>
-              <a:t>07/03/16</a:t>
+              <a:t>11/03/16</a:t>
             </a:fld>
             <a:endParaRPr lang="fr-FR"/>
           </a:p>
@@ -641,7 +641,7 @@
           <a:p>
             <a:fld id="{051EC6C9-E916-2547-B427-7FDBC687BD29}" type="datetimeFigureOut">
               <a:rPr lang="fr-FR" smtClean="0"/>
-              <a:t>07/03/16</a:t>
+              <a:t>11/03/16</a:t>
             </a:fld>
             <a:endParaRPr lang="fr-FR"/>
           </a:p>
@@ -811,7 +811,7 @@
           <a:p>
             <a:fld id="{051EC6C9-E916-2547-B427-7FDBC687BD29}" type="datetimeFigureOut">
               <a:rPr lang="fr-FR" smtClean="0"/>
-              <a:t>07/03/16</a:t>
+              <a:t>11/03/16</a:t>
             </a:fld>
             <a:endParaRPr lang="fr-FR"/>
           </a:p>
@@ -1057,7 +1057,7 @@
           <a:p>
             <a:fld id="{051EC6C9-E916-2547-B427-7FDBC687BD29}" type="datetimeFigureOut">
               <a:rPr lang="fr-FR" smtClean="0"/>
-              <a:t>07/03/16</a:t>
+              <a:t>11/03/16</a:t>
             </a:fld>
             <a:endParaRPr lang="fr-FR"/>
           </a:p>
@@ -1345,7 +1345,7 @@
           <a:p>
             <a:fld id="{051EC6C9-E916-2547-B427-7FDBC687BD29}" type="datetimeFigureOut">
               <a:rPr lang="fr-FR" smtClean="0"/>
-              <a:t>07/03/16</a:t>
+              <a:t>11/03/16</a:t>
             </a:fld>
             <a:endParaRPr lang="fr-FR"/>
           </a:p>
@@ -1767,7 +1767,7 @@
           <a:p>
             <a:fld id="{051EC6C9-E916-2547-B427-7FDBC687BD29}" type="datetimeFigureOut">
               <a:rPr lang="fr-FR" smtClean="0"/>
-              <a:t>07/03/16</a:t>
+              <a:t>11/03/16</a:t>
             </a:fld>
             <a:endParaRPr lang="fr-FR"/>
           </a:p>
@@ -1885,7 +1885,7 @@
           <a:p>
             <a:fld id="{051EC6C9-E916-2547-B427-7FDBC687BD29}" type="datetimeFigureOut">
               <a:rPr lang="fr-FR" smtClean="0"/>
-              <a:t>07/03/16</a:t>
+              <a:t>11/03/16</a:t>
             </a:fld>
             <a:endParaRPr lang="fr-FR"/>
           </a:p>
@@ -1980,7 +1980,7 @@
           <a:p>
             <a:fld id="{051EC6C9-E916-2547-B427-7FDBC687BD29}" type="datetimeFigureOut">
               <a:rPr lang="fr-FR" smtClean="0"/>
-              <a:t>07/03/16</a:t>
+              <a:t>11/03/16</a:t>
             </a:fld>
             <a:endParaRPr lang="fr-FR"/>
           </a:p>
@@ -2257,7 +2257,7 @@
           <a:p>
             <a:fld id="{051EC6C9-E916-2547-B427-7FDBC687BD29}" type="datetimeFigureOut">
               <a:rPr lang="fr-FR" smtClean="0"/>
-              <a:t>07/03/16</a:t>
+              <a:t>11/03/16</a:t>
             </a:fld>
             <a:endParaRPr lang="fr-FR"/>
           </a:p>
@@ -2510,7 +2510,7 @@
           <a:p>
             <a:fld id="{051EC6C9-E916-2547-B427-7FDBC687BD29}" type="datetimeFigureOut">
               <a:rPr lang="fr-FR" smtClean="0"/>
-              <a:t>07/03/16</a:t>
+              <a:t>11/03/16</a:t>
             </a:fld>
             <a:endParaRPr lang="fr-FR"/>
           </a:p>
@@ -2723,7 +2723,7 @@
           <a:p>
             <a:fld id="{051EC6C9-E916-2547-B427-7FDBC687BD29}" type="datetimeFigureOut">
               <a:rPr lang="fr-FR" smtClean="0"/>
-              <a:t>07/03/16</a:t>
+              <a:t>11/03/16</a:t>
             </a:fld>
             <a:endParaRPr lang="fr-FR"/>
           </a:p>
@@ -10011,8 +10011,8 @@
         </p:nvSpPr>
         <p:spPr bwMode="auto">
           <a:xfrm>
-            <a:off x="154476" y="2120980"/>
-            <a:ext cx="3200400" cy="2070968"/>
+            <a:off x="1048629" y="2120980"/>
+            <a:ext cx="2306246" cy="2699078"/>
           </a:xfrm>
           <a:prstGeom prst="roundRect">
             <a:avLst>
@@ -10020,6 +10020,9 @@
             </a:avLst>
           </a:prstGeom>
           <a:ln w="38100" cmpd="sng">
+            <a:solidFill>
+              <a:srgbClr val="743FA2"/>
+            </a:solidFill>
             <a:headEnd/>
             <a:tailEnd/>
           </a:ln>
@@ -10061,7 +10064,7 @@
         </p:nvSpPr>
         <p:spPr>
           <a:xfrm>
-            <a:off x="154476" y="1544498"/>
+            <a:off x="1048629" y="1568867"/>
             <a:ext cx="479618" cy="646331"/>
           </a:xfrm>
           <a:prstGeom prst="rect">
@@ -10078,7 +10081,7 @@
             <a:r>
               <a:rPr lang="fr-FR" sz="3600" b="1" dirty="0" smtClean="0">
                 <a:solidFill>
-                  <a:schemeClr val="accent4"/>
+                  <a:srgbClr val="743FA2"/>
                 </a:solidFill>
                 <a:latin typeface="Symbol" charset="0"/>
               </a:rPr>
@@ -10086,7 +10089,7 @@
             </a:r>
             <a:endParaRPr lang="fr-FR" sz="3600" b="1" dirty="0" smtClean="0">
               <a:solidFill>
-                <a:schemeClr val="accent4"/>
+                <a:srgbClr val="743FA2"/>
               </a:solidFill>
             </a:endParaRPr>
           </a:p>
@@ -10102,8 +10105,8 @@
         </p:nvSpPr>
         <p:spPr bwMode="auto">
           <a:xfrm>
-            <a:off x="5082940" y="2120980"/>
-            <a:ext cx="3200400" cy="2070968"/>
+            <a:off x="3816116" y="2231460"/>
+            <a:ext cx="1307789" cy="2070968"/>
           </a:xfrm>
           <a:prstGeom prst="roundRect">
             <a:avLst>
@@ -10111,6 +10114,9 @@
             </a:avLst>
           </a:prstGeom>
           <a:ln w="38100" cmpd="sng">
+            <a:solidFill>
+              <a:srgbClr val="743FA2"/>
+            </a:solidFill>
             <a:headEnd/>
             <a:tailEnd/>
           </a:ln>
@@ -10152,13 +10158,16 @@
         </p:nvSpPr>
         <p:spPr>
           <a:xfrm>
-            <a:off x="5018820" y="1544498"/>
+            <a:off x="3905481" y="1576797"/>
             <a:ext cx="438041" cy="646331"/>
           </a:xfrm>
           <a:prstGeom prst="rect">
             <a:avLst/>
           </a:prstGeom>
           <a:noFill/>
+          <a:ln>
+            <a:noFill/>
+          </a:ln>
         </p:spPr>
         <p:txBody>
           <a:bodyPr wrap="none" rtlCol="0">
@@ -10169,7 +10178,7 @@
             <a:r>
               <a:rPr lang="fr-FR" sz="3600" b="1" dirty="0" smtClean="0">
                 <a:solidFill>
-                  <a:srgbClr val="8064A2"/>
+                  <a:srgbClr val="743FA2"/>
                 </a:solidFill>
                 <a:latin typeface="Symbol" charset="0"/>
               </a:rPr>
@@ -10177,7 +10186,7 @@
             </a:r>
             <a:endParaRPr lang="fr-FR" sz="3600" b="1" dirty="0" smtClean="0">
               <a:solidFill>
-                <a:srgbClr val="8064A2"/>
+                <a:srgbClr val="743FA2"/>
               </a:solidFill>
             </a:endParaRPr>
           </a:p>
@@ -10193,7 +10202,7 @@
         </p:nvSpPr>
         <p:spPr bwMode="auto">
           <a:xfrm rot="10800000">
-            <a:off x="342104" y="3088287"/>
+            <a:off x="1928927" y="3583588"/>
             <a:ext cx="304800" cy="152400"/>
           </a:xfrm>
           <a:prstGeom prst="ellipse">
@@ -10229,7 +10238,7 @@
         </p:nvSpPr>
         <p:spPr bwMode="auto">
           <a:xfrm rot="10800000">
-            <a:off x="723104" y="2824452"/>
+            <a:off x="2309927" y="3319753"/>
             <a:ext cx="304800" cy="152400"/>
           </a:xfrm>
           <a:prstGeom prst="ellipse">
@@ -10265,7 +10274,7 @@
         </p:nvSpPr>
         <p:spPr bwMode="auto">
           <a:xfrm rot="10800000">
-            <a:off x="951704" y="3316887"/>
+            <a:off x="2538527" y="3812188"/>
             <a:ext cx="304800" cy="228600"/>
           </a:xfrm>
           <a:prstGeom prst="ellipse">
@@ -10303,7 +10312,7 @@
         </p:nvCxnSpPr>
         <p:spPr bwMode="auto">
           <a:xfrm>
-            <a:off x="875504" y="2976852"/>
+            <a:off x="2462327" y="3472153"/>
             <a:ext cx="228600" cy="340035"/>
           </a:xfrm>
           <a:prstGeom prst="straightConnector1">
@@ -10335,7 +10344,7 @@
         </p:nvCxnSpPr>
         <p:spPr bwMode="auto">
           <a:xfrm flipH="1">
-            <a:off x="754667" y="3512009"/>
+            <a:off x="2341490" y="4007310"/>
             <a:ext cx="241674" cy="219356"/>
           </a:xfrm>
           <a:prstGeom prst="straightConnector1">
@@ -10367,7 +10376,7 @@
         </p:nvCxnSpPr>
         <p:spPr bwMode="auto">
           <a:xfrm>
-            <a:off x="494504" y="3240687"/>
+            <a:off x="2081327" y="3735988"/>
             <a:ext cx="44637" cy="490678"/>
           </a:xfrm>
           <a:prstGeom prst="straightConnector1">
@@ -10399,7 +10408,7 @@
         </p:nvCxnSpPr>
         <p:spPr bwMode="auto">
           <a:xfrm flipH="1">
-            <a:off x="602267" y="2954534"/>
+            <a:off x="2189090" y="3449835"/>
             <a:ext cx="165474" cy="156071"/>
           </a:xfrm>
           <a:prstGeom prst="straightConnector1">
@@ -10429,7 +10438,7 @@
         </p:nvSpPr>
         <p:spPr bwMode="auto">
           <a:xfrm rot="10800000">
-            <a:off x="494504" y="3697887"/>
+            <a:off x="2081327" y="4193188"/>
             <a:ext cx="304800" cy="228600"/>
           </a:xfrm>
           <a:prstGeom prst="ellipse">
@@ -10465,7 +10474,7 @@
         </p:nvSpPr>
         <p:spPr bwMode="auto">
           <a:xfrm>
-            <a:off x="6560169" y="2219088"/>
+            <a:off x="3905481" y="2310490"/>
             <a:ext cx="978616" cy="701433"/>
           </a:xfrm>
           <a:prstGeom prst="ellipse">
@@ -10476,7 +10485,7 @@
           </a:solidFill>
           <a:ln w="38100">
             <a:solidFill>
-              <a:srgbClr val="EF0118"/>
+              <a:srgbClr val="FF6609"/>
             </a:solidFill>
             <a:round/>
             <a:headEnd/>
@@ -10515,7 +10524,7 @@
         </p:nvSpPr>
         <p:spPr bwMode="auto">
           <a:xfrm>
-            <a:off x="1048629" y="2169918"/>
+            <a:off x="1103249" y="2183573"/>
             <a:ext cx="978616" cy="701433"/>
           </a:xfrm>
           <a:prstGeom prst="ellipse">
@@ -10526,7 +10535,7 @@
           </a:solidFill>
           <a:ln w="38100">
             <a:solidFill>
-              <a:srgbClr val="EF0118"/>
+              <a:srgbClr val="FF6609"/>
             </a:solidFill>
             <a:round/>
             <a:headEnd/>
@@ -10578,7 +10587,7 @@
         </p:nvSpPr>
         <p:spPr>
           <a:xfrm>
-            <a:off x="1666800" y="2653141"/>
+            <a:off x="1707765" y="2666796"/>
             <a:ext cx="477573" cy="230488"/>
           </a:xfrm>
           <a:prstGeom prst="rect">
@@ -10620,7 +10629,7 @@
         </p:nvSpPr>
         <p:spPr>
           <a:xfrm>
-            <a:off x="1666800" y="2900222"/>
+            <a:off x="1707765" y="2913877"/>
             <a:ext cx="477574" cy="220663"/>
           </a:xfrm>
           <a:prstGeom prst="rect">
@@ -10662,7 +10671,7 @@
         </p:nvSpPr>
         <p:spPr>
           <a:xfrm>
-            <a:off x="2144374" y="2653141"/>
+            <a:off x="2185339" y="2666796"/>
             <a:ext cx="282222" cy="230488"/>
           </a:xfrm>
           <a:prstGeom prst="rect">
@@ -10704,7 +10713,7 @@
         </p:nvSpPr>
         <p:spPr>
           <a:xfrm>
-            <a:off x="2144374" y="2890398"/>
+            <a:off x="2185339" y="2904053"/>
             <a:ext cx="282222" cy="230488"/>
           </a:xfrm>
           <a:prstGeom prst="rect">
@@ -10742,7 +10751,7 @@
         </p:nvSpPr>
         <p:spPr>
           <a:xfrm>
-            <a:off x="2426599" y="2650570"/>
+            <a:off x="2467564" y="2664225"/>
             <a:ext cx="282222" cy="230488"/>
           </a:xfrm>
           <a:prstGeom prst="rect">
@@ -10783,7 +10792,7 @@
         </p:nvSpPr>
         <p:spPr>
           <a:xfrm>
-            <a:off x="2426599" y="2887827"/>
+            <a:off x="2467564" y="2901482"/>
             <a:ext cx="282222" cy="230488"/>
           </a:xfrm>
           <a:prstGeom prst="rect">
@@ -10821,7 +10830,7 @@
         </p:nvSpPr>
         <p:spPr>
           <a:xfrm>
-            <a:off x="2690927" y="2653141"/>
+            <a:off x="2731892" y="2666796"/>
             <a:ext cx="282222" cy="230488"/>
           </a:xfrm>
           <a:prstGeom prst="rect">
@@ -10862,7 +10871,7 @@
         </p:nvSpPr>
         <p:spPr>
           <a:xfrm>
-            <a:off x="2690927" y="2890398"/>
+            <a:off x="2731892" y="2904053"/>
             <a:ext cx="282222" cy="230488"/>
           </a:xfrm>
           <a:prstGeom prst="rect">
@@ -10900,7 +10909,7 @@
         </p:nvSpPr>
         <p:spPr>
           <a:xfrm>
-            <a:off x="2973152" y="2650570"/>
+            <a:off x="3014117" y="2664225"/>
             <a:ext cx="282222" cy="230488"/>
           </a:xfrm>
           <a:prstGeom prst="rect">
@@ -10942,7 +10951,7 @@
         </p:nvSpPr>
         <p:spPr>
           <a:xfrm>
-            <a:off x="2973152" y="2887827"/>
+            <a:off x="3014117" y="2901482"/>
             <a:ext cx="282222" cy="230488"/>
           </a:xfrm>
           <a:prstGeom prst="rect">
@@ -10974,24 +10983,20 @@
       </p:sp>
       <p:cxnSp>
         <p:nvCxnSpPr>
-          <p:cNvPr id="43" name="Connecteur en arc 42"/>
+          <p:cNvPr id="50" name="Connecteur en arc 49"/>
           <p:cNvCxnSpPr>
-            <a:stCxn id="25" idx="2"/>
-            <a:endCxn id="9" idx="5"/>
+            <a:stCxn id="31" idx="2"/>
+            <a:endCxn id="16" idx="2"/>
           </p:cNvCxnSpPr>
           <p:nvPr/>
         </p:nvCxnSpPr>
         <p:spPr>
-          <a:xfrm rot="5400000" flipH="1">
-            <a:off x="1330972" y="2166374"/>
-            <a:ext cx="10281" cy="1898744"/>
-          </a:xfrm>
-          <a:prstGeom prst="curvedConnector5">
-            <a:avLst>
-              <a:gd name="adj1" fmla="val -762572"/>
-              <a:gd name="adj2" fmla="val 48304"/>
-              <a:gd name="adj3" fmla="val 3518821"/>
-            </a:avLst>
+          <a:xfrm rot="5400000">
+            <a:off x="2182919" y="3335179"/>
+            <a:ext cx="1175518" cy="769101"/>
+          </a:xfrm>
+          <a:prstGeom prst="curvedConnector2">
+            <a:avLst/>
           </a:prstGeom>
           <a:ln w="9525" cmpd="sng">
             <a:solidFill>
@@ -11016,27 +11021,81 @@
           </a:fontRef>
         </p:style>
       </p:cxnSp>
+      <p:sp>
+        <p:nvSpPr>
+          <p:cNvPr id="54" name="AutoShape 73"/>
+          <p:cNvSpPr>
+            <a:spLocks noChangeArrowheads="1"/>
+          </p:cNvSpPr>
+          <p:nvPr/>
+        </p:nvSpPr>
+        <p:spPr bwMode="auto">
+          <a:xfrm>
+            <a:off x="1222507" y="4476408"/>
+            <a:ext cx="1888843" cy="228600"/>
+          </a:xfrm>
+          <a:prstGeom prst="roundRect">
+            <a:avLst>
+              <a:gd name="adj" fmla="val 50000"/>
+            </a:avLst>
+          </a:prstGeom>
+          <a:solidFill>
+            <a:srgbClr val="FFFFFF"/>
+          </a:solidFill>
+          <a:ln w="19050">
+            <a:solidFill>
+              <a:srgbClr val="080808"/>
+            </a:solidFill>
+            <a:round/>
+            <a:headEnd/>
+            <a:tailEnd/>
+          </a:ln>
+        </p:spPr>
+        <p:txBody>
+          <a:bodyPr wrap="none" anchor="ctr"/>
+          <a:lstStyle/>
+          <a:p>
+            <a:pPr algn="ctr"/>
+            <a:r>
+              <a:rPr lang="fr-FR" sz="1400" b="1" dirty="0" smtClean="0">
+                <a:solidFill>
+                  <a:srgbClr val="000000"/>
+                </a:solidFill>
+              </a:rPr>
+              <a:t>Server s = new Server();</a:t>
+            </a:r>
+            <a:endParaRPr lang="fr-FR" sz="1400" b="1" dirty="0">
+              <a:solidFill>
+                <a:srgbClr val="000000"/>
+              </a:solidFill>
+            </a:endParaRPr>
+          </a:p>
+        </p:txBody>
+      </p:sp>
       <p:cxnSp>
         <p:nvCxnSpPr>
-          <p:cNvPr id="50" name="Connecteur en arc 49"/>
+          <p:cNvPr id="74" name="Connecteur en arc 73"/>
           <p:cNvCxnSpPr>
-            <a:stCxn id="31" idx="2"/>
-            <a:endCxn id="16" idx="2"/>
+            <a:stCxn id="54" idx="3"/>
+            <a:endCxn id="7" idx="1"/>
           </p:cNvCxnSpPr>
           <p:nvPr/>
         </p:nvCxnSpPr>
         <p:spPr>
-          <a:xfrm rot="5400000">
-            <a:off x="1609848" y="2307772"/>
-            <a:ext cx="693872" cy="2314959"/>
-          </a:xfrm>
-          <a:prstGeom prst="curvedConnector2">
-            <a:avLst/>
-          </a:prstGeom>
-          <a:ln w="9525" cmpd="sng">
+          <a:xfrm flipV="1">
+            <a:off x="3111350" y="1899963"/>
+            <a:ext cx="794131" cy="2690745"/>
+          </a:xfrm>
+          <a:prstGeom prst="curvedConnector3">
+            <a:avLst>
+              <a:gd name="adj1" fmla="val 50000"/>
+            </a:avLst>
+          </a:prstGeom>
+          <a:ln w="19050" cmpd="sng">
             <a:solidFill>
-              <a:schemeClr val="tx1"/>
+              <a:srgbClr val="FF6609"/>
             </a:solidFill>
+            <a:prstDash val="sysDash"/>
             <a:headEnd type="none"/>
             <a:tailEnd type="triangle" w="lg" len="lg"/>
           </a:ln>
@@ -11058,106 +11117,13 @@
       </p:cxnSp>
       <p:sp>
         <p:nvSpPr>
-          <p:cNvPr id="54" name="AutoShape 73"/>
-          <p:cNvSpPr>
-            <a:spLocks noChangeArrowheads="1"/>
-          </p:cNvSpPr>
-          <p:nvPr/>
-        </p:nvSpPr>
-        <p:spPr bwMode="auto">
-          <a:xfrm>
-            <a:off x="1338105" y="3835817"/>
-            <a:ext cx="1888843" cy="228600"/>
-          </a:xfrm>
-          <a:prstGeom prst="roundRect">
-            <a:avLst>
-              <a:gd name="adj" fmla="val 50000"/>
-            </a:avLst>
-          </a:prstGeom>
-          <a:solidFill>
-            <a:srgbClr val="FFFFFF"/>
-          </a:solidFill>
-          <a:ln w="19050">
-            <a:solidFill>
-              <a:srgbClr val="080808"/>
-            </a:solidFill>
-            <a:round/>
-            <a:headEnd/>
-            <a:tailEnd/>
-          </a:ln>
-        </p:spPr>
-        <p:txBody>
-          <a:bodyPr wrap="none" anchor="ctr"/>
-          <a:lstStyle/>
-          <a:p>
-            <a:pPr algn="ctr"/>
-            <a:r>
-              <a:rPr lang="fr-FR" sz="1400" b="1" dirty="0" smtClean="0">
-                <a:solidFill>
-                  <a:srgbClr val="000000"/>
-                </a:solidFill>
-              </a:rPr>
-              <a:t>Server s = new Server();</a:t>
-            </a:r>
-            <a:endParaRPr lang="fr-FR" sz="1400" b="1" dirty="0">
-              <a:solidFill>
-                <a:srgbClr val="000000"/>
-              </a:solidFill>
-            </a:endParaRPr>
-          </a:p>
-        </p:txBody>
-      </p:sp>
-      <p:cxnSp>
-        <p:nvCxnSpPr>
-          <p:cNvPr id="74" name="Connecteur en arc 73"/>
-          <p:cNvCxnSpPr>
-            <a:stCxn id="54" idx="3"/>
-            <a:endCxn id="7" idx="1"/>
-          </p:cNvCxnSpPr>
-          <p:nvPr/>
-        </p:nvCxnSpPr>
-        <p:spPr>
-          <a:xfrm flipV="1">
-            <a:off x="3226948" y="1867664"/>
-            <a:ext cx="1791872" cy="2082453"/>
-          </a:xfrm>
-          <a:prstGeom prst="curvedConnector3">
-            <a:avLst>
-              <a:gd name="adj1" fmla="val 50000"/>
-            </a:avLst>
-          </a:prstGeom>
-          <a:ln w="28575" cmpd="sng">
-            <a:solidFill>
-              <a:srgbClr val="FF0000"/>
-            </a:solidFill>
-            <a:prstDash val="dash"/>
-            <a:tailEnd type="arrow"/>
-          </a:ln>
-        </p:spPr>
-        <p:style>
-          <a:lnRef idx="2">
-            <a:schemeClr val="accent1"/>
-          </a:lnRef>
-          <a:fillRef idx="0">
-            <a:schemeClr val="accent1"/>
-          </a:fillRef>
-          <a:effectRef idx="1">
-            <a:schemeClr val="accent1"/>
-          </a:effectRef>
-          <a:fontRef idx="minor">
-            <a:schemeClr val="tx1"/>
-          </a:fontRef>
-        </p:style>
-      </p:cxnSp>
-      <p:sp>
-        <p:nvSpPr>
           <p:cNvPr id="81" name="Rectangle 80"/>
           <p:cNvSpPr/>
           <p:nvPr/>
         </p:nvSpPr>
         <p:spPr>
           <a:xfrm>
-            <a:off x="6918363" y="2745808"/>
+            <a:off x="4263675" y="2837210"/>
             <a:ext cx="477573" cy="230488"/>
           </a:xfrm>
           <a:prstGeom prst="rect">
@@ -11199,7 +11165,7 @@
         </p:nvSpPr>
         <p:spPr>
           <a:xfrm>
-            <a:off x="6918363" y="2992889"/>
+            <a:off x="4263675" y="3084291"/>
             <a:ext cx="477574" cy="220663"/>
           </a:xfrm>
           <a:prstGeom prst="rect">
@@ -11241,7 +11207,7 @@
         </p:nvSpPr>
         <p:spPr>
           <a:xfrm>
-            <a:off x="7395937" y="2745808"/>
+            <a:off x="4741249" y="2837210"/>
             <a:ext cx="282222" cy="230488"/>
           </a:xfrm>
           <a:prstGeom prst="rect">
@@ -11283,7 +11249,7 @@
         </p:nvSpPr>
         <p:spPr>
           <a:xfrm>
-            <a:off x="7395937" y="2983065"/>
+            <a:off x="4741249" y="3074467"/>
             <a:ext cx="282222" cy="230488"/>
           </a:xfrm>
           <a:prstGeom prst="rect">
@@ -11323,7 +11289,7 @@
         </p:nvSpPr>
         <p:spPr bwMode="auto">
           <a:xfrm rot="10800000">
-            <a:off x="7846304" y="3215061"/>
+            <a:off x="4577255" y="3688677"/>
             <a:ext cx="304800" cy="228600"/>
           </a:xfrm>
           <a:prstGeom prst="ellipse">
@@ -11354,14 +11320,14 @@
           <p:cNvPr id="86" name="AutoShape 68"/>
           <p:cNvCxnSpPr>
             <a:cxnSpLocks noChangeShapeType="1"/>
-            <a:endCxn id="85" idx="5"/>
+            <a:endCxn id="85" idx="4"/>
           </p:cNvCxnSpPr>
           <p:nvPr/>
         </p:nvCxnSpPr>
         <p:spPr bwMode="auto">
-          <a:xfrm>
-            <a:off x="7537048" y="3090659"/>
-            <a:ext cx="353893" cy="157880"/>
+          <a:xfrm flipH="1">
+            <a:off x="4729655" y="3223025"/>
+            <a:ext cx="152705" cy="465652"/>
           </a:xfrm>
           <a:prstGeom prst="straightConnector1">
             <a:avLst/>
@@ -11382,89 +11348,6 @@
       </p:cxnSp>
       <p:cxnSp>
         <p:nvCxnSpPr>
-          <p:cNvPr id="40" name="Connecteur en arc 39"/>
-          <p:cNvCxnSpPr>
-            <a:stCxn id="29" idx="2"/>
-            <a:endCxn id="11" idx="2"/>
-          </p:cNvCxnSpPr>
-          <p:nvPr/>
-        </p:nvCxnSpPr>
-        <p:spPr>
-          <a:xfrm rot="5400000">
-            <a:off x="1889121" y="2488269"/>
-            <a:ext cx="310301" cy="1575534"/>
-          </a:xfrm>
-          <a:prstGeom prst="curvedConnector2">
-            <a:avLst/>
-          </a:prstGeom>
-          <a:ln w="9525" cmpd="sng">
-            <a:solidFill>
-              <a:schemeClr val="tx1"/>
-            </a:solidFill>
-            <a:headEnd type="none"/>
-            <a:tailEnd type="triangle" w="lg" len="lg"/>
-          </a:ln>
-        </p:spPr>
-        <p:style>
-          <a:lnRef idx="2">
-            <a:schemeClr val="accent1"/>
-          </a:lnRef>
-          <a:fillRef idx="0">
-            <a:schemeClr val="accent1"/>
-          </a:fillRef>
-          <a:effectRef idx="1">
-            <a:schemeClr val="accent1"/>
-          </a:effectRef>
-          <a:fontRef idx="minor">
-            <a:schemeClr val="tx1"/>
-          </a:fontRef>
-        </p:style>
-      </p:cxnSp>
-      <p:cxnSp>
-        <p:nvCxnSpPr>
-          <p:cNvPr id="44" name="Connecteur en arc 43"/>
-          <p:cNvCxnSpPr>
-            <a:stCxn id="27" idx="2"/>
-            <a:endCxn id="10" idx="2"/>
-          </p:cNvCxnSpPr>
-          <p:nvPr/>
-        </p:nvCxnSpPr>
-        <p:spPr>
-          <a:xfrm rot="5400000" flipH="1">
-            <a:off x="1688975" y="2239581"/>
-            <a:ext cx="217663" cy="1539806"/>
-          </a:xfrm>
-          <a:prstGeom prst="curvedConnector4">
-            <a:avLst>
-              <a:gd name="adj1" fmla="val -105025"/>
-              <a:gd name="adj2" fmla="val 82074"/>
-            </a:avLst>
-          </a:prstGeom>
-          <a:ln w="9525" cmpd="sng">
-            <a:solidFill>
-              <a:schemeClr val="tx1"/>
-            </a:solidFill>
-            <a:headEnd type="none"/>
-            <a:tailEnd type="triangle" w="lg" len="lg"/>
-          </a:ln>
-        </p:spPr>
-        <p:style>
-          <a:lnRef idx="2">
-            <a:schemeClr val="accent1"/>
-          </a:lnRef>
-          <a:fillRef idx="0">
-            <a:schemeClr val="accent1"/>
-          </a:fillRef>
-          <a:effectRef idx="1">
-            <a:schemeClr val="accent1"/>
-          </a:effectRef>
-          <a:fontRef idx="minor">
-            <a:schemeClr val="tx1"/>
-          </a:fontRef>
-        </p:style>
-      </p:cxnSp>
-      <p:cxnSp>
-        <p:nvCxnSpPr>
           <p:cNvPr id="51" name="Connecteur droit 50"/>
           <p:cNvCxnSpPr>
             <a:stCxn id="27" idx="2"/>
@@ -11473,7 +11356,7 @@
         </p:nvCxnSpPr>
         <p:spPr>
           <a:xfrm flipV="1">
-            <a:off x="2567710" y="2976852"/>
+            <a:off x="2608675" y="2990507"/>
             <a:ext cx="0" cy="141463"/>
           </a:xfrm>
           <a:prstGeom prst="line">
@@ -11508,7 +11391,7 @@
         </p:nvCxnSpPr>
         <p:spPr>
           <a:xfrm flipV="1">
-            <a:off x="2832039" y="2979422"/>
+            <a:off x="2873004" y="2993077"/>
             <a:ext cx="0" cy="141463"/>
           </a:xfrm>
           <a:prstGeom prst="line">
@@ -11543,7 +11426,7 @@
         </p:nvCxnSpPr>
         <p:spPr>
           <a:xfrm flipV="1">
-            <a:off x="3114264" y="2965307"/>
+            <a:off x="3155229" y="2978962"/>
             <a:ext cx="0" cy="141463"/>
           </a:xfrm>
           <a:prstGeom prst="line">
@@ -11578,7 +11461,7 @@
         </p:nvCxnSpPr>
         <p:spPr>
           <a:xfrm flipV="1">
-            <a:off x="2285485" y="2979422"/>
+            <a:off x="2326450" y="2993077"/>
             <a:ext cx="0" cy="141463"/>
           </a:xfrm>
           <a:prstGeom prst="line">
@@ -11588,6 +11471,112 @@
             <a:solidFill>
               <a:schemeClr val="tx1"/>
             </a:solidFill>
+          </a:ln>
+        </p:spPr>
+        <p:style>
+          <a:lnRef idx="2">
+            <a:schemeClr val="accent1"/>
+          </a:lnRef>
+          <a:fillRef idx="0">
+            <a:schemeClr val="accent1"/>
+          </a:fillRef>
+          <a:effectRef idx="1">
+            <a:schemeClr val="accent1"/>
+          </a:effectRef>
+          <a:fontRef idx="minor">
+            <a:schemeClr val="tx1"/>
+          </a:fontRef>
+        </p:style>
+      </p:cxnSp>
+      <p:cxnSp>
+        <p:nvCxnSpPr>
+          <p:cNvPr id="55" name="AutoShape 63"/>
+          <p:cNvCxnSpPr>
+            <a:cxnSpLocks noChangeShapeType="1"/>
+            <a:stCxn id="29" idx="2"/>
+            <a:endCxn id="11" idx="3"/>
+          </p:cNvCxnSpPr>
+          <p:nvPr/>
+        </p:nvCxnSpPr>
+        <p:spPr bwMode="auto">
+          <a:xfrm flipH="1">
+            <a:off x="2798690" y="3134541"/>
+            <a:ext cx="74313" cy="711125"/>
+          </a:xfrm>
+          <a:prstGeom prst="straightConnector1">
+            <a:avLst/>
+          </a:prstGeom>
+          <a:solidFill>
+            <a:srgbClr val="FFFFFF"/>
+          </a:solidFill>
+          <a:ln w="9525">
+            <a:solidFill>
+              <a:schemeClr val="tx1"/>
+            </a:solidFill>
+            <a:round/>
+            <a:headEnd type="none"/>
+            <a:tailEnd type="triangle" w="lg" len="lg"/>
+          </a:ln>
+          <a:extLst/>
+        </p:spPr>
+      </p:cxnSp>
+      <p:cxnSp>
+        <p:nvCxnSpPr>
+          <p:cNvPr id="58" name="AutoShape 63"/>
+          <p:cNvCxnSpPr>
+            <a:cxnSpLocks noChangeShapeType="1"/>
+            <a:stCxn id="27" idx="2"/>
+            <a:endCxn id="10" idx="3"/>
+          </p:cNvCxnSpPr>
+          <p:nvPr/>
+        </p:nvCxnSpPr>
+        <p:spPr bwMode="auto">
+          <a:xfrm flipH="1">
+            <a:off x="2570090" y="3131970"/>
+            <a:ext cx="38585" cy="210101"/>
+          </a:xfrm>
+          <a:prstGeom prst="straightConnector1">
+            <a:avLst/>
+          </a:prstGeom>
+          <a:solidFill>
+            <a:srgbClr val="FFFFFF"/>
+          </a:solidFill>
+          <a:ln w="9525">
+            <a:solidFill>
+              <a:schemeClr val="tx1"/>
+            </a:solidFill>
+            <a:round/>
+            <a:headEnd type="none"/>
+            <a:tailEnd type="triangle" w="lg" len="lg"/>
+          </a:ln>
+          <a:extLst/>
+        </p:spPr>
+      </p:cxnSp>
+      <p:cxnSp>
+        <p:nvCxnSpPr>
+          <p:cNvPr id="64" name="Connecteur en arc 63"/>
+          <p:cNvCxnSpPr>
+            <a:stCxn id="25" idx="2"/>
+            <a:endCxn id="9" idx="4"/>
+          </p:cNvCxnSpPr>
+          <p:nvPr/>
+        </p:nvCxnSpPr>
+        <p:spPr>
+          <a:xfrm rot="5400000">
+            <a:off x="1979366" y="3236503"/>
+            <a:ext cx="449047" cy="245123"/>
+          </a:xfrm>
+          <a:prstGeom prst="curvedConnector3">
+            <a:avLst>
+              <a:gd name="adj1" fmla="val 34796"/>
+            </a:avLst>
+          </a:prstGeom>
+          <a:ln w="9525" cmpd="sng">
+            <a:solidFill>
+              <a:schemeClr val="tx1"/>
+            </a:solidFill>
+            <a:headEnd type="none"/>
+            <a:tailEnd type="triangle" w="lg" len="lg"/>
           </a:ln>
         </p:spPr>
         <p:style>
@@ -12082,7 +12071,7 @@
       </p:grpSpPr>
       <p:sp>
         <p:nvSpPr>
-          <p:cNvPr id="4" name="AutoShape 2"/>
+          <p:cNvPr id="6" name="AutoShape 2"/>
           <p:cNvSpPr>
             <a:spLocks noChangeArrowheads="1"/>
           </p:cNvSpPr>
@@ -12090,15 +12079,18 @@
         </p:nvSpPr>
         <p:spPr bwMode="auto">
           <a:xfrm>
-            <a:off x="154476" y="2120980"/>
-            <a:ext cx="3200400" cy="2819400"/>
+            <a:off x="3594545" y="2246398"/>
+            <a:ext cx="3200400" cy="2707637"/>
           </a:xfrm>
           <a:prstGeom prst="roundRect">
             <a:avLst>
-              <a:gd name="adj" fmla="val 16667"/>
+              <a:gd name="adj" fmla="val 8598"/>
             </a:avLst>
           </a:prstGeom>
           <a:ln w="38100" cmpd="sng">
+            <a:solidFill>
+              <a:srgbClr val="743FA2"/>
+            </a:solidFill>
             <a:headEnd/>
             <a:tailEnd/>
           </a:ln>
@@ -12134,14 +12126,14 @@
       </p:sp>
       <p:sp>
         <p:nvSpPr>
-          <p:cNvPr id="5" name="ZoneTexte 4"/>
+          <p:cNvPr id="7" name="ZoneTexte 6"/>
           <p:cNvSpPr txBox="1"/>
           <p:nvPr/>
         </p:nvSpPr>
         <p:spPr>
           <a:xfrm>
-            <a:off x="154476" y="1544498"/>
-            <a:ext cx="479618" cy="646331"/>
+            <a:off x="3434840" y="1708358"/>
+            <a:ext cx="438041" cy="646331"/>
           </a:xfrm>
           <a:prstGeom prst="rect">
             <a:avLst/>
@@ -12157,15 +12149,15 @@
             <a:r>
               <a:rPr lang="fr-FR" sz="3600" b="1" dirty="0" smtClean="0">
                 <a:solidFill>
-                  <a:schemeClr val="accent4"/>
+                  <a:srgbClr val="743FA2"/>
                 </a:solidFill>
                 <a:latin typeface="Symbol" charset="0"/>
               </a:rPr>
-              <a:t>a</a:t>
+              <a:t>b</a:t>
             </a:r>
             <a:endParaRPr lang="fr-FR" sz="3600" b="1" dirty="0" smtClean="0">
               <a:solidFill>
-                <a:schemeClr val="accent4"/>
+                <a:srgbClr val="743FA2"/>
               </a:solidFill>
             </a:endParaRPr>
           </a:p>
@@ -12173,7 +12165,7 @@
       </p:sp>
       <p:sp>
         <p:nvSpPr>
-          <p:cNvPr id="6" name="AutoShape 2"/>
+          <p:cNvPr id="19" name="Oval 20"/>
           <p:cNvSpPr>
             <a:spLocks noChangeArrowheads="1"/>
           </p:cNvSpPr>
@@ -12181,90 +12173,213 @@
         </p:nvSpPr>
         <p:spPr bwMode="auto">
           <a:xfrm>
-            <a:off x="5082940" y="2120980"/>
-            <a:ext cx="3200400" cy="2819400"/>
-          </a:xfrm>
-          <a:prstGeom prst="roundRect">
-            <a:avLst>
-              <a:gd name="adj" fmla="val 16667"/>
-            </a:avLst>
-          </a:prstGeom>
-          <a:ln w="38100" cmpd="sng">
+            <a:off x="5153704" y="2289886"/>
+            <a:ext cx="978616" cy="701433"/>
+          </a:xfrm>
+          <a:prstGeom prst="ellipse">
+            <a:avLst/>
+          </a:prstGeom>
+          <a:solidFill>
+            <a:srgbClr val="FFFFFF"/>
+          </a:solidFill>
+          <a:ln w="38100">
+            <a:solidFill>
+              <a:srgbClr val="FF6609"/>
+            </a:solidFill>
+            <a:round/>
             <a:headEnd/>
             <a:tailEnd/>
           </a:ln>
         </p:spPr>
+        <p:txBody>
+          <a:bodyPr wrap="none" anchor="ctr"/>
+          <a:lstStyle/>
+          <a:p>
+            <a:r>
+              <a:rPr lang="fr-FR" dirty="0" err="1" smtClean="0"/>
+              <a:t>cog</a:t>
+            </a:r>
+            <a:r>
+              <a:rPr lang="fr-FR" dirty="0" smtClean="0"/>
+              <a:t> </a:t>
+            </a:r>
+            <a:r>
+              <a:rPr lang="fr-FR" b="1" dirty="0" smtClean="0">
+                <a:latin typeface="Symbol" charset="0"/>
+              </a:rPr>
+              <a:t>b</a:t>
+            </a:r>
+            <a:endParaRPr lang="fr-FR" b="1" dirty="0" smtClean="0"/>
+          </a:p>
+        </p:txBody>
+      </p:sp>
+      <p:sp>
+        <p:nvSpPr>
+          <p:cNvPr id="55" name="Rectangle 54"/>
+          <p:cNvSpPr/>
+          <p:nvPr/>
+        </p:nvSpPr>
+        <p:spPr>
+          <a:xfrm>
+            <a:off x="5921548" y="2775641"/>
+            <a:ext cx="477573" cy="230488"/>
+          </a:xfrm>
+          <a:prstGeom prst="rect">
+            <a:avLst/>
+          </a:prstGeom>
+        </p:spPr>
         <p:style>
           <a:lnRef idx="2">
-            <a:schemeClr val="accent4"/>
+            <a:schemeClr val="dk1"/>
           </a:lnRef>
           <a:fillRef idx="1">
             <a:schemeClr val="lt1"/>
           </a:fillRef>
           <a:effectRef idx="0">
-            <a:schemeClr val="accent4"/>
+            <a:schemeClr val="dk1"/>
           </a:effectRef>
           <a:fontRef idx="minor">
             <a:schemeClr val="dk1"/>
           </a:fontRef>
         </p:style>
         <p:txBody>
-          <a:bodyPr wrap="none" anchor="ctr"/>
+          <a:bodyPr rtlCol="0" anchor="ctr"/>
           <a:lstStyle/>
           <a:p>
             <a:pPr algn="ctr"/>
-            <a:endParaRPr lang="fr-FR" b="1" dirty="0" smtClean="0">
-              <a:latin typeface="Symbol" charset="0"/>
-            </a:endParaRPr>
-          </a:p>
+            <a:r>
+              <a:rPr lang="fr-FR" sz="1100" b="1" dirty="0" smtClean="0"/>
+              <a:t>ID</a:t>
+            </a:r>
+            <a:endParaRPr lang="fr-FR" sz="1100" b="1" dirty="0"/>
+          </a:p>
+        </p:txBody>
+      </p:sp>
+      <p:sp>
+        <p:nvSpPr>
+          <p:cNvPr id="56" name="Rectangle 55"/>
+          <p:cNvSpPr/>
+          <p:nvPr/>
+        </p:nvSpPr>
+        <p:spPr>
+          <a:xfrm>
+            <a:off x="5921548" y="3022722"/>
+            <a:ext cx="477574" cy="220663"/>
+          </a:xfrm>
+          <a:prstGeom prst="rect">
+            <a:avLst/>
+          </a:prstGeom>
+        </p:spPr>
+        <p:style>
+          <a:lnRef idx="2">
+            <a:schemeClr val="dk1"/>
+          </a:lnRef>
+          <a:fillRef idx="1">
+            <a:schemeClr val="lt1"/>
+          </a:fillRef>
+          <a:effectRef idx="0">
+            <a:schemeClr val="dk1"/>
+          </a:effectRef>
+          <a:fontRef idx="minor">
+            <a:schemeClr val="dk1"/>
+          </a:fontRef>
+        </p:style>
+        <p:txBody>
+          <a:bodyPr rtlCol="0" anchor="ctr"/>
+          <a:lstStyle/>
           <a:p>
             <a:pPr algn="ctr"/>
-            <a:endParaRPr lang="fr-FR" b="1" dirty="0"/>
-          </a:p>
-        </p:txBody>
-      </p:sp>
-      <p:sp>
-        <p:nvSpPr>
-          <p:cNvPr id="7" name="ZoneTexte 6"/>
-          <p:cNvSpPr txBox="1"/>
+            <a:r>
+              <a:rPr lang="fr-FR" sz="1100" b="1" dirty="0" err="1" smtClean="0"/>
+              <a:t>ref</a:t>
+            </a:r>
+            <a:endParaRPr lang="fr-FR" sz="1100" b="1" dirty="0"/>
+          </a:p>
+        </p:txBody>
+      </p:sp>
+      <p:sp>
+        <p:nvSpPr>
+          <p:cNvPr id="57" name="Rectangle 56"/>
+          <p:cNvSpPr/>
           <p:nvPr/>
         </p:nvSpPr>
         <p:spPr>
           <a:xfrm>
-            <a:off x="5018820" y="1544498"/>
-            <a:ext cx="438041" cy="646331"/>
+            <a:off x="6399122" y="2775641"/>
+            <a:ext cx="282222" cy="230488"/>
           </a:xfrm>
           <a:prstGeom prst="rect">
             <a:avLst/>
           </a:prstGeom>
-          <a:noFill/>
-        </p:spPr>
-        <p:txBody>
-          <a:bodyPr wrap="none" rtlCol="0">
-            <a:spAutoFit/>
-          </a:bodyPr>
-          <a:lstStyle/>
-          <a:p>
-            <a:r>
-              <a:rPr lang="fr-FR" sz="3600" b="1" dirty="0" smtClean="0">
-                <a:solidFill>
-                  <a:srgbClr val="8064A2"/>
-                </a:solidFill>
-                <a:latin typeface="Symbol" charset="0"/>
-              </a:rPr>
-              <a:t>b</a:t>
-            </a:r>
-            <a:endParaRPr lang="fr-FR" sz="3600" b="1" dirty="0" smtClean="0">
-              <a:solidFill>
-                <a:srgbClr val="8064A2"/>
-              </a:solidFill>
-            </a:endParaRPr>
-          </a:p>
-        </p:txBody>
-      </p:sp>
-      <p:sp>
-        <p:nvSpPr>
-          <p:cNvPr id="9" name="Oval 60"/>
+        </p:spPr>
+        <p:style>
+          <a:lnRef idx="2">
+            <a:schemeClr val="dk1"/>
+          </a:lnRef>
+          <a:fillRef idx="1">
+            <a:schemeClr val="lt1"/>
+          </a:fillRef>
+          <a:effectRef idx="0">
+            <a:schemeClr val="dk1"/>
+          </a:effectRef>
+          <a:fontRef idx="minor">
+            <a:schemeClr val="dk1"/>
+          </a:fontRef>
+        </p:style>
+        <p:txBody>
+          <a:bodyPr rtlCol="0" anchor="ctr"/>
+          <a:lstStyle/>
+          <a:p>
+            <a:pPr algn="ctr"/>
+            <a:r>
+              <a:rPr lang="fr-FR" sz="1100" b="1" dirty="0" smtClean="0"/>
+              <a:t>1</a:t>
+            </a:r>
+            <a:endParaRPr lang="fr-FR" sz="1100" b="1" dirty="0"/>
+          </a:p>
+        </p:txBody>
+      </p:sp>
+      <p:sp>
+        <p:nvSpPr>
+          <p:cNvPr id="58" name="Rectangle 57"/>
+          <p:cNvSpPr/>
+          <p:nvPr/>
+        </p:nvSpPr>
+        <p:spPr>
+          <a:xfrm>
+            <a:off x="6399122" y="3026553"/>
+            <a:ext cx="282222" cy="230488"/>
+          </a:xfrm>
+          <a:prstGeom prst="rect">
+            <a:avLst/>
+          </a:prstGeom>
+        </p:spPr>
+        <p:style>
+          <a:lnRef idx="2">
+            <a:schemeClr val="dk1"/>
+          </a:lnRef>
+          <a:fillRef idx="1">
+            <a:schemeClr val="lt1"/>
+          </a:fillRef>
+          <a:effectRef idx="0">
+            <a:schemeClr val="dk1"/>
+          </a:effectRef>
+          <a:fontRef idx="minor">
+            <a:schemeClr val="dk1"/>
+          </a:fontRef>
+        </p:style>
+        <p:txBody>
+          <a:bodyPr rtlCol="0" anchor="ctr"/>
+          <a:lstStyle/>
+          <a:p>
+            <a:pPr algn="ctr"/>
+            <a:endParaRPr lang="fr-FR"/>
+          </a:p>
+        </p:txBody>
+      </p:sp>
+      <p:sp>
+        <p:nvSpPr>
+          <p:cNvPr id="65" name="Oval 67"/>
           <p:cNvSpPr>
             <a:spLocks noChangeArrowheads="1"/>
           </p:cNvSpPr>
@@ -12272,8 +12387,8 @@
         </p:nvSpPr>
         <p:spPr bwMode="auto">
           <a:xfrm rot="10800000">
-            <a:off x="820029" y="3839312"/>
-            <a:ext cx="304800" cy="152400"/>
+            <a:off x="6209163" y="3389058"/>
+            <a:ext cx="304800" cy="228600"/>
           </a:xfrm>
           <a:prstGeom prst="ellipse">
             <a:avLst/>
@@ -12298,92 +12413,19 @@
           </a:p>
         </p:txBody>
       </p:sp>
-      <p:sp>
-        <p:nvSpPr>
-          <p:cNvPr id="10" name="Oval 61"/>
-          <p:cNvSpPr>
-            <a:spLocks noChangeArrowheads="1"/>
-          </p:cNvSpPr>
-          <p:nvPr/>
-        </p:nvSpPr>
-        <p:spPr bwMode="auto">
-          <a:xfrm rot="10800000">
-            <a:off x="1201029" y="3534512"/>
-            <a:ext cx="304800" cy="152400"/>
-          </a:xfrm>
-          <a:prstGeom prst="ellipse">
-            <a:avLst/>
-          </a:prstGeom>
-          <a:solidFill>
-            <a:srgbClr val="FFFFFF"/>
-          </a:solidFill>
-          <a:ln w="19050">
-            <a:solidFill>
-              <a:schemeClr val="tx1"/>
-            </a:solidFill>
-            <a:round/>
-            <a:headEnd type="none"/>
-            <a:tailEnd type="triangle" w="lg" len="lg"/>
-          </a:ln>
-        </p:spPr>
-        <p:txBody>
-          <a:bodyPr wrap="none" anchor="ctr"/>
-          <a:lstStyle/>
-          <a:p>
-            <a:endParaRPr lang="fr-FR"/>
-          </a:p>
-        </p:txBody>
-      </p:sp>
-      <p:sp>
-        <p:nvSpPr>
-          <p:cNvPr id="11" name="Oval 62"/>
-          <p:cNvSpPr>
-            <a:spLocks noChangeArrowheads="1"/>
-          </p:cNvSpPr>
-          <p:nvPr/>
-        </p:nvSpPr>
-        <p:spPr bwMode="auto">
-          <a:xfrm rot="10800000">
-            <a:off x="1429629" y="4067912"/>
-            <a:ext cx="304800" cy="228600"/>
-          </a:xfrm>
-          <a:prstGeom prst="ellipse">
-            <a:avLst/>
-          </a:prstGeom>
-          <a:solidFill>
-            <a:srgbClr val="FFFFFF"/>
-          </a:solidFill>
-          <a:ln w="19050">
-            <a:solidFill>
-              <a:schemeClr val="tx1"/>
-            </a:solidFill>
-            <a:round/>
-            <a:headEnd type="none"/>
-            <a:tailEnd type="triangle" w="lg" len="lg"/>
-          </a:ln>
-        </p:spPr>
-        <p:txBody>
-          <a:bodyPr wrap="none" anchor="ctr"/>
-          <a:lstStyle/>
-          <a:p>
-            <a:endParaRPr lang="fr-FR"/>
-          </a:p>
-        </p:txBody>
-      </p:sp>
       <p:cxnSp>
         <p:nvCxnSpPr>
-          <p:cNvPr id="12" name="AutoShape 63"/>
+          <p:cNvPr id="66" name="AutoShape 68"/>
           <p:cNvCxnSpPr>
             <a:cxnSpLocks noChangeShapeType="1"/>
-            <a:stCxn id="10" idx="0"/>
-            <a:endCxn id="11" idx="4"/>
+            <a:endCxn id="65" idx="3"/>
           </p:cNvCxnSpPr>
           <p:nvPr/>
         </p:nvCxnSpPr>
         <p:spPr bwMode="auto">
-          <a:xfrm>
-            <a:off x="1353429" y="3686912"/>
-            <a:ext cx="228600" cy="381000"/>
+          <a:xfrm flipH="1">
+            <a:off x="6469326" y="3159201"/>
+            <a:ext cx="70907" cy="263335"/>
           </a:xfrm>
           <a:prstGeom prst="straightConnector1">
             <a:avLst/>
@@ -12402,20 +12444,469 @@
           <a:extLst/>
         </p:spPr>
       </p:cxnSp>
+      <p:sp>
+        <p:nvSpPr>
+          <p:cNvPr id="40" name="AutoShape 73"/>
+          <p:cNvSpPr>
+            <a:spLocks noChangeArrowheads="1"/>
+          </p:cNvSpPr>
+          <p:nvPr/>
+        </p:nvSpPr>
+        <p:spPr bwMode="auto">
+          <a:xfrm>
+            <a:off x="3699318" y="3695772"/>
+            <a:ext cx="2990701" cy="1195630"/>
+          </a:xfrm>
+          <a:prstGeom prst="roundRect">
+            <a:avLst>
+              <a:gd name="adj" fmla="val 14233"/>
+            </a:avLst>
+          </a:prstGeom>
+          <a:solidFill>
+            <a:srgbClr val="FFFFFF"/>
+          </a:solidFill>
+          <a:ln w="19050">
+            <a:solidFill>
+              <a:srgbClr val="080808"/>
+            </a:solidFill>
+            <a:round/>
+            <a:headEnd/>
+            <a:tailEnd/>
+          </a:ln>
+        </p:spPr>
+        <p:txBody>
+          <a:bodyPr wrap="none" anchor="ctr"/>
+          <a:lstStyle/>
+          <a:p>
+            <a:r>
+              <a:rPr lang="fr-FR" sz="1400" b="1" dirty="0" err="1"/>
+              <a:t>e</a:t>
+            </a:r>
+            <a:r>
+              <a:rPr lang="fr-FR" sz="1400" b="1" dirty="0" err="1" smtClean="0"/>
+              <a:t>xecute</a:t>
+            </a:r>
+            <a:r>
+              <a:rPr lang="fr-FR" sz="1400" b="1" dirty="0" smtClean="0">
+                <a:solidFill>
+                  <a:srgbClr val="000000"/>
+                </a:solidFill>
+              </a:rPr>
+              <a:t>(</a:t>
+            </a:r>
+            <a:r>
+              <a:rPr lang="fr-FR" sz="1400" b="1" dirty="0" err="1" smtClean="0">
+                <a:solidFill>
+                  <a:srgbClr val="000000"/>
+                </a:solidFill>
+              </a:rPr>
+              <a:t>name</a:t>
+            </a:r>
+            <a:r>
+              <a:rPr lang="fr-FR" sz="1400" b="1" dirty="0" smtClean="0">
+                <a:solidFill>
+                  <a:srgbClr val="000000"/>
+                </a:solidFill>
+              </a:rPr>
+              <a:t>,  id, </a:t>
+            </a:r>
+            <a:r>
+              <a:rPr lang="fr-FR" sz="1400" b="1" dirty="0" err="1" smtClean="0">
+                <a:solidFill>
+                  <a:srgbClr val="000000"/>
+                </a:solidFill>
+              </a:rPr>
+              <a:t>params</a:t>
+            </a:r>
+            <a:r>
+              <a:rPr lang="fr-FR" sz="1400" b="1" dirty="0" smtClean="0">
+                <a:solidFill>
+                  <a:srgbClr val="000000"/>
+                </a:solidFill>
+              </a:rPr>
+              <a:t>) </a:t>
+            </a:r>
+            <a:r>
+              <a:rPr lang="fr-FR" sz="1400" b="1" dirty="0" smtClean="0">
+                <a:solidFill>
+                  <a:srgbClr val="000000"/>
+                </a:solidFill>
+              </a:rPr>
+              <a:t>:</a:t>
+            </a:r>
+            <a:endParaRPr lang="fr-FR" sz="1400" b="1" dirty="0" smtClean="0">
+              <a:solidFill>
+                <a:srgbClr val="000000"/>
+              </a:solidFill>
+            </a:endParaRPr>
+          </a:p>
+          <a:p>
+            <a:r>
+              <a:rPr lang="fr-FR" sz="1400" b="1" dirty="0" smtClean="0">
+                <a:solidFill>
+                  <a:srgbClr val="000000"/>
+                </a:solidFill>
+              </a:rPr>
+              <a:t>   m = </a:t>
+            </a:r>
+            <a:r>
+              <a:rPr lang="fr-FR" sz="1400" b="1" dirty="0" err="1" smtClean="0">
+                <a:solidFill>
+                  <a:srgbClr val="000000"/>
+                </a:solidFill>
+              </a:rPr>
+              <a:t>retrieveMethod</a:t>
+            </a:r>
+            <a:r>
+              <a:rPr lang="fr-FR" sz="1400" b="1" dirty="0" smtClean="0">
+                <a:solidFill>
+                  <a:srgbClr val="000000"/>
+                </a:solidFill>
+              </a:rPr>
+              <a:t>(</a:t>
+            </a:r>
+            <a:r>
+              <a:rPr lang="fr-FR" sz="1400" b="1" dirty="0" err="1" smtClean="0">
+                <a:solidFill>
+                  <a:srgbClr val="000000"/>
+                </a:solidFill>
+              </a:rPr>
+              <a:t>name</a:t>
+            </a:r>
+            <a:r>
+              <a:rPr lang="fr-FR" sz="1400" b="1" dirty="0" smtClean="0">
+                <a:solidFill>
+                  <a:srgbClr val="000000"/>
+                </a:solidFill>
+              </a:rPr>
+              <a:t>, </a:t>
+            </a:r>
+            <a:r>
+              <a:rPr lang="fr-FR" sz="1400" b="1" dirty="0" err="1" smtClean="0">
+                <a:solidFill>
+                  <a:srgbClr val="000000"/>
+                </a:solidFill>
+              </a:rPr>
+              <a:t>params</a:t>
+            </a:r>
+            <a:r>
+              <a:rPr lang="fr-FR" sz="1400" b="1" dirty="0" smtClean="0">
+                <a:solidFill>
+                  <a:srgbClr val="000000"/>
+                </a:solidFill>
+              </a:rPr>
+              <a:t>)</a:t>
+            </a:r>
+          </a:p>
+          <a:p>
+            <a:r>
+              <a:rPr lang="fr-FR" sz="1400" b="1" dirty="0" smtClean="0">
+                <a:solidFill>
+                  <a:srgbClr val="000000"/>
+                </a:solidFill>
+              </a:rPr>
+              <a:t>   o = </a:t>
+            </a:r>
+            <a:r>
+              <a:rPr lang="fr-FR" sz="1400" b="1" dirty="0" err="1" smtClean="0">
+                <a:solidFill>
+                  <a:srgbClr val="000000"/>
+                </a:solidFill>
+              </a:rPr>
+              <a:t>retrieveObject</a:t>
+            </a:r>
+            <a:r>
+              <a:rPr lang="fr-FR" sz="1400" b="1" dirty="0" smtClean="0">
+                <a:solidFill>
+                  <a:srgbClr val="000000"/>
+                </a:solidFill>
+              </a:rPr>
+              <a:t>(id)</a:t>
+            </a:r>
+          </a:p>
+          <a:p>
+            <a:r>
+              <a:rPr lang="fr-FR" sz="1400" b="1" dirty="0" smtClean="0">
+                <a:solidFill>
+                  <a:srgbClr val="000000"/>
+                </a:solidFill>
+              </a:rPr>
+              <a:t>   r = </a:t>
+            </a:r>
+            <a:r>
+              <a:rPr lang="fr-FR" sz="1400" b="1" dirty="0" err="1" smtClean="0">
+                <a:solidFill>
+                  <a:srgbClr val="000000"/>
+                </a:solidFill>
+              </a:rPr>
+              <a:t>o.m</a:t>
+            </a:r>
+            <a:r>
+              <a:rPr lang="fr-FR" sz="1400" b="1" dirty="0" smtClean="0">
+                <a:solidFill>
+                  <a:srgbClr val="000000"/>
+                </a:solidFill>
+              </a:rPr>
+              <a:t>(</a:t>
+            </a:r>
+            <a:r>
+              <a:rPr lang="fr-FR" sz="1400" b="1" dirty="0" err="1" smtClean="0">
+                <a:solidFill>
+                  <a:srgbClr val="000000"/>
+                </a:solidFill>
+              </a:rPr>
+              <a:t>params</a:t>
+            </a:r>
+            <a:r>
+              <a:rPr lang="fr-FR" sz="1400" b="1" dirty="0" smtClean="0">
+                <a:solidFill>
+                  <a:srgbClr val="000000"/>
+                </a:solidFill>
+              </a:rPr>
+              <a:t>)</a:t>
+            </a:r>
+          </a:p>
+          <a:p>
+            <a:r>
+              <a:rPr lang="fr-FR" sz="1400" b="1" dirty="0" smtClean="0">
+                <a:solidFill>
+                  <a:srgbClr val="000000"/>
+                </a:solidFill>
+              </a:rPr>
+              <a:t>   return </a:t>
+            </a:r>
+            <a:r>
+              <a:rPr lang="fr-FR" sz="1400" b="1" dirty="0" smtClean="0">
+                <a:solidFill>
+                  <a:srgbClr val="000000"/>
+                </a:solidFill>
+              </a:rPr>
+              <a:t>r</a:t>
+            </a:r>
+            <a:endParaRPr lang="fr-FR" sz="1400" b="1" dirty="0" smtClean="0">
+              <a:solidFill>
+                <a:srgbClr val="000000"/>
+              </a:solidFill>
+            </a:endParaRPr>
+          </a:p>
+        </p:txBody>
+      </p:sp>
+      <p:sp>
+        <p:nvSpPr>
+          <p:cNvPr id="41" name="AutoShape 2"/>
+          <p:cNvSpPr>
+            <a:spLocks noChangeArrowheads="1"/>
+          </p:cNvSpPr>
+          <p:nvPr/>
+        </p:nvSpPr>
+        <p:spPr bwMode="auto">
+          <a:xfrm>
+            <a:off x="951522" y="2254957"/>
+            <a:ext cx="2306246" cy="2699078"/>
+          </a:xfrm>
+          <a:prstGeom prst="roundRect">
+            <a:avLst>
+              <a:gd name="adj" fmla="val 9414"/>
+            </a:avLst>
+          </a:prstGeom>
+          <a:ln w="38100" cmpd="sng">
+            <a:solidFill>
+              <a:srgbClr val="743FA2"/>
+            </a:solidFill>
+            <a:headEnd/>
+            <a:tailEnd/>
+          </a:ln>
+        </p:spPr>
+        <p:style>
+          <a:lnRef idx="2">
+            <a:schemeClr val="accent4"/>
+          </a:lnRef>
+          <a:fillRef idx="1">
+            <a:schemeClr val="lt1"/>
+          </a:fillRef>
+          <a:effectRef idx="0">
+            <a:schemeClr val="accent4"/>
+          </a:effectRef>
+          <a:fontRef idx="minor">
+            <a:schemeClr val="dk1"/>
+          </a:fontRef>
+        </p:style>
+        <p:txBody>
+          <a:bodyPr wrap="none" anchor="ctr"/>
+          <a:lstStyle/>
+          <a:p>
+            <a:pPr algn="ctr"/>
+            <a:endParaRPr lang="fr-FR" b="1" dirty="0" smtClean="0">
+              <a:latin typeface="Symbol" charset="0"/>
+            </a:endParaRPr>
+          </a:p>
+          <a:p>
+            <a:pPr algn="ctr"/>
+            <a:endParaRPr lang="fr-FR" b="1" dirty="0"/>
+          </a:p>
+        </p:txBody>
+      </p:sp>
+      <p:sp>
+        <p:nvSpPr>
+          <p:cNvPr id="42" name="ZoneTexte 41"/>
+          <p:cNvSpPr txBox="1"/>
+          <p:nvPr/>
+        </p:nvSpPr>
+        <p:spPr>
+          <a:xfrm>
+            <a:off x="951522" y="1702844"/>
+            <a:ext cx="479618" cy="646331"/>
+          </a:xfrm>
+          <a:prstGeom prst="rect">
+            <a:avLst/>
+          </a:prstGeom>
+          <a:noFill/>
+        </p:spPr>
+        <p:txBody>
+          <a:bodyPr wrap="none" rtlCol="0">
+            <a:spAutoFit/>
+          </a:bodyPr>
+          <a:lstStyle/>
+          <a:p>
+            <a:r>
+              <a:rPr lang="fr-FR" sz="3600" b="1" dirty="0" smtClean="0">
+                <a:solidFill>
+                  <a:srgbClr val="743FA2"/>
+                </a:solidFill>
+                <a:latin typeface="Symbol" charset="0"/>
+              </a:rPr>
+              <a:t>a</a:t>
+            </a:r>
+            <a:endParaRPr lang="fr-FR" sz="3600" b="1" dirty="0" smtClean="0">
+              <a:solidFill>
+                <a:srgbClr val="743FA2"/>
+              </a:solidFill>
+            </a:endParaRPr>
+          </a:p>
+        </p:txBody>
+      </p:sp>
+      <p:sp>
+        <p:nvSpPr>
+          <p:cNvPr id="44" name="Oval 60"/>
+          <p:cNvSpPr>
+            <a:spLocks noChangeArrowheads="1"/>
+          </p:cNvSpPr>
+          <p:nvPr/>
+        </p:nvSpPr>
+        <p:spPr bwMode="auto">
+          <a:xfrm rot="10800000">
+            <a:off x="1831820" y="3717565"/>
+            <a:ext cx="304800" cy="152400"/>
+          </a:xfrm>
+          <a:prstGeom prst="ellipse">
+            <a:avLst/>
+          </a:prstGeom>
+          <a:solidFill>
+            <a:srgbClr val="FFFFFF"/>
+          </a:solidFill>
+          <a:ln w="19050">
+            <a:solidFill>
+              <a:schemeClr val="tx1"/>
+            </a:solidFill>
+            <a:round/>
+            <a:headEnd type="none"/>
+            <a:tailEnd type="triangle" w="lg" len="lg"/>
+          </a:ln>
+        </p:spPr>
+        <p:txBody>
+          <a:bodyPr wrap="none" anchor="ctr"/>
+          <a:lstStyle/>
+          <a:p>
+            <a:endParaRPr lang="fr-FR"/>
+          </a:p>
+        </p:txBody>
+      </p:sp>
+      <p:sp>
+        <p:nvSpPr>
+          <p:cNvPr id="45" name="Oval 61"/>
+          <p:cNvSpPr>
+            <a:spLocks noChangeArrowheads="1"/>
+          </p:cNvSpPr>
+          <p:nvPr/>
+        </p:nvSpPr>
+        <p:spPr bwMode="auto">
+          <a:xfrm rot="10800000">
+            <a:off x="2212820" y="3453730"/>
+            <a:ext cx="304800" cy="152400"/>
+          </a:xfrm>
+          <a:prstGeom prst="ellipse">
+            <a:avLst/>
+          </a:prstGeom>
+          <a:solidFill>
+            <a:srgbClr val="FFFFFF"/>
+          </a:solidFill>
+          <a:ln w="19050">
+            <a:solidFill>
+              <a:schemeClr val="tx1"/>
+            </a:solidFill>
+            <a:round/>
+            <a:headEnd type="none"/>
+            <a:tailEnd type="triangle" w="lg" len="lg"/>
+          </a:ln>
+        </p:spPr>
+        <p:txBody>
+          <a:bodyPr wrap="none" anchor="ctr"/>
+          <a:lstStyle/>
+          <a:p>
+            <a:endParaRPr lang="fr-FR"/>
+          </a:p>
+        </p:txBody>
+      </p:sp>
+      <p:sp>
+        <p:nvSpPr>
+          <p:cNvPr id="46" name="Oval 62"/>
+          <p:cNvSpPr>
+            <a:spLocks noChangeArrowheads="1"/>
+          </p:cNvSpPr>
+          <p:nvPr/>
+        </p:nvSpPr>
+        <p:spPr bwMode="auto">
+          <a:xfrm rot="10800000">
+            <a:off x="2441420" y="3946165"/>
+            <a:ext cx="304800" cy="228600"/>
+          </a:xfrm>
+          <a:prstGeom prst="ellipse">
+            <a:avLst/>
+          </a:prstGeom>
+          <a:solidFill>
+            <a:srgbClr val="FFFFFF"/>
+          </a:solidFill>
+          <a:ln w="19050">
+            <a:solidFill>
+              <a:schemeClr val="tx1"/>
+            </a:solidFill>
+            <a:round/>
+            <a:headEnd type="none"/>
+            <a:tailEnd type="triangle" w="lg" len="lg"/>
+          </a:ln>
+        </p:spPr>
+        <p:txBody>
+          <a:bodyPr wrap="none" anchor="ctr"/>
+          <a:lstStyle/>
+          <a:p>
+            <a:endParaRPr lang="fr-FR"/>
+          </a:p>
+        </p:txBody>
+      </p:sp>
       <p:cxnSp>
         <p:nvCxnSpPr>
-          <p:cNvPr id="13" name="AutoShape 64"/>
+          <p:cNvPr id="47" name="AutoShape 63"/>
           <p:cNvCxnSpPr>
             <a:cxnSpLocks noChangeShapeType="1"/>
-            <a:stCxn id="11" idx="7"/>
-            <a:endCxn id="16" idx="3"/>
+            <a:stCxn id="45" idx="0"/>
+            <a:endCxn id="46" idx="4"/>
           </p:cNvCxnSpPr>
           <p:nvPr/>
         </p:nvCxnSpPr>
         <p:spPr bwMode="auto">
-          <a:xfrm flipH="1">
-            <a:off x="1232592" y="4263034"/>
-            <a:ext cx="241674" cy="219356"/>
+          <a:xfrm>
+            <a:off x="2365220" y="3606130"/>
+            <a:ext cx="228600" cy="340035"/>
           </a:xfrm>
           <a:prstGeom prst="straightConnector1">
             <a:avLst/>
@@ -12436,18 +12927,18 @@
       </p:cxnSp>
       <p:cxnSp>
         <p:nvCxnSpPr>
-          <p:cNvPr id="14" name="AutoShape 65"/>
+          <p:cNvPr id="48" name="AutoShape 64"/>
           <p:cNvCxnSpPr>
             <a:cxnSpLocks noChangeShapeType="1"/>
-            <a:stCxn id="9" idx="0"/>
-            <a:endCxn id="16" idx="5"/>
+            <a:stCxn id="46" idx="7"/>
+            <a:endCxn id="52" idx="3"/>
           </p:cNvCxnSpPr>
           <p:nvPr/>
         </p:nvCxnSpPr>
         <p:spPr bwMode="auto">
-          <a:xfrm>
-            <a:off x="972429" y="3991712"/>
-            <a:ext cx="44637" cy="490678"/>
+          <a:xfrm flipH="1">
+            <a:off x="2244383" y="4141287"/>
+            <a:ext cx="241674" cy="219356"/>
           </a:xfrm>
           <a:prstGeom prst="straightConnector1">
             <a:avLst/>
@@ -12468,18 +12959,18 @@
       </p:cxnSp>
       <p:cxnSp>
         <p:nvCxnSpPr>
-          <p:cNvPr id="15" name="AutoShape 66"/>
+          <p:cNvPr id="49" name="AutoShape 65"/>
           <p:cNvCxnSpPr>
             <a:cxnSpLocks noChangeShapeType="1"/>
-            <a:stCxn id="10" idx="7"/>
-            <a:endCxn id="9" idx="3"/>
+            <a:stCxn id="44" idx="0"/>
+            <a:endCxn id="52" idx="5"/>
           </p:cNvCxnSpPr>
           <p:nvPr/>
         </p:nvCxnSpPr>
         <p:spPr bwMode="auto">
-          <a:xfrm flipH="1">
-            <a:off x="1080192" y="3664594"/>
-            <a:ext cx="165474" cy="197036"/>
+          <a:xfrm>
+            <a:off x="1984220" y="3869965"/>
+            <a:ext cx="44637" cy="490678"/>
           </a:xfrm>
           <a:prstGeom prst="straightConnector1">
             <a:avLst/>
@@ -12498,572 +12989,20 @@
           <a:extLst/>
         </p:spPr>
       </p:cxnSp>
-      <p:sp>
-        <p:nvSpPr>
-          <p:cNvPr id="16" name="Oval 67"/>
-          <p:cNvSpPr>
-            <a:spLocks noChangeArrowheads="1"/>
-          </p:cNvSpPr>
-          <p:nvPr/>
-        </p:nvSpPr>
-        <p:spPr bwMode="auto">
-          <a:xfrm rot="10800000">
-            <a:off x="972429" y="4448912"/>
-            <a:ext cx="304800" cy="228600"/>
-          </a:xfrm>
-          <a:prstGeom prst="ellipse">
-            <a:avLst/>
-          </a:prstGeom>
-          <a:solidFill>
-            <a:srgbClr val="FFFFFF"/>
-          </a:solidFill>
-          <a:ln w="19050">
-            <a:solidFill>
-              <a:schemeClr val="tx1"/>
-            </a:solidFill>
-            <a:round/>
-            <a:headEnd type="none"/>
-            <a:tailEnd type="triangle" w="lg" len="lg"/>
-          </a:ln>
-        </p:spPr>
-        <p:txBody>
-          <a:bodyPr wrap="none" anchor="ctr"/>
-          <a:lstStyle/>
-          <a:p>
-            <a:endParaRPr lang="fr-FR"/>
-          </a:p>
-        </p:txBody>
-      </p:sp>
-      <p:sp>
-        <p:nvSpPr>
-          <p:cNvPr id="19" name="Oval 20"/>
-          <p:cNvSpPr>
-            <a:spLocks noChangeArrowheads="1"/>
-          </p:cNvSpPr>
-          <p:nvPr/>
-        </p:nvSpPr>
-        <p:spPr bwMode="auto">
-          <a:xfrm>
-            <a:off x="6642099" y="2164468"/>
-            <a:ext cx="978616" cy="701433"/>
-          </a:xfrm>
-          <a:prstGeom prst="ellipse">
-            <a:avLst/>
-          </a:prstGeom>
-          <a:solidFill>
-            <a:srgbClr val="FFFFFF"/>
-          </a:solidFill>
-          <a:ln w="38100">
-            <a:solidFill>
-              <a:srgbClr val="EF0118"/>
-            </a:solidFill>
-            <a:round/>
-            <a:headEnd/>
-            <a:tailEnd/>
-          </a:ln>
-        </p:spPr>
-        <p:txBody>
-          <a:bodyPr wrap="none" anchor="ctr"/>
-          <a:lstStyle/>
-          <a:p>
-            <a:r>
-              <a:rPr lang="fr-FR" dirty="0" err="1" smtClean="0"/>
-              <a:t>cog</a:t>
-            </a:r>
-            <a:r>
-              <a:rPr lang="fr-FR" dirty="0" smtClean="0"/>
-              <a:t> </a:t>
-            </a:r>
-            <a:r>
-              <a:rPr lang="fr-FR" b="1" dirty="0" smtClean="0">
-                <a:latin typeface="Symbol" charset="0"/>
-              </a:rPr>
-              <a:t>b</a:t>
-            </a:r>
-            <a:endParaRPr lang="fr-FR" b="1" dirty="0" smtClean="0"/>
-          </a:p>
-        </p:txBody>
-      </p:sp>
-      <p:sp>
-        <p:nvSpPr>
-          <p:cNvPr id="21" name="Oval 20"/>
-          <p:cNvSpPr>
-            <a:spLocks noChangeArrowheads="1"/>
-          </p:cNvSpPr>
-          <p:nvPr/>
-        </p:nvSpPr>
-        <p:spPr bwMode="auto">
-          <a:xfrm>
-            <a:off x="1048629" y="2169918"/>
-            <a:ext cx="978616" cy="701433"/>
-          </a:xfrm>
-          <a:prstGeom prst="ellipse">
-            <a:avLst/>
-          </a:prstGeom>
-          <a:solidFill>
-            <a:srgbClr val="FFFFFF"/>
-          </a:solidFill>
-          <a:ln w="38100">
-            <a:solidFill>
-              <a:srgbClr val="EF0118"/>
-            </a:solidFill>
-            <a:round/>
-            <a:headEnd/>
-            <a:tailEnd/>
-          </a:ln>
-        </p:spPr>
-        <p:txBody>
-          <a:bodyPr wrap="none" anchor="ctr"/>
-          <a:lstStyle/>
-          <a:p>
-            <a:r>
-              <a:rPr lang="fr-FR" dirty="0" err="1"/>
-              <a:t>c</a:t>
-            </a:r>
-            <a:r>
-              <a:rPr lang="fr-FR" dirty="0" err="1" smtClean="0"/>
-              <a:t>og</a:t>
-            </a:r>
-            <a:r>
-              <a:rPr lang="fr-FR" dirty="0" smtClean="0">
-                <a:solidFill>
-                  <a:srgbClr val="000000"/>
-                </a:solidFill>
-              </a:rPr>
-              <a:t> </a:t>
-            </a:r>
-            <a:r>
-              <a:rPr lang="fr-FR" b="1" dirty="0" smtClean="0">
-                <a:solidFill>
-                  <a:srgbClr val="000000"/>
-                </a:solidFill>
-                <a:latin typeface="Symbol" charset="0"/>
-              </a:rPr>
-              <a:t>a</a:t>
-            </a:r>
-            <a:endParaRPr lang="fr-FR" b="1" dirty="0" smtClean="0">
-              <a:solidFill>
-                <a:srgbClr val="000000"/>
-              </a:solidFill>
-            </a:endParaRPr>
-          </a:p>
-        </p:txBody>
-      </p:sp>
-      <p:sp>
-        <p:nvSpPr>
-          <p:cNvPr id="22" name="Rectangle 21"/>
-          <p:cNvSpPr/>
-          <p:nvPr/>
-        </p:nvSpPr>
-        <p:spPr>
-          <a:xfrm>
-            <a:off x="1666800" y="2653141"/>
-            <a:ext cx="477573" cy="230488"/>
-          </a:xfrm>
-          <a:prstGeom prst="rect">
-            <a:avLst/>
-          </a:prstGeom>
-        </p:spPr>
-        <p:style>
-          <a:lnRef idx="2">
-            <a:schemeClr val="dk1"/>
-          </a:lnRef>
-          <a:fillRef idx="1">
-            <a:schemeClr val="lt1"/>
-          </a:fillRef>
-          <a:effectRef idx="0">
-            <a:schemeClr val="dk1"/>
-          </a:effectRef>
-          <a:fontRef idx="minor">
-            <a:schemeClr val="dk1"/>
-          </a:fontRef>
-        </p:style>
-        <p:txBody>
-          <a:bodyPr rtlCol="0" anchor="ctr"/>
-          <a:lstStyle/>
-          <a:p>
-            <a:pPr algn="ctr"/>
-            <a:r>
-              <a:rPr lang="fr-FR" sz="1100" b="1" dirty="0" smtClean="0"/>
-              <a:t>ID</a:t>
-            </a:r>
-            <a:endParaRPr lang="fr-FR" sz="1100" b="1" dirty="0"/>
-          </a:p>
-        </p:txBody>
-      </p:sp>
-      <p:sp>
-        <p:nvSpPr>
-          <p:cNvPr id="23" name="Rectangle 22"/>
-          <p:cNvSpPr/>
-          <p:nvPr/>
-        </p:nvSpPr>
-        <p:spPr>
-          <a:xfrm>
-            <a:off x="1666800" y="2900222"/>
-            <a:ext cx="477574" cy="220663"/>
-          </a:xfrm>
-          <a:prstGeom prst="rect">
-            <a:avLst/>
-          </a:prstGeom>
-        </p:spPr>
-        <p:style>
-          <a:lnRef idx="2">
-            <a:schemeClr val="dk1"/>
-          </a:lnRef>
-          <a:fillRef idx="1">
-            <a:schemeClr val="lt1"/>
-          </a:fillRef>
-          <a:effectRef idx="0">
-            <a:schemeClr val="dk1"/>
-          </a:effectRef>
-          <a:fontRef idx="minor">
-            <a:schemeClr val="dk1"/>
-          </a:fontRef>
-        </p:style>
-        <p:txBody>
-          <a:bodyPr rtlCol="0" anchor="ctr"/>
-          <a:lstStyle/>
-          <a:p>
-            <a:pPr algn="ctr"/>
-            <a:r>
-              <a:rPr lang="fr-FR" sz="1100" b="1" dirty="0" err="1" smtClean="0"/>
-              <a:t>ref</a:t>
-            </a:r>
-            <a:endParaRPr lang="fr-FR" sz="1100" b="1" dirty="0"/>
-          </a:p>
-        </p:txBody>
-      </p:sp>
-      <p:sp>
-        <p:nvSpPr>
-          <p:cNvPr id="24" name="Rectangle 23"/>
-          <p:cNvSpPr/>
-          <p:nvPr/>
-        </p:nvSpPr>
-        <p:spPr>
-          <a:xfrm>
-            <a:off x="2144374" y="2653141"/>
-            <a:ext cx="282222" cy="230488"/>
-          </a:xfrm>
-          <a:prstGeom prst="rect">
-            <a:avLst/>
-          </a:prstGeom>
-        </p:spPr>
-        <p:style>
-          <a:lnRef idx="2">
-            <a:schemeClr val="dk1"/>
-          </a:lnRef>
-          <a:fillRef idx="1">
-            <a:schemeClr val="lt1"/>
-          </a:fillRef>
-          <a:effectRef idx="0">
-            <a:schemeClr val="dk1"/>
-          </a:effectRef>
-          <a:fontRef idx="minor">
-            <a:schemeClr val="dk1"/>
-          </a:fontRef>
-        </p:style>
-        <p:txBody>
-          <a:bodyPr rtlCol="0" anchor="ctr"/>
-          <a:lstStyle/>
-          <a:p>
-            <a:pPr algn="ctr"/>
-            <a:r>
-              <a:rPr lang="fr-FR" sz="1100" b="1" dirty="0" smtClean="0"/>
-              <a:t>1</a:t>
-            </a:r>
-            <a:endParaRPr lang="fr-FR" sz="1100" b="1" dirty="0"/>
-          </a:p>
-        </p:txBody>
-      </p:sp>
-      <p:sp>
-        <p:nvSpPr>
-          <p:cNvPr id="25" name="Rectangle 24"/>
-          <p:cNvSpPr/>
-          <p:nvPr/>
-        </p:nvSpPr>
-        <p:spPr>
-          <a:xfrm>
-            <a:off x="2144374" y="2890398"/>
-            <a:ext cx="282222" cy="230488"/>
-          </a:xfrm>
-          <a:prstGeom prst="rect">
-            <a:avLst/>
-          </a:prstGeom>
-        </p:spPr>
-        <p:style>
-          <a:lnRef idx="2">
-            <a:schemeClr val="dk1"/>
-          </a:lnRef>
-          <a:fillRef idx="1">
-            <a:schemeClr val="lt1"/>
-          </a:fillRef>
-          <a:effectRef idx="0">
-            <a:schemeClr val="dk1"/>
-          </a:effectRef>
-          <a:fontRef idx="minor">
-            <a:schemeClr val="dk1"/>
-          </a:fontRef>
-        </p:style>
-        <p:txBody>
-          <a:bodyPr rtlCol="0" anchor="ctr"/>
-          <a:lstStyle/>
-          <a:p>
-            <a:pPr algn="ctr"/>
-            <a:endParaRPr lang="fr-FR"/>
-          </a:p>
-        </p:txBody>
-      </p:sp>
-      <p:sp>
-        <p:nvSpPr>
-          <p:cNvPr id="26" name="Rectangle 25"/>
-          <p:cNvSpPr/>
-          <p:nvPr/>
-        </p:nvSpPr>
-        <p:spPr>
-          <a:xfrm>
-            <a:off x="2426599" y="2650570"/>
-            <a:ext cx="282222" cy="230488"/>
-          </a:xfrm>
-          <a:prstGeom prst="rect">
-            <a:avLst/>
-          </a:prstGeom>
-        </p:spPr>
-        <p:style>
-          <a:lnRef idx="2">
-            <a:schemeClr val="dk1"/>
-          </a:lnRef>
-          <a:fillRef idx="1">
-            <a:schemeClr val="lt1"/>
-          </a:fillRef>
-          <a:effectRef idx="0">
-            <a:schemeClr val="dk1"/>
-          </a:effectRef>
-          <a:fontRef idx="minor">
-            <a:schemeClr val="dk1"/>
-          </a:fontRef>
-        </p:style>
-        <p:txBody>
-          <a:bodyPr rtlCol="0" anchor="ctr"/>
-          <a:lstStyle/>
-          <a:p>
-            <a:pPr algn="ctr"/>
-            <a:r>
-              <a:rPr lang="fr-FR" sz="1100" b="1" dirty="0"/>
-              <a:t>2</a:t>
-            </a:r>
-          </a:p>
-        </p:txBody>
-      </p:sp>
-      <p:sp>
-        <p:nvSpPr>
-          <p:cNvPr id="27" name="Rectangle 26"/>
-          <p:cNvSpPr/>
-          <p:nvPr/>
-        </p:nvSpPr>
-        <p:spPr>
-          <a:xfrm>
-            <a:off x="2426599" y="2887827"/>
-            <a:ext cx="282222" cy="230488"/>
-          </a:xfrm>
-          <a:prstGeom prst="rect">
-            <a:avLst/>
-          </a:prstGeom>
-        </p:spPr>
-        <p:style>
-          <a:lnRef idx="2">
-            <a:schemeClr val="dk1"/>
-          </a:lnRef>
-          <a:fillRef idx="1">
-            <a:schemeClr val="lt1"/>
-          </a:fillRef>
-          <a:effectRef idx="0">
-            <a:schemeClr val="dk1"/>
-          </a:effectRef>
-          <a:fontRef idx="minor">
-            <a:schemeClr val="dk1"/>
-          </a:fontRef>
-        </p:style>
-        <p:txBody>
-          <a:bodyPr rtlCol="0" anchor="ctr"/>
-          <a:lstStyle/>
-          <a:p>
-            <a:pPr algn="ctr"/>
-            <a:endParaRPr lang="fr-FR"/>
-          </a:p>
-        </p:txBody>
-      </p:sp>
-      <p:sp>
-        <p:nvSpPr>
-          <p:cNvPr id="28" name="Rectangle 27"/>
-          <p:cNvSpPr/>
-          <p:nvPr/>
-        </p:nvSpPr>
-        <p:spPr>
-          <a:xfrm>
-            <a:off x="2690927" y="2653141"/>
-            <a:ext cx="282222" cy="230488"/>
-          </a:xfrm>
-          <a:prstGeom prst="rect">
-            <a:avLst/>
-          </a:prstGeom>
-        </p:spPr>
-        <p:style>
-          <a:lnRef idx="2">
-            <a:schemeClr val="dk1"/>
-          </a:lnRef>
-          <a:fillRef idx="1">
-            <a:schemeClr val="lt1"/>
-          </a:fillRef>
-          <a:effectRef idx="0">
-            <a:schemeClr val="dk1"/>
-          </a:effectRef>
-          <a:fontRef idx="minor">
-            <a:schemeClr val="dk1"/>
-          </a:fontRef>
-        </p:style>
-        <p:txBody>
-          <a:bodyPr rtlCol="0" anchor="ctr"/>
-          <a:lstStyle/>
-          <a:p>
-            <a:pPr algn="ctr"/>
-            <a:r>
-              <a:rPr lang="fr-FR" sz="1100" b="1" dirty="0"/>
-              <a:t>3</a:t>
-            </a:r>
-          </a:p>
-        </p:txBody>
-      </p:sp>
-      <p:sp>
-        <p:nvSpPr>
-          <p:cNvPr id="29" name="Rectangle 28"/>
-          <p:cNvSpPr/>
-          <p:nvPr/>
-        </p:nvSpPr>
-        <p:spPr>
-          <a:xfrm>
-            <a:off x="2690927" y="2890398"/>
-            <a:ext cx="282222" cy="230488"/>
-          </a:xfrm>
-          <a:prstGeom prst="rect">
-            <a:avLst/>
-          </a:prstGeom>
-        </p:spPr>
-        <p:style>
-          <a:lnRef idx="2">
-            <a:schemeClr val="dk1"/>
-          </a:lnRef>
-          <a:fillRef idx="1">
-            <a:schemeClr val="lt1"/>
-          </a:fillRef>
-          <a:effectRef idx="0">
-            <a:schemeClr val="dk1"/>
-          </a:effectRef>
-          <a:fontRef idx="minor">
-            <a:schemeClr val="dk1"/>
-          </a:fontRef>
-        </p:style>
-        <p:txBody>
-          <a:bodyPr rtlCol="0" anchor="ctr"/>
-          <a:lstStyle/>
-          <a:p>
-            <a:pPr algn="ctr"/>
-            <a:endParaRPr lang="fr-FR"/>
-          </a:p>
-        </p:txBody>
-      </p:sp>
-      <p:sp>
-        <p:nvSpPr>
-          <p:cNvPr id="30" name="Rectangle 29"/>
-          <p:cNvSpPr/>
-          <p:nvPr/>
-        </p:nvSpPr>
-        <p:spPr>
-          <a:xfrm>
-            <a:off x="2973152" y="2650570"/>
-            <a:ext cx="282222" cy="230488"/>
-          </a:xfrm>
-          <a:prstGeom prst="rect">
-            <a:avLst/>
-          </a:prstGeom>
-        </p:spPr>
-        <p:style>
-          <a:lnRef idx="2">
-            <a:schemeClr val="dk1"/>
-          </a:lnRef>
-          <a:fillRef idx="1">
-            <a:schemeClr val="lt1"/>
-          </a:fillRef>
-          <a:effectRef idx="0">
-            <a:schemeClr val="dk1"/>
-          </a:effectRef>
-          <a:fontRef idx="minor">
-            <a:schemeClr val="dk1"/>
-          </a:fontRef>
-        </p:style>
-        <p:txBody>
-          <a:bodyPr rtlCol="0" anchor="ctr"/>
-          <a:lstStyle/>
-          <a:p>
-            <a:pPr algn="ctr"/>
-            <a:r>
-              <a:rPr lang="fr-FR" sz="1100" b="1" dirty="0" smtClean="0"/>
-              <a:t>4</a:t>
-            </a:r>
-            <a:endParaRPr lang="fr-FR" sz="1100" b="1" dirty="0"/>
-          </a:p>
-        </p:txBody>
-      </p:sp>
-      <p:sp>
-        <p:nvSpPr>
-          <p:cNvPr id="31" name="Rectangle 30"/>
-          <p:cNvSpPr/>
-          <p:nvPr/>
-        </p:nvSpPr>
-        <p:spPr>
-          <a:xfrm>
-            <a:off x="2973152" y="2887827"/>
-            <a:ext cx="282222" cy="230488"/>
-          </a:xfrm>
-          <a:prstGeom prst="rect">
-            <a:avLst/>
-          </a:prstGeom>
-        </p:spPr>
-        <p:style>
-          <a:lnRef idx="2">
-            <a:schemeClr val="dk1"/>
-          </a:lnRef>
-          <a:fillRef idx="1">
-            <a:schemeClr val="lt1"/>
-          </a:fillRef>
-          <a:effectRef idx="0">
-            <a:schemeClr val="dk1"/>
-          </a:effectRef>
-          <a:fontRef idx="minor">
-            <a:schemeClr val="dk1"/>
-          </a:fontRef>
-        </p:style>
-        <p:txBody>
-          <a:bodyPr rtlCol="0" anchor="ctr"/>
-          <a:lstStyle/>
-          <a:p>
-            <a:pPr algn="ctr"/>
-            <a:endParaRPr lang="fr-FR"/>
-          </a:p>
-        </p:txBody>
-      </p:sp>
       <p:cxnSp>
         <p:nvCxnSpPr>
-          <p:cNvPr id="35" name="AutoShape 68"/>
+          <p:cNvPr id="51" name="AutoShape 66"/>
           <p:cNvCxnSpPr>
             <a:cxnSpLocks noChangeShapeType="1"/>
-            <a:endCxn id="11" idx="2"/>
+            <a:stCxn id="45" idx="7"/>
+            <a:endCxn id="44" idx="3"/>
           </p:cNvCxnSpPr>
           <p:nvPr/>
         </p:nvCxnSpPr>
         <p:spPr bwMode="auto">
           <a:xfrm flipH="1">
-            <a:off x="1734429" y="3000759"/>
-            <a:ext cx="1097609" cy="1181453"/>
+            <a:off x="2091983" y="3583812"/>
+            <a:ext cx="165474" cy="156071"/>
           </a:xfrm>
           <a:prstGeom prst="straightConnector1">
             <a:avLst/>
@@ -13082,23 +13021,525 @@
           <a:extLst/>
         </p:spPr>
       </p:cxnSp>
+      <p:sp>
+        <p:nvSpPr>
+          <p:cNvPr id="52" name="Oval 67"/>
+          <p:cNvSpPr>
+            <a:spLocks noChangeArrowheads="1"/>
+          </p:cNvSpPr>
+          <p:nvPr/>
+        </p:nvSpPr>
+        <p:spPr bwMode="auto">
+          <a:xfrm rot="10800000">
+            <a:off x="1984220" y="4327165"/>
+            <a:ext cx="304800" cy="228600"/>
+          </a:xfrm>
+          <a:prstGeom prst="ellipse">
+            <a:avLst/>
+          </a:prstGeom>
+          <a:solidFill>
+            <a:srgbClr val="FFFFFF"/>
+          </a:solidFill>
+          <a:ln w="19050">
+            <a:solidFill>
+              <a:schemeClr val="tx1"/>
+            </a:solidFill>
+            <a:round/>
+            <a:headEnd type="none"/>
+            <a:tailEnd type="triangle" w="lg" len="lg"/>
+          </a:ln>
+        </p:spPr>
+        <p:txBody>
+          <a:bodyPr wrap="none" anchor="ctr"/>
+          <a:lstStyle/>
+          <a:p>
+            <a:endParaRPr lang="fr-FR"/>
+          </a:p>
+        </p:txBody>
+      </p:sp>
+      <p:sp>
+        <p:nvSpPr>
+          <p:cNvPr id="53" name="Oval 20"/>
+          <p:cNvSpPr>
+            <a:spLocks noChangeArrowheads="1"/>
+          </p:cNvSpPr>
+          <p:nvPr/>
+        </p:nvSpPr>
+        <p:spPr bwMode="auto">
+          <a:xfrm>
+            <a:off x="1006142" y="2317550"/>
+            <a:ext cx="978616" cy="701433"/>
+          </a:xfrm>
+          <a:prstGeom prst="ellipse">
+            <a:avLst/>
+          </a:prstGeom>
+          <a:solidFill>
+            <a:srgbClr val="FFFFFF"/>
+          </a:solidFill>
+          <a:ln w="38100">
+            <a:solidFill>
+              <a:srgbClr val="FF6609"/>
+            </a:solidFill>
+            <a:round/>
+            <a:headEnd/>
+            <a:tailEnd/>
+          </a:ln>
+        </p:spPr>
+        <p:txBody>
+          <a:bodyPr wrap="none" anchor="ctr"/>
+          <a:lstStyle/>
+          <a:p>
+            <a:r>
+              <a:rPr lang="fr-FR" dirty="0" err="1"/>
+              <a:t>c</a:t>
+            </a:r>
+            <a:r>
+              <a:rPr lang="fr-FR" dirty="0" err="1" smtClean="0"/>
+              <a:t>og</a:t>
+            </a:r>
+            <a:r>
+              <a:rPr lang="fr-FR" dirty="0" smtClean="0">
+                <a:solidFill>
+                  <a:srgbClr val="000000"/>
+                </a:solidFill>
+              </a:rPr>
+              <a:t> </a:t>
+            </a:r>
+            <a:r>
+              <a:rPr lang="fr-FR" b="1" dirty="0" smtClean="0">
+                <a:solidFill>
+                  <a:srgbClr val="000000"/>
+                </a:solidFill>
+                <a:latin typeface="Symbol" charset="0"/>
+              </a:rPr>
+              <a:t>a</a:t>
+            </a:r>
+            <a:endParaRPr lang="fr-FR" b="1" dirty="0" smtClean="0">
+              <a:solidFill>
+                <a:srgbClr val="000000"/>
+              </a:solidFill>
+            </a:endParaRPr>
+          </a:p>
+        </p:txBody>
+      </p:sp>
+      <p:sp>
+        <p:nvSpPr>
+          <p:cNvPr id="59" name="Rectangle 58"/>
+          <p:cNvSpPr/>
+          <p:nvPr/>
+        </p:nvSpPr>
+        <p:spPr>
+          <a:xfrm>
+            <a:off x="1610658" y="2800773"/>
+            <a:ext cx="477573" cy="230488"/>
+          </a:xfrm>
+          <a:prstGeom prst="rect">
+            <a:avLst/>
+          </a:prstGeom>
+        </p:spPr>
+        <p:style>
+          <a:lnRef idx="2">
+            <a:schemeClr val="dk1"/>
+          </a:lnRef>
+          <a:fillRef idx="1">
+            <a:schemeClr val="lt1"/>
+          </a:fillRef>
+          <a:effectRef idx="0">
+            <a:schemeClr val="dk1"/>
+          </a:effectRef>
+          <a:fontRef idx="minor">
+            <a:schemeClr val="dk1"/>
+          </a:fontRef>
+        </p:style>
+        <p:txBody>
+          <a:bodyPr rtlCol="0" anchor="ctr"/>
+          <a:lstStyle/>
+          <a:p>
+            <a:pPr algn="ctr"/>
+            <a:r>
+              <a:rPr lang="fr-FR" sz="1100" b="1" dirty="0" smtClean="0"/>
+              <a:t>ID</a:t>
+            </a:r>
+            <a:endParaRPr lang="fr-FR" sz="1100" b="1" dirty="0"/>
+          </a:p>
+        </p:txBody>
+      </p:sp>
+      <p:sp>
+        <p:nvSpPr>
+          <p:cNvPr id="60" name="Rectangle 59"/>
+          <p:cNvSpPr/>
+          <p:nvPr/>
+        </p:nvSpPr>
+        <p:spPr>
+          <a:xfrm>
+            <a:off x="1610658" y="3047854"/>
+            <a:ext cx="477574" cy="220663"/>
+          </a:xfrm>
+          <a:prstGeom prst="rect">
+            <a:avLst/>
+          </a:prstGeom>
+        </p:spPr>
+        <p:style>
+          <a:lnRef idx="2">
+            <a:schemeClr val="dk1"/>
+          </a:lnRef>
+          <a:fillRef idx="1">
+            <a:schemeClr val="lt1"/>
+          </a:fillRef>
+          <a:effectRef idx="0">
+            <a:schemeClr val="dk1"/>
+          </a:effectRef>
+          <a:fontRef idx="minor">
+            <a:schemeClr val="dk1"/>
+          </a:fontRef>
+        </p:style>
+        <p:txBody>
+          <a:bodyPr rtlCol="0" anchor="ctr"/>
+          <a:lstStyle/>
+          <a:p>
+            <a:pPr algn="ctr"/>
+            <a:r>
+              <a:rPr lang="fr-FR" sz="1100" b="1" dirty="0" err="1" smtClean="0"/>
+              <a:t>ref</a:t>
+            </a:r>
+            <a:endParaRPr lang="fr-FR" sz="1100" b="1" dirty="0"/>
+          </a:p>
+        </p:txBody>
+      </p:sp>
+      <p:sp>
+        <p:nvSpPr>
+          <p:cNvPr id="61" name="Rectangle 60"/>
+          <p:cNvSpPr/>
+          <p:nvPr/>
+        </p:nvSpPr>
+        <p:spPr>
+          <a:xfrm>
+            <a:off x="2088232" y="2800773"/>
+            <a:ext cx="282222" cy="230488"/>
+          </a:xfrm>
+          <a:prstGeom prst="rect">
+            <a:avLst/>
+          </a:prstGeom>
+        </p:spPr>
+        <p:style>
+          <a:lnRef idx="2">
+            <a:schemeClr val="dk1"/>
+          </a:lnRef>
+          <a:fillRef idx="1">
+            <a:schemeClr val="lt1"/>
+          </a:fillRef>
+          <a:effectRef idx="0">
+            <a:schemeClr val="dk1"/>
+          </a:effectRef>
+          <a:fontRef idx="minor">
+            <a:schemeClr val="dk1"/>
+          </a:fontRef>
+        </p:style>
+        <p:txBody>
+          <a:bodyPr rtlCol="0" anchor="ctr"/>
+          <a:lstStyle/>
+          <a:p>
+            <a:pPr algn="ctr"/>
+            <a:r>
+              <a:rPr lang="fr-FR" sz="1100" b="1" dirty="0" smtClean="0"/>
+              <a:t>1</a:t>
+            </a:r>
+            <a:endParaRPr lang="fr-FR" sz="1100" b="1" dirty="0"/>
+          </a:p>
+        </p:txBody>
+      </p:sp>
+      <p:sp>
+        <p:nvSpPr>
+          <p:cNvPr id="62" name="Rectangle 61"/>
+          <p:cNvSpPr/>
+          <p:nvPr/>
+        </p:nvSpPr>
+        <p:spPr>
+          <a:xfrm>
+            <a:off x="2088232" y="3038030"/>
+            <a:ext cx="282222" cy="230488"/>
+          </a:xfrm>
+          <a:prstGeom prst="rect">
+            <a:avLst/>
+          </a:prstGeom>
+        </p:spPr>
+        <p:style>
+          <a:lnRef idx="2">
+            <a:schemeClr val="dk1"/>
+          </a:lnRef>
+          <a:fillRef idx="1">
+            <a:schemeClr val="lt1"/>
+          </a:fillRef>
+          <a:effectRef idx="0">
+            <a:schemeClr val="dk1"/>
+          </a:effectRef>
+          <a:fontRef idx="minor">
+            <a:schemeClr val="dk1"/>
+          </a:fontRef>
+        </p:style>
+        <p:txBody>
+          <a:bodyPr rtlCol="0" anchor="ctr"/>
+          <a:lstStyle/>
+          <a:p>
+            <a:pPr algn="ctr"/>
+            <a:endParaRPr lang="fr-FR"/>
+          </a:p>
+        </p:txBody>
+      </p:sp>
+      <p:sp>
+        <p:nvSpPr>
+          <p:cNvPr id="63" name="Rectangle 62"/>
+          <p:cNvSpPr/>
+          <p:nvPr/>
+        </p:nvSpPr>
+        <p:spPr>
+          <a:xfrm>
+            <a:off x="2370457" y="2798202"/>
+            <a:ext cx="282222" cy="230488"/>
+          </a:xfrm>
+          <a:prstGeom prst="rect">
+            <a:avLst/>
+          </a:prstGeom>
+        </p:spPr>
+        <p:style>
+          <a:lnRef idx="2">
+            <a:schemeClr val="dk1"/>
+          </a:lnRef>
+          <a:fillRef idx="1">
+            <a:schemeClr val="lt1"/>
+          </a:fillRef>
+          <a:effectRef idx="0">
+            <a:schemeClr val="dk1"/>
+          </a:effectRef>
+          <a:fontRef idx="minor">
+            <a:schemeClr val="dk1"/>
+          </a:fontRef>
+        </p:style>
+        <p:txBody>
+          <a:bodyPr rtlCol="0" anchor="ctr"/>
+          <a:lstStyle/>
+          <a:p>
+            <a:pPr algn="ctr"/>
+            <a:r>
+              <a:rPr lang="fr-FR" sz="1100" b="1" dirty="0"/>
+              <a:t>2</a:t>
+            </a:r>
+          </a:p>
+        </p:txBody>
+      </p:sp>
+      <p:sp>
+        <p:nvSpPr>
+          <p:cNvPr id="64" name="Rectangle 63"/>
+          <p:cNvSpPr/>
+          <p:nvPr/>
+        </p:nvSpPr>
+        <p:spPr>
+          <a:xfrm>
+            <a:off x="2370457" y="3035459"/>
+            <a:ext cx="282222" cy="230488"/>
+          </a:xfrm>
+          <a:prstGeom prst="rect">
+            <a:avLst/>
+          </a:prstGeom>
+        </p:spPr>
+        <p:style>
+          <a:lnRef idx="2">
+            <a:schemeClr val="dk1"/>
+          </a:lnRef>
+          <a:fillRef idx="1">
+            <a:schemeClr val="lt1"/>
+          </a:fillRef>
+          <a:effectRef idx="0">
+            <a:schemeClr val="dk1"/>
+          </a:effectRef>
+          <a:fontRef idx="minor">
+            <a:schemeClr val="dk1"/>
+          </a:fontRef>
+        </p:style>
+        <p:txBody>
+          <a:bodyPr rtlCol="0" anchor="ctr"/>
+          <a:lstStyle/>
+          <a:p>
+            <a:pPr algn="ctr"/>
+            <a:endParaRPr lang="fr-FR"/>
+          </a:p>
+        </p:txBody>
+      </p:sp>
+      <p:sp>
+        <p:nvSpPr>
+          <p:cNvPr id="67" name="Rectangle 66"/>
+          <p:cNvSpPr/>
+          <p:nvPr/>
+        </p:nvSpPr>
+        <p:spPr>
+          <a:xfrm>
+            <a:off x="2634785" y="2800773"/>
+            <a:ext cx="282222" cy="230488"/>
+          </a:xfrm>
+          <a:prstGeom prst="rect">
+            <a:avLst/>
+          </a:prstGeom>
+        </p:spPr>
+        <p:style>
+          <a:lnRef idx="2">
+            <a:schemeClr val="dk1"/>
+          </a:lnRef>
+          <a:fillRef idx="1">
+            <a:schemeClr val="lt1"/>
+          </a:fillRef>
+          <a:effectRef idx="0">
+            <a:schemeClr val="dk1"/>
+          </a:effectRef>
+          <a:fontRef idx="minor">
+            <a:schemeClr val="dk1"/>
+          </a:fontRef>
+        </p:style>
+        <p:txBody>
+          <a:bodyPr rtlCol="0" anchor="ctr"/>
+          <a:lstStyle/>
+          <a:p>
+            <a:pPr algn="ctr"/>
+            <a:r>
+              <a:rPr lang="fr-FR" sz="1100" b="1" dirty="0"/>
+              <a:t>3</a:t>
+            </a:r>
+          </a:p>
+        </p:txBody>
+      </p:sp>
+      <p:sp>
+        <p:nvSpPr>
+          <p:cNvPr id="68" name="Rectangle 67"/>
+          <p:cNvSpPr/>
+          <p:nvPr/>
+        </p:nvSpPr>
+        <p:spPr>
+          <a:xfrm>
+            <a:off x="2634785" y="3038030"/>
+            <a:ext cx="282222" cy="230488"/>
+          </a:xfrm>
+          <a:prstGeom prst="rect">
+            <a:avLst/>
+          </a:prstGeom>
+        </p:spPr>
+        <p:style>
+          <a:lnRef idx="2">
+            <a:schemeClr val="dk1"/>
+          </a:lnRef>
+          <a:fillRef idx="1">
+            <a:schemeClr val="lt1"/>
+          </a:fillRef>
+          <a:effectRef idx="0">
+            <a:schemeClr val="dk1"/>
+          </a:effectRef>
+          <a:fontRef idx="minor">
+            <a:schemeClr val="dk1"/>
+          </a:fontRef>
+        </p:style>
+        <p:txBody>
+          <a:bodyPr rtlCol="0" anchor="ctr"/>
+          <a:lstStyle/>
+          <a:p>
+            <a:pPr algn="ctr"/>
+            <a:endParaRPr lang="fr-FR"/>
+          </a:p>
+        </p:txBody>
+      </p:sp>
+      <p:sp>
+        <p:nvSpPr>
+          <p:cNvPr id="69" name="Rectangle 68"/>
+          <p:cNvSpPr/>
+          <p:nvPr/>
+        </p:nvSpPr>
+        <p:spPr>
+          <a:xfrm>
+            <a:off x="2917010" y="2798202"/>
+            <a:ext cx="282222" cy="230488"/>
+          </a:xfrm>
+          <a:prstGeom prst="rect">
+            <a:avLst/>
+          </a:prstGeom>
+        </p:spPr>
+        <p:style>
+          <a:lnRef idx="2">
+            <a:schemeClr val="dk1"/>
+          </a:lnRef>
+          <a:fillRef idx="1">
+            <a:schemeClr val="lt1"/>
+          </a:fillRef>
+          <a:effectRef idx="0">
+            <a:schemeClr val="dk1"/>
+          </a:effectRef>
+          <a:fontRef idx="minor">
+            <a:schemeClr val="dk1"/>
+          </a:fontRef>
+        </p:style>
+        <p:txBody>
+          <a:bodyPr rtlCol="0" anchor="ctr"/>
+          <a:lstStyle/>
+          <a:p>
+            <a:pPr algn="ctr"/>
+            <a:r>
+              <a:rPr lang="fr-FR" sz="1100" b="1" dirty="0" smtClean="0"/>
+              <a:t>4</a:t>
+            </a:r>
+            <a:endParaRPr lang="fr-FR" sz="1100" b="1" dirty="0"/>
+          </a:p>
+        </p:txBody>
+      </p:sp>
+      <p:sp>
+        <p:nvSpPr>
+          <p:cNvPr id="70" name="Rectangle 69"/>
+          <p:cNvSpPr/>
+          <p:nvPr/>
+        </p:nvSpPr>
+        <p:spPr>
+          <a:xfrm>
+            <a:off x="2917010" y="3035459"/>
+            <a:ext cx="282222" cy="230488"/>
+          </a:xfrm>
+          <a:prstGeom prst="rect">
+            <a:avLst/>
+          </a:prstGeom>
+        </p:spPr>
+        <p:style>
+          <a:lnRef idx="2">
+            <a:schemeClr val="dk1"/>
+          </a:lnRef>
+          <a:fillRef idx="1">
+            <a:schemeClr val="lt1"/>
+          </a:fillRef>
+          <a:effectRef idx="0">
+            <a:schemeClr val="dk1"/>
+          </a:effectRef>
+          <a:fontRef idx="minor">
+            <a:schemeClr val="dk1"/>
+          </a:fontRef>
+        </p:style>
+        <p:txBody>
+          <a:bodyPr rtlCol="0" anchor="ctr"/>
+          <a:lstStyle/>
+          <a:p>
+            <a:pPr algn="ctr"/>
+            <a:endParaRPr lang="fr-FR"/>
+          </a:p>
+        </p:txBody>
+      </p:sp>
       <p:cxnSp>
         <p:nvCxnSpPr>
-          <p:cNvPr id="43" name="Connecteur en arc 42"/>
+          <p:cNvPr id="71" name="Connecteur en arc 70"/>
           <p:cNvCxnSpPr>
-            <a:endCxn id="9" idx="5"/>
+            <a:stCxn id="70" idx="2"/>
+            <a:endCxn id="52" idx="2"/>
           </p:cNvCxnSpPr>
           <p:nvPr/>
         </p:nvCxnSpPr>
         <p:spPr>
           <a:xfrm rot="5400000">
-            <a:off x="1144641" y="2720785"/>
-            <a:ext cx="860871" cy="1420819"/>
-          </a:xfrm>
-          <a:prstGeom prst="curvedConnector3">
-            <a:avLst>
-              <a:gd name="adj1" fmla="val 22092"/>
-            </a:avLst>
+            <a:off x="2085812" y="3469156"/>
+            <a:ext cx="1175518" cy="769101"/>
+          </a:xfrm>
+          <a:prstGeom prst="curvedConnector2">
+            <a:avLst/>
           </a:prstGeom>
           <a:ln w="9525" cmpd="sng">
             <a:solidFill>
@@ -13125,26 +13566,24 @@
       </p:cxnSp>
       <p:cxnSp>
         <p:nvCxnSpPr>
-          <p:cNvPr id="50" name="Connecteur en arc 49"/>
+          <p:cNvPr id="73" name="Connecteur droit 72"/>
           <p:cNvCxnSpPr>
-            <a:endCxn id="16" idx="2"/>
+            <a:stCxn id="64" idx="2"/>
           </p:cNvCxnSpPr>
           <p:nvPr/>
         </p:nvCxnSpPr>
         <p:spPr>
-          <a:xfrm rot="5400000">
-            <a:off x="1413234" y="2862183"/>
-            <a:ext cx="1565024" cy="1837034"/>
-          </a:xfrm>
-          <a:prstGeom prst="curvedConnector2">
-            <a:avLst/>
-          </a:prstGeom>
-          <a:ln w="9525" cmpd="sng">
+          <a:xfrm flipV="1">
+            <a:off x="2511568" y="3124484"/>
+            <a:ext cx="0" cy="141463"/>
+          </a:xfrm>
+          <a:prstGeom prst="line">
+            <a:avLst/>
+          </a:prstGeom>
+          <a:ln w="6350" cmpd="sng">
             <a:solidFill>
               <a:schemeClr val="tx1"/>
             </a:solidFill>
-            <a:headEnd type="none"/>
-            <a:tailEnd type="triangle" w="lg" len="lg"/>
           </a:ln>
         </p:spPr>
         <p:style>
@@ -13164,358 +13603,22 @@
       </p:cxnSp>
       <p:cxnSp>
         <p:nvCxnSpPr>
-          <p:cNvPr id="17" name="AutoShape 68"/>
-          <p:cNvCxnSpPr>
-            <a:cxnSpLocks noChangeShapeType="1"/>
-            <a:endCxn id="10" idx="3"/>
-          </p:cNvCxnSpPr>
+          <p:cNvPr id="75" name="Connecteur droit 74"/>
+          <p:cNvCxnSpPr/>
           <p:nvPr/>
         </p:nvCxnSpPr>
-        <p:spPr bwMode="auto">
-          <a:xfrm flipH="1">
-            <a:off x="1461192" y="2998188"/>
-            <a:ext cx="1106518" cy="558642"/>
-          </a:xfrm>
-          <a:prstGeom prst="straightConnector1">
-            <a:avLst/>
-          </a:prstGeom>
-          <a:solidFill>
-            <a:srgbClr val="FFFFFF"/>
-          </a:solidFill>
-          <a:ln w="9525">
+        <p:spPr>
+          <a:xfrm flipV="1">
+            <a:off x="2775897" y="3127054"/>
+            <a:ext cx="0" cy="141463"/>
+          </a:xfrm>
+          <a:prstGeom prst="line">
+            <a:avLst/>
+          </a:prstGeom>
+          <a:ln w="6350" cmpd="sng">
             <a:solidFill>
               <a:schemeClr val="tx1"/>
             </a:solidFill>
-            <a:round/>
-            <a:headEnd type="none"/>
-            <a:tailEnd type="triangle" w="lg" len="lg"/>
-          </a:ln>
-          <a:extLst/>
-        </p:spPr>
-      </p:cxnSp>
-      <p:sp>
-        <p:nvSpPr>
-          <p:cNvPr id="54" name="AutoShape 73"/>
-          <p:cNvSpPr>
-            <a:spLocks noChangeArrowheads="1"/>
-          </p:cNvSpPr>
-          <p:nvPr/>
-        </p:nvSpPr>
-        <p:spPr bwMode="auto">
-          <a:xfrm>
-            <a:off x="1174245" y="4666178"/>
-            <a:ext cx="1888843" cy="228600"/>
-          </a:xfrm>
-          <a:prstGeom prst="roundRect">
-            <a:avLst>
-              <a:gd name="adj" fmla="val 50000"/>
-            </a:avLst>
-          </a:prstGeom>
-          <a:solidFill>
-            <a:srgbClr val="FFFFFF"/>
-          </a:solidFill>
-          <a:ln w="19050">
-            <a:solidFill>
-              <a:srgbClr val="080808"/>
-            </a:solidFill>
-            <a:round/>
-            <a:headEnd/>
-            <a:tailEnd/>
-          </a:ln>
-        </p:spPr>
-        <p:txBody>
-          <a:bodyPr wrap="none" anchor="ctr"/>
-          <a:lstStyle/>
-          <a:p>
-            <a:pPr algn="ctr"/>
-            <a:r>
-              <a:rPr lang="fr-FR" sz="1400" b="1" dirty="0" err="1">
-                <a:solidFill>
-                  <a:srgbClr val="000000"/>
-                </a:solidFill>
-              </a:rPr>
-              <a:t>s</a:t>
-            </a:r>
-            <a:r>
-              <a:rPr lang="fr-FR" sz="1400" b="1" dirty="0" err="1" smtClean="0">
-                <a:solidFill>
-                  <a:srgbClr val="000000"/>
-                </a:solidFill>
-              </a:rPr>
-              <a:t>!start</a:t>
-            </a:r>
-            <a:r>
-              <a:rPr lang="fr-FR" sz="1400" b="1" dirty="0" smtClean="0">
-                <a:solidFill>
-                  <a:srgbClr val="000000"/>
-                </a:solidFill>
-              </a:rPr>
-              <a:t>()</a:t>
-            </a:r>
-            <a:endParaRPr lang="fr-FR" sz="1400" b="1" dirty="0">
-              <a:solidFill>
-                <a:srgbClr val="000000"/>
-              </a:solidFill>
-            </a:endParaRPr>
-          </a:p>
-        </p:txBody>
-      </p:sp>
-      <p:sp>
-        <p:nvSpPr>
-          <p:cNvPr id="55" name="Rectangle 54"/>
-          <p:cNvSpPr/>
-          <p:nvPr/>
-        </p:nvSpPr>
-        <p:spPr>
-          <a:xfrm>
-            <a:off x="7000293" y="2691188"/>
-            <a:ext cx="477573" cy="230488"/>
-          </a:xfrm>
-          <a:prstGeom prst="rect">
-            <a:avLst/>
-          </a:prstGeom>
-        </p:spPr>
-        <p:style>
-          <a:lnRef idx="2">
-            <a:schemeClr val="dk1"/>
-          </a:lnRef>
-          <a:fillRef idx="1">
-            <a:schemeClr val="lt1"/>
-          </a:fillRef>
-          <a:effectRef idx="0">
-            <a:schemeClr val="dk1"/>
-          </a:effectRef>
-          <a:fontRef idx="minor">
-            <a:schemeClr val="dk1"/>
-          </a:fontRef>
-        </p:style>
-        <p:txBody>
-          <a:bodyPr rtlCol="0" anchor="ctr"/>
-          <a:lstStyle/>
-          <a:p>
-            <a:pPr algn="ctr"/>
-            <a:r>
-              <a:rPr lang="fr-FR" sz="1100" b="1" dirty="0" smtClean="0"/>
-              <a:t>ID</a:t>
-            </a:r>
-            <a:endParaRPr lang="fr-FR" sz="1100" b="1" dirty="0"/>
-          </a:p>
-        </p:txBody>
-      </p:sp>
-      <p:sp>
-        <p:nvSpPr>
-          <p:cNvPr id="56" name="Rectangle 55"/>
-          <p:cNvSpPr/>
-          <p:nvPr/>
-        </p:nvSpPr>
-        <p:spPr>
-          <a:xfrm>
-            <a:off x="7000293" y="2938269"/>
-            <a:ext cx="477574" cy="220663"/>
-          </a:xfrm>
-          <a:prstGeom prst="rect">
-            <a:avLst/>
-          </a:prstGeom>
-        </p:spPr>
-        <p:style>
-          <a:lnRef idx="2">
-            <a:schemeClr val="dk1"/>
-          </a:lnRef>
-          <a:fillRef idx="1">
-            <a:schemeClr val="lt1"/>
-          </a:fillRef>
-          <a:effectRef idx="0">
-            <a:schemeClr val="dk1"/>
-          </a:effectRef>
-          <a:fontRef idx="minor">
-            <a:schemeClr val="dk1"/>
-          </a:fontRef>
-        </p:style>
-        <p:txBody>
-          <a:bodyPr rtlCol="0" anchor="ctr"/>
-          <a:lstStyle/>
-          <a:p>
-            <a:pPr algn="ctr"/>
-            <a:r>
-              <a:rPr lang="fr-FR" sz="1100" b="1" dirty="0" err="1" smtClean="0"/>
-              <a:t>ref</a:t>
-            </a:r>
-            <a:endParaRPr lang="fr-FR" sz="1100" b="1" dirty="0"/>
-          </a:p>
-        </p:txBody>
-      </p:sp>
-      <p:sp>
-        <p:nvSpPr>
-          <p:cNvPr id="57" name="Rectangle 56"/>
-          <p:cNvSpPr/>
-          <p:nvPr/>
-        </p:nvSpPr>
-        <p:spPr>
-          <a:xfrm>
-            <a:off x="7477867" y="2691188"/>
-            <a:ext cx="282222" cy="230488"/>
-          </a:xfrm>
-          <a:prstGeom prst="rect">
-            <a:avLst/>
-          </a:prstGeom>
-        </p:spPr>
-        <p:style>
-          <a:lnRef idx="2">
-            <a:schemeClr val="dk1"/>
-          </a:lnRef>
-          <a:fillRef idx="1">
-            <a:schemeClr val="lt1"/>
-          </a:fillRef>
-          <a:effectRef idx="0">
-            <a:schemeClr val="dk1"/>
-          </a:effectRef>
-          <a:fontRef idx="minor">
-            <a:schemeClr val="dk1"/>
-          </a:fontRef>
-        </p:style>
-        <p:txBody>
-          <a:bodyPr rtlCol="0" anchor="ctr"/>
-          <a:lstStyle/>
-          <a:p>
-            <a:pPr algn="ctr"/>
-            <a:r>
-              <a:rPr lang="fr-FR" sz="1100" b="1" dirty="0" smtClean="0"/>
-              <a:t>1</a:t>
-            </a:r>
-            <a:endParaRPr lang="fr-FR" sz="1100" b="1" dirty="0"/>
-          </a:p>
-        </p:txBody>
-      </p:sp>
-      <p:sp>
-        <p:nvSpPr>
-          <p:cNvPr id="58" name="Rectangle 57"/>
-          <p:cNvSpPr/>
-          <p:nvPr/>
-        </p:nvSpPr>
-        <p:spPr>
-          <a:xfrm>
-            <a:off x="7477867" y="2928445"/>
-            <a:ext cx="282222" cy="230488"/>
-          </a:xfrm>
-          <a:prstGeom prst="rect">
-            <a:avLst/>
-          </a:prstGeom>
-        </p:spPr>
-        <p:style>
-          <a:lnRef idx="2">
-            <a:schemeClr val="dk1"/>
-          </a:lnRef>
-          <a:fillRef idx="1">
-            <a:schemeClr val="lt1"/>
-          </a:fillRef>
-          <a:effectRef idx="0">
-            <a:schemeClr val="dk1"/>
-          </a:effectRef>
-          <a:fontRef idx="minor">
-            <a:schemeClr val="dk1"/>
-          </a:fontRef>
-        </p:style>
-        <p:txBody>
-          <a:bodyPr rtlCol="0" anchor="ctr"/>
-          <a:lstStyle/>
-          <a:p>
-            <a:pPr algn="ctr"/>
-            <a:endParaRPr lang="fr-FR"/>
-          </a:p>
-        </p:txBody>
-      </p:sp>
-      <p:sp>
-        <p:nvSpPr>
-          <p:cNvPr id="65" name="Oval 67"/>
-          <p:cNvSpPr>
-            <a:spLocks noChangeArrowheads="1"/>
-          </p:cNvSpPr>
-          <p:nvPr/>
-        </p:nvSpPr>
-        <p:spPr bwMode="auto">
-          <a:xfrm rot="10800000">
-            <a:off x="7928234" y="3160441"/>
-            <a:ext cx="304800" cy="228600"/>
-          </a:xfrm>
-          <a:prstGeom prst="ellipse">
-            <a:avLst/>
-          </a:prstGeom>
-          <a:solidFill>
-            <a:srgbClr val="FFFFFF"/>
-          </a:solidFill>
-          <a:ln w="19050">
-            <a:solidFill>
-              <a:schemeClr val="tx1"/>
-            </a:solidFill>
-            <a:round/>
-            <a:headEnd type="none"/>
-            <a:tailEnd type="triangle" w="lg" len="lg"/>
-          </a:ln>
-        </p:spPr>
-        <p:txBody>
-          <a:bodyPr wrap="none" anchor="ctr"/>
-          <a:lstStyle/>
-          <a:p>
-            <a:endParaRPr lang="fr-FR"/>
-          </a:p>
-        </p:txBody>
-      </p:sp>
-      <p:cxnSp>
-        <p:nvCxnSpPr>
-          <p:cNvPr id="66" name="AutoShape 68"/>
-          <p:cNvCxnSpPr>
-            <a:cxnSpLocks noChangeShapeType="1"/>
-            <a:endCxn id="65" idx="5"/>
-          </p:cNvCxnSpPr>
-          <p:nvPr/>
-        </p:nvCxnSpPr>
-        <p:spPr bwMode="auto">
-          <a:xfrm>
-            <a:off x="7618978" y="3036039"/>
-            <a:ext cx="353893" cy="157880"/>
-          </a:xfrm>
-          <a:prstGeom prst="straightConnector1">
-            <a:avLst/>
-          </a:prstGeom>
-          <a:solidFill>
-            <a:srgbClr val="FFFFFF"/>
-          </a:solidFill>
-          <a:ln w="9525">
-            <a:solidFill>
-              <a:schemeClr val="tx1"/>
-            </a:solidFill>
-            <a:round/>
-            <a:headEnd type="none"/>
-            <a:tailEnd type="triangle" w="lg" len="lg"/>
-          </a:ln>
-          <a:extLst/>
-        </p:spPr>
-      </p:cxnSp>
-      <p:cxnSp>
-        <p:nvCxnSpPr>
-          <p:cNvPr id="74" name="Connecteur en arc 73"/>
-          <p:cNvCxnSpPr>
-            <a:stCxn id="54" idx="3"/>
-            <a:endCxn id="19" idx="2"/>
-          </p:cNvCxnSpPr>
-          <p:nvPr/>
-        </p:nvCxnSpPr>
-        <p:spPr>
-          <a:xfrm flipV="1">
-            <a:off x="3063088" y="2515185"/>
-            <a:ext cx="3579011" cy="2265293"/>
-          </a:xfrm>
-          <a:prstGeom prst="curvedConnector3">
-            <a:avLst>
-              <a:gd name="adj1" fmla="val 50000"/>
-            </a:avLst>
-          </a:prstGeom>
-          <a:ln w="28575" cmpd="sng">
-            <a:solidFill>
-              <a:srgbClr val="FF0000"/>
-            </a:solidFill>
-            <a:prstDash val="dash"/>
-            <a:tailEnd type="arrow"/>
           </a:ln>
         </p:spPr>
         <p:style>
@@ -13533,9 +13636,185 @@
           </a:fontRef>
         </p:style>
       </p:cxnSp>
-      <p:sp>
-        <p:nvSpPr>
-          <p:cNvPr id="39" name="AutoShape 73"/>
+      <p:cxnSp>
+        <p:nvCxnSpPr>
+          <p:cNvPr id="76" name="Connecteur droit 75"/>
+          <p:cNvCxnSpPr/>
+          <p:nvPr/>
+        </p:nvCxnSpPr>
+        <p:spPr>
+          <a:xfrm flipV="1">
+            <a:off x="3058122" y="3112939"/>
+            <a:ext cx="0" cy="141463"/>
+          </a:xfrm>
+          <a:prstGeom prst="line">
+            <a:avLst/>
+          </a:prstGeom>
+          <a:ln w="6350" cmpd="sng">
+            <a:solidFill>
+              <a:schemeClr val="tx1"/>
+            </a:solidFill>
+          </a:ln>
+        </p:spPr>
+        <p:style>
+          <a:lnRef idx="2">
+            <a:schemeClr val="accent1"/>
+          </a:lnRef>
+          <a:fillRef idx="0">
+            <a:schemeClr val="accent1"/>
+          </a:fillRef>
+          <a:effectRef idx="1">
+            <a:schemeClr val="accent1"/>
+          </a:effectRef>
+          <a:fontRef idx="minor">
+            <a:schemeClr val="tx1"/>
+          </a:fontRef>
+        </p:style>
+      </p:cxnSp>
+      <p:cxnSp>
+        <p:nvCxnSpPr>
+          <p:cNvPr id="77" name="Connecteur droit 76"/>
+          <p:cNvCxnSpPr/>
+          <p:nvPr/>
+        </p:nvCxnSpPr>
+        <p:spPr>
+          <a:xfrm flipV="1">
+            <a:off x="2229343" y="3127054"/>
+            <a:ext cx="0" cy="141463"/>
+          </a:xfrm>
+          <a:prstGeom prst="line">
+            <a:avLst/>
+          </a:prstGeom>
+          <a:ln w="6350" cmpd="sng">
+            <a:solidFill>
+              <a:schemeClr val="tx1"/>
+            </a:solidFill>
+          </a:ln>
+        </p:spPr>
+        <p:style>
+          <a:lnRef idx="2">
+            <a:schemeClr val="accent1"/>
+          </a:lnRef>
+          <a:fillRef idx="0">
+            <a:schemeClr val="accent1"/>
+          </a:fillRef>
+          <a:effectRef idx="1">
+            <a:schemeClr val="accent1"/>
+          </a:effectRef>
+          <a:fontRef idx="minor">
+            <a:schemeClr val="tx1"/>
+          </a:fontRef>
+        </p:style>
+      </p:cxnSp>
+      <p:cxnSp>
+        <p:nvCxnSpPr>
+          <p:cNvPr id="78" name="AutoShape 63"/>
+          <p:cNvCxnSpPr>
+            <a:cxnSpLocks noChangeShapeType="1"/>
+            <a:stCxn id="68" idx="2"/>
+            <a:endCxn id="46" idx="3"/>
+          </p:cNvCxnSpPr>
+          <p:nvPr/>
+        </p:nvCxnSpPr>
+        <p:spPr bwMode="auto">
+          <a:xfrm flipH="1">
+            <a:off x="2701583" y="3268518"/>
+            <a:ext cx="74313" cy="711125"/>
+          </a:xfrm>
+          <a:prstGeom prst="straightConnector1">
+            <a:avLst/>
+          </a:prstGeom>
+          <a:solidFill>
+            <a:srgbClr val="FFFFFF"/>
+          </a:solidFill>
+          <a:ln w="9525">
+            <a:solidFill>
+              <a:schemeClr val="tx1"/>
+            </a:solidFill>
+            <a:round/>
+            <a:headEnd type="none"/>
+            <a:tailEnd type="triangle" w="lg" len="lg"/>
+          </a:ln>
+          <a:extLst/>
+        </p:spPr>
+      </p:cxnSp>
+      <p:cxnSp>
+        <p:nvCxnSpPr>
+          <p:cNvPr id="79" name="AutoShape 63"/>
+          <p:cNvCxnSpPr>
+            <a:cxnSpLocks noChangeShapeType="1"/>
+            <a:stCxn id="64" idx="2"/>
+            <a:endCxn id="45" idx="3"/>
+          </p:cNvCxnSpPr>
+          <p:nvPr/>
+        </p:nvCxnSpPr>
+        <p:spPr bwMode="auto">
+          <a:xfrm flipH="1">
+            <a:off x="2472983" y="3265947"/>
+            <a:ext cx="38585" cy="210101"/>
+          </a:xfrm>
+          <a:prstGeom prst="straightConnector1">
+            <a:avLst/>
+          </a:prstGeom>
+          <a:solidFill>
+            <a:srgbClr val="FFFFFF"/>
+          </a:solidFill>
+          <a:ln w="9525">
+            <a:solidFill>
+              <a:schemeClr val="tx1"/>
+            </a:solidFill>
+            <a:round/>
+            <a:headEnd type="none"/>
+            <a:tailEnd type="triangle" w="lg" len="lg"/>
+          </a:ln>
+          <a:extLst/>
+        </p:spPr>
+      </p:cxnSp>
+      <p:cxnSp>
+        <p:nvCxnSpPr>
+          <p:cNvPr id="80" name="Connecteur en arc 79"/>
+          <p:cNvCxnSpPr>
+            <a:stCxn id="62" idx="2"/>
+            <a:endCxn id="44" idx="4"/>
+          </p:cNvCxnSpPr>
+          <p:nvPr/>
+        </p:nvCxnSpPr>
+        <p:spPr>
+          <a:xfrm rot="5400000">
+            <a:off x="1882259" y="3370480"/>
+            <a:ext cx="449047" cy="245123"/>
+          </a:xfrm>
+          <a:prstGeom prst="curvedConnector3">
+            <a:avLst>
+              <a:gd name="adj1" fmla="val 34796"/>
+            </a:avLst>
+          </a:prstGeom>
+          <a:ln w="9525" cmpd="sng">
+            <a:solidFill>
+              <a:schemeClr val="tx1"/>
+            </a:solidFill>
+            <a:headEnd type="none"/>
+            <a:tailEnd type="triangle" w="lg" len="lg"/>
+          </a:ln>
+        </p:spPr>
+        <p:style>
+          <a:lnRef idx="2">
+            <a:schemeClr val="accent1"/>
+          </a:lnRef>
+          <a:fillRef idx="0">
+            <a:schemeClr val="accent1"/>
+          </a:fillRef>
+          <a:effectRef idx="1">
+            <a:schemeClr val="accent1"/>
+          </a:effectRef>
+          <a:fontRef idx="minor">
+            <a:schemeClr val="tx1"/>
+          </a:fontRef>
+        </p:style>
+      </p:cxnSp>
+      <p:sp>
+        <p:nvSpPr>
+          <p:cNvPr id="81" name="AutoShape 73"/>
           <p:cNvSpPr>
             <a:spLocks noChangeArrowheads="1"/>
           </p:cNvSpPr>
@@ -13543,8 +13822,8 @@
         </p:nvSpPr>
         <p:spPr bwMode="auto">
           <a:xfrm>
-            <a:off x="3477772" y="2328956"/>
-            <a:ext cx="2530604" cy="228600"/>
+            <a:off x="1169279" y="4643088"/>
+            <a:ext cx="1888843" cy="228600"/>
           </a:xfrm>
           <a:prstGeom prst="roundRect">
             <a:avLst>
@@ -13569,18 +13848,12 @@
           <a:p>
             <a:pPr algn="ctr"/>
             <a:r>
-              <a:rPr lang="fr-FR" sz="1400" b="1" dirty="0" err="1" smtClean="0"/>
-              <a:t>cog</a:t>
-            </a:r>
-            <a:r>
-              <a:rPr lang="fr-FR" sz="1400" b="1" dirty="0" smtClean="0"/>
-              <a:t> </a:t>
-            </a:r>
-            <a:r>
-              <a:rPr lang="fr-FR" sz="1400" b="1" dirty="0" err="1" smtClean="0">
-                <a:latin typeface="Symbol" charset="0"/>
+              <a:rPr lang="fr-FR" sz="1400" b="1" dirty="0" err="1">
+                <a:solidFill>
+                  <a:srgbClr val="000000"/>
+                </a:solidFill>
               </a:rPr>
-              <a:t>b</a:t>
+              <a:t>s</a:t>
             </a:r>
             <a:r>
               <a:rPr lang="fr-FR" sz="1400" b="1" dirty="0" err="1" smtClean="0">
@@ -13588,7 +13861,7 @@
                   <a:srgbClr val="000000"/>
                 </a:solidFill>
               </a:rPr>
-              <a:t>.execute</a:t>
+              <a:t>!start</a:t>
             </a:r>
             <a:r>
               <a:rPr lang="fr-FR" sz="1400" b="1" dirty="0" smtClean="0">
@@ -13596,39 +13869,7 @@
                   <a:srgbClr val="000000"/>
                 </a:solidFill>
               </a:rPr>
-              <a:t>("</a:t>
-            </a:r>
-            <a:r>
-              <a:rPr lang="fr-FR" sz="1400" b="1" dirty="0" err="1" smtClean="0">
-                <a:solidFill>
-                  <a:srgbClr val="000000"/>
-                </a:solidFill>
-              </a:rPr>
-              <a:t>start</a:t>
-            </a:r>
-            <a:r>
-              <a:rPr lang="fr-FR" sz="1400" b="1" dirty="0" smtClean="0">
-                <a:solidFill>
-                  <a:srgbClr val="000000"/>
-                </a:solidFill>
-              </a:rPr>
-              <a:t>", </a:t>
-            </a:r>
-            <a:r>
-              <a:rPr lang="fr-FR" sz="1400" b="1" dirty="0" err="1" smtClean="0">
-                <a:solidFill>
-                  <a:srgbClr val="000000"/>
-                </a:solidFill>
-              </a:rPr>
-              <a:t>s.getId</a:t>
-            </a:r>
-            <a:r>
-              <a:rPr lang="fr-FR" sz="1400" b="1" dirty="0" smtClean="0">
-                <a:solidFill>
-                  <a:srgbClr val="000000"/>
-                </a:solidFill>
-              </a:rPr>
-              <a:t>())</a:t>
+              <a:t>()</a:t>
             </a:r>
             <a:endParaRPr lang="fr-FR" sz="1400" b="1" dirty="0">
               <a:solidFill>
@@ -13638,9 +13879,51 @@
           </a:p>
         </p:txBody>
       </p:sp>
-      <p:sp>
-        <p:nvSpPr>
-          <p:cNvPr id="40" name="AutoShape 73"/>
+      <p:cxnSp>
+        <p:nvCxnSpPr>
+          <p:cNvPr id="74" name="Connecteur en arc 73"/>
+          <p:cNvCxnSpPr>
+            <a:stCxn id="81" idx="3"/>
+            <a:endCxn id="19" idx="2"/>
+          </p:cNvCxnSpPr>
+          <p:nvPr/>
+        </p:nvCxnSpPr>
+        <p:spPr>
+          <a:xfrm flipV="1">
+            <a:off x="3058122" y="2640603"/>
+            <a:ext cx="2095582" cy="2116785"/>
+          </a:xfrm>
+          <a:prstGeom prst="curvedConnector3">
+            <a:avLst>
+              <a:gd name="adj1" fmla="val 50000"/>
+            </a:avLst>
+          </a:prstGeom>
+          <a:ln w="19050" cmpd="sng">
+            <a:solidFill>
+              <a:srgbClr val="FF6609"/>
+            </a:solidFill>
+            <a:prstDash val="sysDash"/>
+            <a:tailEnd type="arrow"/>
+          </a:ln>
+        </p:spPr>
+        <p:style>
+          <a:lnRef idx="2">
+            <a:schemeClr val="accent1"/>
+          </a:lnRef>
+          <a:fillRef idx="0">
+            <a:schemeClr val="accent1"/>
+          </a:fillRef>
+          <a:effectRef idx="1">
+            <a:schemeClr val="accent1"/>
+          </a:effectRef>
+          <a:fontRef idx="minor">
+            <a:schemeClr val="tx1"/>
+          </a:fontRef>
+        </p:style>
+      </p:cxnSp>
+      <p:sp>
+        <p:nvSpPr>
+          <p:cNvPr id="39" name="AutoShape 73"/>
           <p:cNvSpPr>
             <a:spLocks noChangeArrowheads="1"/>
           </p:cNvSpPr>
@@ -13648,12 +13931,12 @@
         </p:nvSpPr>
         <p:spPr bwMode="auto">
           <a:xfrm>
-            <a:off x="5187713" y="3447458"/>
-            <a:ext cx="2990701" cy="1333019"/>
+            <a:off x="3327567" y="3055194"/>
+            <a:ext cx="2530604" cy="228600"/>
           </a:xfrm>
           <a:prstGeom prst="roundRect">
             <a:avLst>
-              <a:gd name="adj" fmla="val 14233"/>
+              <a:gd name="adj" fmla="val 50000"/>
             </a:avLst>
           </a:prstGeom>
           <a:solidFill>
@@ -13672,13 +13955,28 @@
           <a:bodyPr wrap="none" anchor="ctr"/>
           <a:lstStyle/>
           <a:p>
-            <a:r>
-              <a:rPr lang="fr-FR" sz="1400" b="1" dirty="0" err="1"/>
-              <a:t>e</a:t>
-            </a:r>
+            <a:pPr algn="ctr"/>
             <a:r>
               <a:rPr lang="fr-FR" sz="1400" b="1" dirty="0" err="1" smtClean="0"/>
-              <a:t>xecute</a:t>
+              <a:t>cog</a:t>
+            </a:r>
+            <a:r>
+              <a:rPr lang="fr-FR" sz="1400" b="1" dirty="0" smtClean="0"/>
+              <a:t> </a:t>
+            </a:r>
+            <a:r>
+              <a:rPr lang="fr-FR" sz="1400" b="1" dirty="0" err="1" smtClean="0">
+                <a:latin typeface="Symbol" charset="0"/>
+              </a:rPr>
+              <a:t>b</a:t>
+            </a:r>
+            <a:r>
+              <a:rPr lang="fr-FR" sz="1400" b="1" dirty="0" err="1" smtClean="0">
+                <a:solidFill>
+                  <a:srgbClr val="000000"/>
+                </a:solidFill>
+              </a:rPr>
+              <a:t>.execute</a:t>
             </a:r>
             <a:r>
               <a:rPr lang="fr-FR" sz="1400" b="1" dirty="0" smtClean="0">
@@ -13686,7 +13984,7 @@
                   <a:srgbClr val="000000"/>
                 </a:solidFill>
               </a:rPr>
-              <a:t>(</a:t>
+              <a:t>("</a:t>
             </a:r>
             <a:r>
               <a:rPr lang="fr-FR" sz="1400" b="1" dirty="0" err="1" smtClean="0">
@@ -13694,7 +13992,7 @@
                   <a:srgbClr val="000000"/>
                 </a:solidFill>
               </a:rPr>
-              <a:t>name</a:t>
+              <a:t>start</a:t>
             </a:r>
             <a:r>
               <a:rPr lang="fr-FR" sz="1400" b="1" dirty="0" smtClean="0">
@@ -13702,15 +14000,15 @@
                   <a:srgbClr val="000000"/>
                 </a:solidFill>
               </a:rPr>
-              <a:t>,  id, </a:t>
-            </a:r>
-            <a:r>
-              <a:rPr lang="fr-FR" sz="1400" b="1" smtClean="0">
+              <a:t>", </a:t>
+            </a:r>
+            <a:r>
+              <a:rPr lang="fr-FR" sz="1400" b="1" dirty="0" err="1" smtClean="0">
                 <a:solidFill>
                   <a:srgbClr val="000000"/>
                 </a:solidFill>
               </a:rPr>
-              <a:t>params) </a:t>
+              <a:t>s.getId</a:t>
             </a:r>
             <a:r>
               <a:rPr lang="fr-FR" sz="1400" b="1" dirty="0" smtClean="0">
@@ -13718,153 +14016,7 @@
                   <a:srgbClr val="000000"/>
                 </a:solidFill>
               </a:rPr>
-              <a:t>{</a:t>
-            </a:r>
-          </a:p>
-          <a:p>
-            <a:r>
-              <a:rPr lang="fr-FR" sz="1400" b="1" dirty="0" smtClean="0">
-                <a:solidFill>
-                  <a:srgbClr val="000000"/>
-                </a:solidFill>
-              </a:rPr>
-              <a:t>   m = </a:t>
-            </a:r>
-            <a:r>
-              <a:rPr lang="fr-FR" sz="1400" b="1" dirty="0" err="1" smtClean="0">
-                <a:solidFill>
-                  <a:srgbClr val="000000"/>
-                </a:solidFill>
-              </a:rPr>
-              <a:t>retrieveMethod</a:t>
-            </a:r>
-            <a:r>
-              <a:rPr lang="fr-FR" sz="1400" b="1" dirty="0" smtClean="0">
-                <a:solidFill>
-                  <a:srgbClr val="000000"/>
-                </a:solidFill>
-              </a:rPr>
-              <a:t>(</a:t>
-            </a:r>
-            <a:r>
-              <a:rPr lang="fr-FR" sz="1400" b="1" dirty="0" err="1" smtClean="0">
-                <a:solidFill>
-                  <a:srgbClr val="000000"/>
-                </a:solidFill>
-              </a:rPr>
-              <a:t>name</a:t>
-            </a:r>
-            <a:r>
-              <a:rPr lang="fr-FR" sz="1400" b="1" dirty="0" smtClean="0">
-                <a:solidFill>
-                  <a:srgbClr val="000000"/>
-                </a:solidFill>
-              </a:rPr>
-              <a:t>, </a:t>
-            </a:r>
-            <a:r>
-              <a:rPr lang="fr-FR" sz="1400" b="1" dirty="0" err="1" smtClean="0">
-                <a:solidFill>
-                  <a:srgbClr val="000000"/>
-                </a:solidFill>
-              </a:rPr>
-              <a:t>params</a:t>
-            </a:r>
-            <a:r>
-              <a:rPr lang="fr-FR" sz="1400" b="1" dirty="0" smtClean="0">
-                <a:solidFill>
-                  <a:srgbClr val="000000"/>
-                </a:solidFill>
-              </a:rPr>
-              <a:t>)</a:t>
-            </a:r>
-          </a:p>
-          <a:p>
-            <a:r>
-              <a:rPr lang="fr-FR" sz="1400" b="1" dirty="0" smtClean="0">
-                <a:solidFill>
-                  <a:srgbClr val="000000"/>
-                </a:solidFill>
-              </a:rPr>
-              <a:t>   o = </a:t>
-            </a:r>
-            <a:r>
-              <a:rPr lang="fr-FR" sz="1400" b="1" dirty="0" err="1" smtClean="0">
-                <a:solidFill>
-                  <a:srgbClr val="000000"/>
-                </a:solidFill>
-              </a:rPr>
-              <a:t>retrieveObject</a:t>
-            </a:r>
-            <a:r>
-              <a:rPr lang="fr-FR" sz="1400" b="1" dirty="0" smtClean="0">
-                <a:solidFill>
-                  <a:srgbClr val="000000"/>
-                </a:solidFill>
-              </a:rPr>
-              <a:t>(id)</a:t>
-            </a:r>
-          </a:p>
-          <a:p>
-            <a:r>
-              <a:rPr lang="fr-FR" sz="1400" b="1" dirty="0" smtClean="0">
-                <a:solidFill>
-                  <a:srgbClr val="000000"/>
-                </a:solidFill>
-              </a:rPr>
-              <a:t>   r = </a:t>
-            </a:r>
-            <a:r>
-              <a:rPr lang="fr-FR" sz="1400" b="1" dirty="0" err="1" smtClean="0">
-                <a:solidFill>
-                  <a:srgbClr val="000000"/>
-                </a:solidFill>
-              </a:rPr>
-              <a:t>o.m</a:t>
-            </a:r>
-            <a:r>
-              <a:rPr lang="fr-FR" sz="1400" b="1" dirty="0" smtClean="0">
-                <a:solidFill>
-                  <a:srgbClr val="000000"/>
-                </a:solidFill>
-              </a:rPr>
-              <a:t>(</a:t>
-            </a:r>
-            <a:r>
-              <a:rPr lang="fr-FR" sz="1400" b="1" dirty="0" err="1" smtClean="0">
-                <a:solidFill>
-                  <a:srgbClr val="000000"/>
-                </a:solidFill>
-              </a:rPr>
-              <a:t>params</a:t>
-            </a:r>
-            <a:r>
-              <a:rPr lang="fr-FR" sz="1400" b="1" dirty="0" smtClean="0">
-                <a:solidFill>
-                  <a:srgbClr val="000000"/>
-                </a:solidFill>
-              </a:rPr>
-              <a:t>)</a:t>
-            </a:r>
-          </a:p>
-          <a:p>
-            <a:r>
-              <a:rPr lang="fr-FR" sz="1400" b="1" dirty="0" smtClean="0">
-                <a:solidFill>
-                  <a:srgbClr val="000000"/>
-                </a:solidFill>
-              </a:rPr>
-              <a:t>   return r</a:t>
-            </a:r>
-          </a:p>
-          <a:p>
-            <a:r>
-              <a:rPr lang="fr-FR" sz="1400" b="1" dirty="0" smtClean="0">
-                <a:solidFill>
-                  <a:srgbClr val="000000"/>
-                </a:solidFill>
-              </a:rPr>
-              <a:t>}</a:t>
+              <a:t>())</a:t>
             </a:r>
             <a:endParaRPr lang="fr-FR" sz="1400" b="1" dirty="0">
               <a:solidFill>
@@ -13921,7 +14073,7 @@
                                           </p:stCondLst>
                                         </p:cTn>
                                         <p:tgtEl>
-                                          <p:spTgt spid="22"/>
+                                          <p:spTgt spid="55"/>
                                         </p:tgtEl>
                                         <p:attrNameLst>
                                           <p:attrName>style.visibility</p:attrName>
@@ -13948,7 +14100,7 @@
                                           </p:stCondLst>
                                         </p:cTn>
                                         <p:tgtEl>
-                                          <p:spTgt spid="23"/>
+                                          <p:spTgt spid="56"/>
                                         </p:tgtEl>
                                         <p:attrNameLst>
                                           <p:attrName>style.visibility</p:attrName>
@@ -13975,7 +14127,7 @@
                                           </p:stCondLst>
                                         </p:cTn>
                                         <p:tgtEl>
-                                          <p:spTgt spid="24"/>
+                                          <p:spTgt spid="57"/>
                                         </p:tgtEl>
                                         <p:attrNameLst>
                                           <p:attrName>style.visibility</p:attrName>
@@ -14002,7 +14154,7 @@
                                           </p:stCondLst>
                                         </p:cTn>
                                         <p:tgtEl>
-                                          <p:spTgt spid="25"/>
+                                          <p:spTgt spid="58"/>
                                         </p:tgtEl>
                                         <p:attrNameLst>
                                           <p:attrName>style.visibility</p:attrName>
@@ -14029,7 +14181,7 @@
                                           </p:stCondLst>
                                         </p:cTn>
                                         <p:tgtEl>
-                                          <p:spTgt spid="26"/>
+                                          <p:spTgt spid="59"/>
                                         </p:tgtEl>
                                         <p:attrNameLst>
                                           <p:attrName>style.visibility</p:attrName>
@@ -14056,7 +14208,7 @@
                                           </p:stCondLst>
                                         </p:cTn>
                                         <p:tgtEl>
-                                          <p:spTgt spid="27"/>
+                                          <p:spTgt spid="60"/>
                                         </p:tgtEl>
                                         <p:attrNameLst>
                                           <p:attrName>style.visibility</p:attrName>
@@ -14083,7 +14235,7 @@
                                           </p:stCondLst>
                                         </p:cTn>
                                         <p:tgtEl>
-                                          <p:spTgt spid="28"/>
+                                          <p:spTgt spid="61"/>
                                         </p:tgtEl>
                                         <p:attrNameLst>
                                           <p:attrName>style.visibility</p:attrName>
@@ -14110,7 +14262,7 @@
                                           </p:stCondLst>
                                         </p:cTn>
                                         <p:tgtEl>
-                                          <p:spTgt spid="29"/>
+                                          <p:spTgt spid="62"/>
                                         </p:tgtEl>
                                         <p:attrNameLst>
                                           <p:attrName>style.visibility</p:attrName>
@@ -14137,7 +14289,7 @@
                                           </p:stCondLst>
                                         </p:cTn>
                                         <p:tgtEl>
-                                          <p:spTgt spid="30"/>
+                                          <p:spTgt spid="63"/>
                                         </p:tgtEl>
                                         <p:attrNameLst>
                                           <p:attrName>style.visibility</p:attrName>
@@ -14164,7 +14316,7 @@
                                           </p:stCondLst>
                                         </p:cTn>
                                         <p:tgtEl>
-                                          <p:spTgt spid="31"/>
+                                          <p:spTgt spid="64"/>
                                         </p:tgtEl>
                                         <p:attrNameLst>
                                           <p:attrName>style.visibility</p:attrName>
@@ -14191,7 +14343,7 @@
                                           </p:stCondLst>
                                         </p:cTn>
                                         <p:tgtEl>
-                                          <p:spTgt spid="55"/>
+                                          <p:spTgt spid="67"/>
                                         </p:tgtEl>
                                         <p:attrNameLst>
                                           <p:attrName>style.visibility</p:attrName>
@@ -14218,7 +14370,7 @@
                                           </p:stCondLst>
                                         </p:cTn>
                                         <p:tgtEl>
-                                          <p:spTgt spid="56"/>
+                                          <p:spTgt spid="68"/>
                                         </p:tgtEl>
                                         <p:attrNameLst>
                                           <p:attrName>style.visibility</p:attrName>
@@ -14245,7 +14397,7 @@
                                           </p:stCondLst>
                                         </p:cTn>
                                         <p:tgtEl>
-                                          <p:spTgt spid="57"/>
+                                          <p:spTgt spid="69"/>
                                         </p:tgtEl>
                                         <p:attrNameLst>
                                           <p:attrName>style.visibility</p:attrName>
@@ -14272,7 +14424,7 @@
                                           </p:stCondLst>
                                         </p:cTn>
                                         <p:tgtEl>
-                                          <p:spTgt spid="58"/>
+                                          <p:spTgt spid="70"/>
                                         </p:tgtEl>
                                         <p:attrNameLst>
                                           <p:attrName>style.visibility</p:attrName>
@@ -14313,20 +14465,20 @@
       </p:par>
     </p:tnLst>
     <p:bldLst>
-      <p:bldP spid="22" grpId="0" animBg="1"/>
-      <p:bldP spid="23" grpId="0" animBg="1"/>
-      <p:bldP spid="24" grpId="0" animBg="1"/>
-      <p:bldP spid="25" grpId="0" animBg="1"/>
-      <p:bldP spid="26" grpId="0" animBg="1"/>
-      <p:bldP spid="27" grpId="0" animBg="1"/>
-      <p:bldP spid="28" grpId="0" animBg="1"/>
-      <p:bldP spid="29" grpId="0" animBg="1"/>
-      <p:bldP spid="30" grpId="0" animBg="1"/>
-      <p:bldP spid="31" grpId="0" animBg="1"/>
       <p:bldP spid="55" grpId="0" animBg="1"/>
       <p:bldP spid="56" grpId="0" animBg="1"/>
       <p:bldP spid="57" grpId="0" animBg="1"/>
       <p:bldP spid="58" grpId="0" animBg="1"/>
+      <p:bldP spid="59" grpId="0" animBg="1"/>
+      <p:bldP spid="60" grpId="0" animBg="1"/>
+      <p:bldP spid="61" grpId="0" animBg="1"/>
+      <p:bldP spid="62" grpId="0" animBg="1"/>
+      <p:bldP spid="63" grpId="0" animBg="1"/>
+      <p:bldP spid="64" grpId="0" animBg="1"/>
+      <p:bldP spid="67" grpId="0" animBg="1"/>
+      <p:bldP spid="68" grpId="0" animBg="1"/>
+      <p:bldP spid="69" grpId="0" animBg="1"/>
+      <p:bldP spid="70" grpId="0" animBg="1"/>
     </p:bldLst>
   </p:timing>
 </p:sld>

</xml_diff>